<commit_message>
Relatório Word com primeiro ponto
Vou trabalhar agora o ppt
</commit_message>
<xml_diff>
--- a/checkpoint3/G01A - Presentation 3.pptx
+++ b/checkpoint3/G01A - Presentation 3.pptx
@@ -118,7 +118,7 @@
   </p:defaultTextStyle>
   <p:extLst>
     <p:ext uri="{EFAFB233-063F-42B5-8137-9DF3F51BA10A}">
-      <p15:sldGuideLst xmlns="" xmlns:p15="http://schemas.microsoft.com/office/powerpoint/2012/main">
+      <p15:sldGuideLst xmlns:p15="http://schemas.microsoft.com/office/powerpoint/2012/main" xmlns="">
         <p15:guide id="1" orient="horz" pos="2160">
           <p15:clr>
             <a:srgbClr val="A4A3A4"/>
@@ -217,7 +217,7 @@
           <a:p>
             <a:fld id="{745C36E7-9E00-462E-80A3-32F2BE615C7A}" type="datetimeFigureOut">
               <a:rPr lang="en-US" smtClean="0"/>
-              <a:t>27/10/15</a:t>
+              <a:t>10/31/2015</a:t>
             </a:fld>
             <a:endParaRPr lang="en-US"/>
           </a:p>
@@ -283,7 +283,7 @@
           <a:p>
             <a:fld id="{C7B702CB-D988-47C5-8204-95032A6A7C26}" type="slidenum">
               <a:rPr lang="en-US" smtClean="0"/>
-              <a:t>‹#›</a:t>
+              <a:t>‹nº›</a:t>
             </a:fld>
             <a:endParaRPr lang="en-US"/>
           </a:p>
@@ -383,7 +383,7 @@
             <a:fld id="{01F3E309-ED8D-4193-99AF-E5EA90965E98}" type="datetimeFigureOut">
               <a:rPr lang="en-US" smtClean="0"/>
               <a:pPr/>
-              <a:t>27/10/15</a:t>
+              <a:t>10/31/2015</a:t>
             </a:fld>
             <a:endParaRPr lang="en-US"/>
           </a:p>
@@ -545,7 +545,7 @@
             <a:fld id="{F535F173-C1DD-4975-94BF-5B9ED67F7674}" type="slidenum">
               <a:rPr lang="en-US" smtClean="0"/>
               <a:pPr/>
-              <a:t>‹#›</a:t>
+              <a:t>‹nº›</a:t>
             </a:fld>
             <a:endParaRPr lang="en-US"/>
           </a:p>
@@ -1486,7 +1486,7 @@
             <a:fld id="{F3CC9924-33BC-4796-B0F9-D37DB5D899BF}" type="datetimeFigureOut">
               <a:rPr lang="pt-PT" smtClean="0"/>
               <a:pPr/>
-              <a:t>27/10/15</a:t>
+              <a:t>31/10/2015</a:t>
             </a:fld>
             <a:endParaRPr lang="pt-PT"/>
           </a:p>
@@ -1545,7 +1545,7 @@
             <a:fld id="{B5EBF8D4-C87A-47B7-9996-84452461937B}" type="slidenum">
               <a:rPr lang="pt-PT" smtClean="0"/>
               <a:pPr/>
-              <a:t>‹#›</a:t>
+              <a:t>‹nº›</a:t>
             </a:fld>
             <a:endParaRPr lang="pt-PT"/>
           </a:p>
@@ -3268,8 +3268,13 @@
                   <a:schemeClr val="bg2"/>
                 </a:solidFill>
               </a:rPr>
-              <a:t>GX-A/T</a:t>
-            </a:r>
+              <a:t>G01-A</a:t>
+            </a:r>
+            <a:endParaRPr lang="pt-PT" sz="4600" dirty="0" smtClean="0">
+              <a:solidFill>
+                <a:schemeClr val="bg2"/>
+              </a:solidFill>
+            </a:endParaRPr>
           </a:p>
         </p:txBody>
       </p:sp>
@@ -3284,7 +3289,7 @@
         <p:spPr>
           <a:xfrm>
             <a:off x="1979712" y="4571984"/>
-            <a:ext cx="2285984" cy="2286016"/>
+            <a:ext cx="3528392" cy="2286016"/>
           </a:xfrm>
           <a:prstGeom prst="rect">
             <a:avLst/>
@@ -3439,90 +3444,32 @@
           </a:lstStyle>
           <a:p>
             <a:r>
-              <a:rPr lang="pt-PT" sz="2400" b="0" dirty="0" err="1" smtClean="0">
-                <a:solidFill>
-                  <a:schemeClr val="bg2"/>
-                </a:solidFill>
-              </a:rPr>
-              <a:t>Number</a:t>
-            </a:r>
-            <a:r>
-              <a:rPr lang="pt-PT" sz="2400" b="0" dirty="0" smtClean="0">
-                <a:solidFill>
-                  <a:schemeClr val="bg2"/>
-                </a:solidFill>
-              </a:rPr>
-              <a:t> – </a:t>
-            </a:r>
-            <a:r>
-              <a:rPr lang="pt-PT" sz="2400" b="0" dirty="0" err="1" smtClean="0">
-                <a:solidFill>
-                  <a:schemeClr val="bg2"/>
-                </a:solidFill>
-              </a:rPr>
-              <a:t>Name</a:t>
-            </a:r>
-            <a:endParaRPr lang="pt-PT" sz="2400" b="0" dirty="0" smtClean="0">
-              <a:solidFill>
-                <a:schemeClr val="bg2"/>
-              </a:solidFill>
-            </a:endParaRPr>
-          </a:p>
-          <a:p>
-            <a:r>
-              <a:rPr lang="pt-PT" sz="2400" b="0" dirty="0" err="1">
-                <a:solidFill>
-                  <a:schemeClr val="bg2"/>
-                </a:solidFill>
-              </a:rPr>
-              <a:t>Number</a:t>
-            </a:r>
-            <a:r>
               <a:rPr lang="pt-PT" sz="2400" b="0" dirty="0">
                 <a:solidFill>
                   <a:schemeClr val="bg2"/>
                 </a:solidFill>
               </a:rPr>
-              <a:t> – </a:t>
-            </a:r>
-            <a:r>
-              <a:rPr lang="pt-PT" sz="2400" b="0" dirty="0" err="1">
-                <a:solidFill>
-                  <a:schemeClr val="bg2"/>
-                </a:solidFill>
-              </a:rPr>
-              <a:t>Name</a:t>
-            </a:r>
-            <a:endParaRPr lang="pt-PT" sz="2400" b="0" dirty="0">
-              <a:solidFill>
-                <a:schemeClr val="bg2"/>
-              </a:solidFill>
-            </a:endParaRPr>
-          </a:p>
-          <a:p>
-            <a:r>
-              <a:rPr lang="pt-PT" sz="2400" b="0" dirty="0" err="1">
-                <a:solidFill>
-                  <a:schemeClr val="bg2"/>
-                </a:solidFill>
-              </a:rPr>
-              <a:t>Number</a:t>
-            </a:r>
+              <a:t>70493 – Tiago Nascimento</a:t>
+            </a:r>
+          </a:p>
+          <a:p>
             <a:r>
               <a:rPr lang="pt-PT" sz="2400" b="0" dirty="0">
                 <a:solidFill>
                   <a:schemeClr val="bg2"/>
                 </a:solidFill>
               </a:rPr>
-              <a:t> – </a:t>
-            </a:r>
-            <a:r>
-              <a:rPr lang="pt-PT" sz="2400" b="0" dirty="0" err="1" smtClean="0">
+              <a:t>76102 – Miguel Cruz</a:t>
+            </a:r>
+          </a:p>
+          <a:p>
+            <a:r>
+              <a:rPr lang="pt-PT" sz="2400" b="0" dirty="0">
                 <a:solidFill>
                   <a:schemeClr val="bg2"/>
                 </a:solidFill>
               </a:rPr>
-              <a:t>Name</a:t>
+              <a:t>76394 – Daniel Trindade</a:t>
             </a:r>
             <a:endParaRPr lang="pt-PT" sz="2400" b="0" dirty="0">
               <a:solidFill>
@@ -3540,7 +3487,7 @@
   <p:timing>
     <p:tnLst>
       <p:par>
-        <p:cTn xmlns:p14="http://schemas.microsoft.com/office/powerpoint/2010/main" id="1" dur="indefinite" restart="never" nodeType="tmRoot"/>
+        <p:cTn id="1" dur="indefinite" restart="never" nodeType="tmRoot"/>
       </p:par>
     </p:tnLst>
   </p:timing>
@@ -3654,7 +3601,7 @@
   <p:timing>
     <p:tnLst>
       <p:par>
-        <p:cTn xmlns:p14="http://schemas.microsoft.com/office/powerpoint/2010/main" id="1" dur="indefinite" restart="never" nodeType="tmRoot"/>
+        <p:cTn id="1" dur="indefinite" restart="never" nodeType="tmRoot"/>
       </p:par>
     </p:tnLst>
   </p:timing>
@@ -3728,7 +3675,6 @@
               <a:rPr lang="en-US" sz="4000" dirty="0" smtClean="0"/>
               <a:t>Visual Encoding:</a:t>
             </a:r>
-            <a:endParaRPr lang="en-US" sz="4000" dirty="0" smtClean="0"/>
           </a:p>
         </p:txBody>
       </p:sp>
@@ -3745,7 +3691,7 @@
   <p:timing>
     <p:tnLst>
       <p:par>
-        <p:cTn xmlns:p14="http://schemas.microsoft.com/office/powerpoint/2010/main" id="1" dur="indefinite" restart="never" nodeType="tmRoot"/>
+        <p:cTn id="1" dur="indefinite" restart="never" nodeType="tmRoot"/>
       </p:par>
     </p:tnLst>
   </p:timing>
@@ -3819,7 +3765,6 @@
               <a:rPr lang="en-US" sz="4000" dirty="0" smtClean="0"/>
               <a:t>Visual Encoding:</a:t>
             </a:r>
-            <a:endParaRPr lang="en-US" sz="4000" dirty="0" smtClean="0"/>
           </a:p>
         </p:txBody>
       </p:sp>
@@ -3836,7 +3781,7 @@
   <p:timing>
     <p:tnLst>
       <p:par>
-        <p:cTn xmlns:p14="http://schemas.microsoft.com/office/powerpoint/2010/main" id="1" dur="indefinite" restart="never" nodeType="tmRoot"/>
+        <p:cTn id="1" dur="indefinite" restart="never" nodeType="tmRoot"/>
       </p:par>
     </p:tnLst>
   </p:timing>
@@ -3971,7 +3916,7 @@
   <p:timing>
     <p:tnLst>
       <p:par>
-        <p:cTn xmlns:p14="http://schemas.microsoft.com/office/powerpoint/2010/main" id="1" dur="indefinite" restart="never" nodeType="tmRoot"/>
+        <p:cTn id="1" dur="indefinite" restart="never" nodeType="tmRoot"/>
       </p:par>
     </p:tnLst>
   </p:timing>
@@ -4039,7 +3984,6 @@
               <a:rPr lang="en-US" dirty="0" smtClean="0"/>
               <a:t>Selected Idiom and why it allows answering each question</a:t>
             </a:r>
-            <a:endParaRPr lang="en-US" dirty="0" smtClean="0"/>
           </a:p>
           <a:p>
             <a:pPr lvl="1"/>
@@ -4060,7 +4004,7 @@
   <p:timing>
     <p:tnLst>
       <p:par>
-        <p:cTn xmlns:p14="http://schemas.microsoft.com/office/powerpoint/2010/main" id="1" dur="indefinite" restart="never" nodeType="tmRoot"/>
+        <p:cTn id="1" dur="indefinite" restart="never" nodeType="tmRoot"/>
       </p:par>
     </p:tnLst>
   </p:timing>
@@ -4149,7 +4093,7 @@
   <p:timing>
     <p:tnLst>
       <p:par>
-        <p:cTn xmlns:p14="http://schemas.microsoft.com/office/powerpoint/2010/main" id="1" dur="indefinite" restart="never" nodeType="tmRoot"/>
+        <p:cTn id="1" dur="indefinite" restart="never" nodeType="tmRoot"/>
       </p:par>
     </p:tnLst>
   </p:timing>

</xml_diff>

<commit_message>
Primeira parte do PPT
</commit_message>
<xml_diff>
--- a/checkpoint3/G01A - Presentation 3.pptx
+++ b/checkpoint3/G01A - Presentation 3.pptx
@@ -5,19 +5,28 @@
     <p:sldMasterId id="2147483648" r:id="rId1"/>
   </p:sldMasterIdLst>
   <p:notesMasterIdLst>
-    <p:notesMasterId r:id="rId9"/>
+    <p:notesMasterId r:id="rId18"/>
   </p:notesMasterIdLst>
   <p:handoutMasterIdLst>
-    <p:handoutMasterId r:id="rId10"/>
+    <p:handoutMasterId r:id="rId19"/>
   </p:handoutMasterIdLst>
   <p:sldIdLst>
     <p:sldId id="256" r:id="rId2"/>
     <p:sldId id="257" r:id="rId3"/>
-    <p:sldId id="1096" r:id="rId4"/>
-    <p:sldId id="1109" r:id="rId5"/>
-    <p:sldId id="1097" r:id="rId6"/>
-    <p:sldId id="1098" r:id="rId7"/>
-    <p:sldId id="1110" r:id="rId8"/>
+    <p:sldId id="1112" r:id="rId4"/>
+    <p:sldId id="1096" r:id="rId5"/>
+    <p:sldId id="1111" r:id="rId6"/>
+    <p:sldId id="1109" r:id="rId7"/>
+    <p:sldId id="1113" r:id="rId8"/>
+    <p:sldId id="1114" r:id="rId9"/>
+    <p:sldId id="1115" r:id="rId10"/>
+    <p:sldId id="1116" r:id="rId11"/>
+    <p:sldId id="1117" r:id="rId12"/>
+    <p:sldId id="1118" r:id="rId13"/>
+    <p:sldId id="1119" r:id="rId14"/>
+    <p:sldId id="1097" r:id="rId15"/>
+    <p:sldId id="1098" r:id="rId16"/>
+    <p:sldId id="1110" r:id="rId17"/>
   </p:sldIdLst>
   <p:sldSz cx="9144000" cy="6858000" type="screen4x3"/>
   <p:notesSz cx="6858000" cy="9144000"/>
@@ -118,7 +127,7 @@
   </p:defaultTextStyle>
   <p:extLst>
     <p:ext uri="{EFAFB233-063F-42B5-8137-9DF3F51BA10A}">
-      <p15:sldGuideLst xmlns:p15="http://schemas.microsoft.com/office/powerpoint/2012/main" xmlns="">
+      <p15:sldGuideLst xmlns="" xmlns:p15="http://schemas.microsoft.com/office/powerpoint/2012/main">
         <p15:guide id="1" orient="horz" pos="2160">
           <p15:clr>
             <a:srgbClr val="A4A3A4"/>
@@ -133,6 +142,450 @@
     </p:ext>
   </p:extLst>
 </p:presentation>
+</file>
+
+<file path=ppt/charts/chart1.xml><?xml version="1.0" encoding="utf-8"?>
+<c:chartSpace xmlns:c="http://schemas.openxmlformats.org/drawingml/2006/chart" xmlns:a="http://schemas.openxmlformats.org/drawingml/2006/main" xmlns:r="http://schemas.openxmlformats.org/officeDocument/2006/relationships">
+  <c:date1904 val="0"/>
+  <c:lang val="pt-PT"/>
+  <c:roundedCorners val="0"/>
+  <mc:AlternateContent xmlns:mc="http://schemas.openxmlformats.org/markup-compatibility/2006">
+    <mc:Choice xmlns:c14="http://schemas.microsoft.com/office/drawing/2007/8/2/chart" Requires="c14">
+      <c14:style val="128"/>
+    </mc:Choice>
+    <mc:Fallback>
+      <c:style val="28"/>
+    </mc:Fallback>
+  </mc:AlternateContent>
+  <c:chart>
+    <c:autoTitleDeleted val="0"/>
+    <c:plotArea>
+      <c:layout>
+        <c:manualLayout>
+          <c:layoutTarget val="inner"/>
+          <c:xMode val="edge"/>
+          <c:yMode val="edge"/>
+          <c:x val="3.5416666666666666E-2"/>
+          <c:y val="0"/>
+          <c:w val="0.95416666666666672"/>
+          <c:h val="0.93125000000000002"/>
+        </c:manualLayout>
+      </c:layout>
+      <c:barChart>
+        <c:barDir val="bar"/>
+        <c:grouping val="clustered"/>
+        <c:varyColors val="0"/>
+        <c:ser>
+          <c:idx val="0"/>
+          <c:order val="0"/>
+          <c:tx>
+            <c:strRef>
+              <c:f>Folha1!$B$1</c:f>
+              <c:strCache>
+                <c:ptCount val="1"/>
+                <c:pt idx="0">
+                  <c:v>Série 1</c:v>
+                </c:pt>
+              </c:strCache>
+            </c:strRef>
+          </c:tx>
+          <c:invertIfNegative val="0"/>
+          <c:dPt>
+            <c:idx val="1"/>
+            <c:invertIfNegative val="0"/>
+            <c:bubble3D val="0"/>
+            <c:spPr>
+              <a:solidFill>
+                <a:schemeClr val="accent2">
+                  <a:lumMod val="40000"/>
+                  <a:lumOff val="60000"/>
+                </a:schemeClr>
+              </a:solidFill>
+            </c:spPr>
+          </c:dPt>
+          <c:dPt>
+            <c:idx val="3"/>
+            <c:invertIfNegative val="0"/>
+            <c:bubble3D val="0"/>
+            <c:spPr>
+              <a:solidFill>
+                <a:schemeClr val="accent2">
+                  <a:lumMod val="60000"/>
+                  <a:lumOff val="40000"/>
+                </a:schemeClr>
+              </a:solidFill>
+            </c:spPr>
+          </c:dPt>
+          <c:cat>
+            <c:strRef>
+              <c:f>Folha1!$A$2:$A$6</c:f>
+              <c:strCache>
+                <c:ptCount val="5"/>
+                <c:pt idx="1">
+                  <c:v>Categoria 2</c:v>
+                </c:pt>
+                <c:pt idx="3">
+                  <c:v>Categoria 3</c:v>
+                </c:pt>
+                <c:pt idx="4">
+                  <c:v>Categoria 4</c:v>
+                </c:pt>
+              </c:strCache>
+            </c:strRef>
+          </c:cat>
+          <c:val>
+            <c:numRef>
+              <c:f>Folha1!$B$2:$B$6</c:f>
+              <c:numCache>
+                <c:formatCode>General</c:formatCode>
+                <c:ptCount val="5"/>
+                <c:pt idx="1">
+                  <c:v>1.25</c:v>
+                </c:pt>
+                <c:pt idx="3">
+                  <c:v>3.5</c:v>
+                </c:pt>
+                <c:pt idx="4">
+                  <c:v>4.5</c:v>
+                </c:pt>
+              </c:numCache>
+            </c:numRef>
+          </c:val>
+        </c:ser>
+        <c:ser>
+          <c:idx val="1"/>
+          <c:order val="1"/>
+          <c:tx>
+            <c:strRef>
+              <c:f>Folha1!$C$1</c:f>
+              <c:strCache>
+                <c:ptCount val="1"/>
+                <c:pt idx="0">
+                  <c:v>Coluna1</c:v>
+                </c:pt>
+              </c:strCache>
+            </c:strRef>
+          </c:tx>
+          <c:invertIfNegative val="0"/>
+          <c:cat>
+            <c:strRef>
+              <c:f>Folha1!$A$2:$A$6</c:f>
+              <c:strCache>
+                <c:ptCount val="5"/>
+                <c:pt idx="1">
+                  <c:v>Categoria 2</c:v>
+                </c:pt>
+                <c:pt idx="3">
+                  <c:v>Categoria 3</c:v>
+                </c:pt>
+                <c:pt idx="4">
+                  <c:v>Categoria 4</c:v>
+                </c:pt>
+              </c:strCache>
+            </c:strRef>
+          </c:cat>
+          <c:val>
+            <c:numRef>
+              <c:f>Folha1!$C$2:$C$6</c:f>
+              <c:numCache>
+                <c:formatCode>General</c:formatCode>
+                <c:ptCount val="5"/>
+              </c:numCache>
+            </c:numRef>
+          </c:val>
+        </c:ser>
+        <c:ser>
+          <c:idx val="2"/>
+          <c:order val="2"/>
+          <c:tx>
+            <c:strRef>
+              <c:f>Folha1!$D$1</c:f>
+              <c:strCache>
+                <c:ptCount val="1"/>
+                <c:pt idx="0">
+                  <c:v>Coluna2</c:v>
+                </c:pt>
+              </c:strCache>
+            </c:strRef>
+          </c:tx>
+          <c:invertIfNegative val="0"/>
+          <c:cat>
+            <c:strRef>
+              <c:f>Folha1!$A$2:$A$6</c:f>
+              <c:strCache>
+                <c:ptCount val="5"/>
+                <c:pt idx="1">
+                  <c:v>Categoria 2</c:v>
+                </c:pt>
+                <c:pt idx="3">
+                  <c:v>Categoria 3</c:v>
+                </c:pt>
+                <c:pt idx="4">
+                  <c:v>Categoria 4</c:v>
+                </c:pt>
+              </c:strCache>
+            </c:strRef>
+          </c:cat>
+          <c:val>
+            <c:numRef>
+              <c:f>Folha1!$D$2:$D$6</c:f>
+              <c:numCache>
+                <c:formatCode>General</c:formatCode>
+                <c:ptCount val="5"/>
+              </c:numCache>
+            </c:numRef>
+          </c:val>
+        </c:ser>
+        <c:dLbls>
+          <c:showLegendKey val="0"/>
+          <c:showVal val="0"/>
+          <c:showCatName val="0"/>
+          <c:showSerName val="0"/>
+          <c:showPercent val="0"/>
+          <c:showBubbleSize val="0"/>
+        </c:dLbls>
+        <c:gapWidth val="150"/>
+        <c:axId val="535747584"/>
+        <c:axId val="510031488"/>
+      </c:barChart>
+      <c:catAx>
+        <c:axId val="535747584"/>
+        <c:scaling>
+          <c:orientation val="minMax"/>
+        </c:scaling>
+        <c:delete val="1"/>
+        <c:axPos val="l"/>
+        <c:majorTickMark val="out"/>
+        <c:minorTickMark val="none"/>
+        <c:tickLblPos val="nextTo"/>
+        <c:crossAx val="510031488"/>
+        <c:crosses val="autoZero"/>
+        <c:auto val="1"/>
+        <c:lblAlgn val="ctr"/>
+        <c:lblOffset val="100"/>
+        <c:noMultiLvlLbl val="0"/>
+      </c:catAx>
+      <c:valAx>
+        <c:axId val="510031488"/>
+        <c:scaling>
+          <c:orientation val="minMax"/>
+        </c:scaling>
+        <c:delete val="1"/>
+        <c:axPos val="b"/>
+        <c:majorGridlines>
+          <c:spPr>
+            <a:ln>
+              <a:noFill/>
+            </a:ln>
+          </c:spPr>
+        </c:majorGridlines>
+        <c:numFmt formatCode="General" sourceLinked="1"/>
+        <c:majorTickMark val="out"/>
+        <c:minorTickMark val="none"/>
+        <c:tickLblPos val="nextTo"/>
+        <c:crossAx val="535747584"/>
+        <c:crosses val="autoZero"/>
+        <c:crossBetween val="between"/>
+      </c:valAx>
+      <c:spPr>
+        <a:ln>
+          <a:noFill/>
+        </a:ln>
+      </c:spPr>
+    </c:plotArea>
+    <c:plotVisOnly val="1"/>
+    <c:dispBlanksAs val="gap"/>
+    <c:showDLblsOverMax val="0"/>
+  </c:chart>
+  <c:txPr>
+    <a:bodyPr/>
+    <a:lstStyle/>
+    <a:p>
+      <a:pPr>
+        <a:defRPr sz="1800"/>
+      </a:pPr>
+      <a:endParaRPr lang="pt-PT"/>
+    </a:p>
+  </c:txPr>
+  <c:externalData r:id="rId1">
+    <c:autoUpdate val="0"/>
+  </c:externalData>
+  <c:userShapes r:id="rId2"/>
+</c:chartSpace>
+</file>
+
+<file path=ppt/drawings/drawing1.xml><?xml version="1.0" encoding="utf-8"?>
+<c:userShapes xmlns:c="http://schemas.openxmlformats.org/drawingml/2006/chart">
+  <cdr:relSizeAnchor xmlns:cdr="http://schemas.openxmlformats.org/drawingml/2006/chartDrawing">
+    <cdr:from>
+      <cdr:x>0.07087</cdr:x>
+      <cdr:y>0.40753</cdr:y>
+    </cdr:from>
+    <cdr:to>
+      <cdr:x>0.22087</cdr:x>
+      <cdr:y>0.63253</cdr:y>
+    </cdr:to>
+    <cdr:sp macro="" textlink="">
+      <cdr:nvSpPr>
+        <cdr:cNvPr id="2" name="CaixaDeTexto 1"/>
+        <cdr:cNvSpPr txBox="1"/>
+      </cdr:nvSpPr>
+      <cdr:spPr>
+        <a:xfrm xmlns:a="http://schemas.openxmlformats.org/drawingml/2006/main">
+          <a:off x="432048" y="1656184"/>
+          <a:ext cx="914400" cy="914400"/>
+        </a:xfrm>
+        <a:prstGeom xmlns:a="http://schemas.openxmlformats.org/drawingml/2006/main" prst="rect">
+          <a:avLst/>
+        </a:prstGeom>
+      </cdr:spPr>
+      <cdr:txBody>
+        <a:bodyPr xmlns:a="http://schemas.openxmlformats.org/drawingml/2006/main" vertOverflow="clip" wrap="none" rtlCol="0"/>
+        <a:lstStyle xmlns:a="http://schemas.openxmlformats.org/drawingml/2006/main"/>
+        <a:p xmlns:a="http://schemas.openxmlformats.org/drawingml/2006/main">
+          <a:r>
+            <a:rPr lang="pt-PT" sz="4400" dirty="0" smtClean="0"/>
+            <a:t>…</a:t>
+          </a:r>
+          <a:endParaRPr lang="pt-PT" sz="4400" dirty="0"/>
+        </a:p>
+      </cdr:txBody>
+    </cdr:sp>
+  </cdr:relSizeAnchor>
+  <cdr:relSizeAnchor xmlns:cdr="http://schemas.openxmlformats.org/drawingml/2006/chartDrawing">
+    <cdr:from>
+      <cdr:x>0.38981</cdr:x>
+      <cdr:y>0.64015</cdr:y>
+    </cdr:from>
+    <cdr:to>
+      <cdr:x>0.45849</cdr:x>
+      <cdr:y>0.73103</cdr:y>
+    </cdr:to>
+    <cdr:sp macro="" textlink="">
+      <cdr:nvSpPr>
+        <cdr:cNvPr id="4" name="CaixaDeTexto 7"/>
+        <cdr:cNvSpPr txBox="1"/>
+      </cdr:nvSpPr>
+      <cdr:spPr>
+        <a:xfrm xmlns:a="http://schemas.openxmlformats.org/drawingml/2006/main">
+          <a:off x="2376264" y="2601580"/>
+          <a:ext cx="418704" cy="369332"/>
+        </a:xfrm>
+        <a:prstGeom xmlns:a="http://schemas.openxmlformats.org/drawingml/2006/main" prst="rect">
+          <a:avLst/>
+        </a:prstGeom>
+        <a:noFill xmlns:a="http://schemas.openxmlformats.org/drawingml/2006/main"/>
+      </cdr:spPr>
+      <cdr:txBody>
+        <a:bodyPr xmlns:a="http://schemas.openxmlformats.org/drawingml/2006/main" wrap="none" rtlCol="0">
+          <a:spAutoFit/>
+        </a:bodyPr>
+        <a:lstStyle xmlns:a="http://schemas.openxmlformats.org/drawingml/2006/main">
+          <a:defPPr>
+            <a:defRPr lang="pt-PT"/>
+          </a:defPPr>
+          <a:lvl1pPr marL="0" algn="l" defTabSz="914400" rtl="0" eaLnBrk="1" latinLnBrk="0" hangingPunct="1">
+            <a:defRPr sz="1800" kern="1200">
+              <a:solidFill>
+                <a:schemeClr val="tx1"/>
+              </a:solidFill>
+              <a:latin typeface="+mn-lt"/>
+              <a:ea typeface="+mn-ea"/>
+              <a:cs typeface="+mn-cs"/>
+            </a:defRPr>
+          </a:lvl1pPr>
+          <a:lvl2pPr marL="457200" algn="l" defTabSz="914400" rtl="0" eaLnBrk="1" latinLnBrk="0" hangingPunct="1">
+            <a:defRPr sz="1800" kern="1200">
+              <a:solidFill>
+                <a:schemeClr val="tx1"/>
+              </a:solidFill>
+              <a:latin typeface="+mn-lt"/>
+              <a:ea typeface="+mn-ea"/>
+              <a:cs typeface="+mn-cs"/>
+            </a:defRPr>
+          </a:lvl2pPr>
+          <a:lvl3pPr marL="914400" algn="l" defTabSz="914400" rtl="0" eaLnBrk="1" latinLnBrk="0" hangingPunct="1">
+            <a:defRPr sz="1800" kern="1200">
+              <a:solidFill>
+                <a:schemeClr val="tx1"/>
+              </a:solidFill>
+              <a:latin typeface="+mn-lt"/>
+              <a:ea typeface="+mn-ea"/>
+              <a:cs typeface="+mn-cs"/>
+            </a:defRPr>
+          </a:lvl3pPr>
+          <a:lvl4pPr marL="1371600" algn="l" defTabSz="914400" rtl="0" eaLnBrk="1" latinLnBrk="0" hangingPunct="1">
+            <a:defRPr sz="1800" kern="1200">
+              <a:solidFill>
+                <a:schemeClr val="tx1"/>
+              </a:solidFill>
+              <a:latin typeface="+mn-lt"/>
+              <a:ea typeface="+mn-ea"/>
+              <a:cs typeface="+mn-cs"/>
+            </a:defRPr>
+          </a:lvl4pPr>
+          <a:lvl5pPr marL="1828800" algn="l" defTabSz="914400" rtl="0" eaLnBrk="1" latinLnBrk="0" hangingPunct="1">
+            <a:defRPr sz="1800" kern="1200">
+              <a:solidFill>
+                <a:schemeClr val="tx1"/>
+              </a:solidFill>
+              <a:latin typeface="+mn-lt"/>
+              <a:ea typeface="+mn-ea"/>
+              <a:cs typeface="+mn-cs"/>
+            </a:defRPr>
+          </a:lvl5pPr>
+          <a:lvl6pPr marL="2286000" algn="l" defTabSz="914400" rtl="0" eaLnBrk="1" latinLnBrk="0" hangingPunct="1">
+            <a:defRPr sz="1800" kern="1200">
+              <a:solidFill>
+                <a:schemeClr val="tx1"/>
+              </a:solidFill>
+              <a:latin typeface="+mn-lt"/>
+              <a:ea typeface="+mn-ea"/>
+              <a:cs typeface="+mn-cs"/>
+            </a:defRPr>
+          </a:lvl6pPr>
+          <a:lvl7pPr marL="2743200" algn="l" defTabSz="914400" rtl="0" eaLnBrk="1" latinLnBrk="0" hangingPunct="1">
+            <a:defRPr sz="1800" kern="1200">
+              <a:solidFill>
+                <a:schemeClr val="tx1"/>
+              </a:solidFill>
+              <a:latin typeface="+mn-lt"/>
+              <a:ea typeface="+mn-ea"/>
+              <a:cs typeface="+mn-cs"/>
+            </a:defRPr>
+          </a:lvl7pPr>
+          <a:lvl8pPr marL="3200400" algn="l" defTabSz="914400" rtl="0" eaLnBrk="1" latinLnBrk="0" hangingPunct="1">
+            <a:defRPr sz="1800" kern="1200">
+              <a:solidFill>
+                <a:schemeClr val="tx1"/>
+              </a:solidFill>
+              <a:latin typeface="+mn-lt"/>
+              <a:ea typeface="+mn-ea"/>
+              <a:cs typeface="+mn-cs"/>
+            </a:defRPr>
+          </a:lvl8pPr>
+          <a:lvl9pPr marL="3657600" algn="l" defTabSz="914400" rtl="0" eaLnBrk="1" latinLnBrk="0" hangingPunct="1">
+            <a:defRPr sz="1800" kern="1200">
+              <a:solidFill>
+                <a:schemeClr val="tx1"/>
+              </a:solidFill>
+              <a:latin typeface="+mn-lt"/>
+              <a:ea typeface="+mn-ea"/>
+              <a:cs typeface="+mn-cs"/>
+            </a:defRPr>
+          </a:lvl9pPr>
+        </a:lstStyle>
+        <a:p xmlns:a="http://schemas.openxmlformats.org/drawingml/2006/main">
+          <a:r>
+            <a:rPr lang="pt-PT" dirty="0" smtClean="0"/>
+            <a:t>10</a:t>
+          </a:r>
+          <a:endParaRPr lang="pt-PT" dirty="0"/>
+        </a:p>
+      </cdr:txBody>
+    </cdr:sp>
+  </cdr:relSizeAnchor>
+</c:userShapes>
 </file>
 
 <file path=ppt/handoutMasters/handoutMaster1.xml><?xml version="1.0" encoding="utf-8"?>
@@ -739,6 +1192,346 @@
 </p:notes>
 </file>
 
+<file path=ppt/notesSlides/notesSlide10.xml><?xml version="1.0" encoding="utf-8"?>
+<p:notes xmlns:a="http://schemas.openxmlformats.org/drawingml/2006/main" xmlns:r="http://schemas.openxmlformats.org/officeDocument/2006/relationships" xmlns:p="http://schemas.openxmlformats.org/presentationml/2006/main">
+  <p:cSld>
+    <p:spTree>
+      <p:nvGrpSpPr>
+        <p:cNvPr id="1" name=""/>
+        <p:cNvGrpSpPr/>
+        <p:nvPr/>
+      </p:nvGrpSpPr>
+      <p:grpSpPr>
+        <a:xfrm>
+          <a:off x="0" y="0"/>
+          <a:ext cx="0" cy="0"/>
+          <a:chOff x="0" y="0"/>
+          <a:chExt cx="0" cy="0"/>
+        </a:xfrm>
+      </p:grpSpPr>
+      <p:sp>
+        <p:nvSpPr>
+          <p:cNvPr id="2" name="Slide Image Placeholder 1"/>
+          <p:cNvSpPr>
+            <a:spLocks noGrp="1" noRot="1" noChangeAspect="1"/>
+          </p:cNvSpPr>
+          <p:nvPr>
+            <p:ph type="sldImg"/>
+          </p:nvPr>
+        </p:nvSpPr>
+        <p:spPr/>
+      </p:sp>
+      <p:sp>
+        <p:nvSpPr>
+          <p:cNvPr id="3" name="Notes Placeholder 2"/>
+          <p:cNvSpPr>
+            <a:spLocks noGrp="1"/>
+          </p:cNvSpPr>
+          <p:nvPr>
+            <p:ph type="body" idx="1"/>
+          </p:nvPr>
+        </p:nvSpPr>
+        <p:spPr/>
+        <p:txBody>
+          <a:bodyPr/>
+          <a:lstStyle/>
+          <a:p>
+            <a:endParaRPr lang="en-US" baseline="0" dirty="0" smtClean="0"/>
+          </a:p>
+        </p:txBody>
+      </p:sp>
+      <p:sp>
+        <p:nvSpPr>
+          <p:cNvPr id="4" name="Slide Number Placeholder 3"/>
+          <p:cNvSpPr>
+            <a:spLocks noGrp="1"/>
+          </p:cNvSpPr>
+          <p:nvPr>
+            <p:ph type="sldNum" sz="quarter" idx="10"/>
+          </p:nvPr>
+        </p:nvSpPr>
+        <p:spPr/>
+        <p:txBody>
+          <a:bodyPr/>
+          <a:lstStyle/>
+          <a:p>
+            <a:fld id="{F535F173-C1DD-4975-94BF-5B9ED67F7674}" type="slidenum">
+              <a:rPr lang="en-US" smtClean="0"/>
+              <a:pPr/>
+              <a:t>12</a:t>
+            </a:fld>
+            <a:endParaRPr lang="en-US"/>
+          </a:p>
+        </p:txBody>
+      </p:sp>
+    </p:spTree>
+    <p:extLst>
+      <p:ext uri="{BB962C8B-B14F-4D97-AF65-F5344CB8AC3E}">
+        <p14:creationId xmlns:p14="http://schemas.microsoft.com/office/powerpoint/2010/main" val="1355792998"/>
+      </p:ext>
+    </p:extLst>
+  </p:cSld>
+  <p:clrMapOvr>
+    <a:masterClrMapping/>
+  </p:clrMapOvr>
+</p:notes>
+</file>
+
+<file path=ppt/notesSlides/notesSlide11.xml><?xml version="1.0" encoding="utf-8"?>
+<p:notes xmlns:a="http://schemas.openxmlformats.org/drawingml/2006/main" xmlns:r="http://schemas.openxmlformats.org/officeDocument/2006/relationships" xmlns:p="http://schemas.openxmlformats.org/presentationml/2006/main">
+  <p:cSld>
+    <p:spTree>
+      <p:nvGrpSpPr>
+        <p:cNvPr id="1" name=""/>
+        <p:cNvGrpSpPr/>
+        <p:nvPr/>
+      </p:nvGrpSpPr>
+      <p:grpSpPr>
+        <a:xfrm>
+          <a:off x="0" y="0"/>
+          <a:ext cx="0" cy="0"/>
+          <a:chOff x="0" y="0"/>
+          <a:chExt cx="0" cy="0"/>
+        </a:xfrm>
+      </p:grpSpPr>
+      <p:sp>
+        <p:nvSpPr>
+          <p:cNvPr id="2" name="Slide Image Placeholder 1"/>
+          <p:cNvSpPr>
+            <a:spLocks noGrp="1" noRot="1" noChangeAspect="1"/>
+          </p:cNvSpPr>
+          <p:nvPr>
+            <p:ph type="sldImg"/>
+          </p:nvPr>
+        </p:nvSpPr>
+        <p:spPr/>
+      </p:sp>
+      <p:sp>
+        <p:nvSpPr>
+          <p:cNvPr id="3" name="Notes Placeholder 2"/>
+          <p:cNvSpPr>
+            <a:spLocks noGrp="1"/>
+          </p:cNvSpPr>
+          <p:nvPr>
+            <p:ph type="body" idx="1"/>
+          </p:nvPr>
+        </p:nvSpPr>
+        <p:spPr/>
+        <p:txBody>
+          <a:bodyPr/>
+          <a:lstStyle/>
+          <a:p>
+            <a:endParaRPr lang="en-US" baseline="0" dirty="0" smtClean="0"/>
+          </a:p>
+        </p:txBody>
+      </p:sp>
+      <p:sp>
+        <p:nvSpPr>
+          <p:cNvPr id="4" name="Slide Number Placeholder 3"/>
+          <p:cNvSpPr>
+            <a:spLocks noGrp="1"/>
+          </p:cNvSpPr>
+          <p:nvPr>
+            <p:ph type="sldNum" sz="quarter" idx="10"/>
+          </p:nvPr>
+        </p:nvSpPr>
+        <p:spPr/>
+        <p:txBody>
+          <a:bodyPr/>
+          <a:lstStyle/>
+          <a:p>
+            <a:fld id="{F535F173-C1DD-4975-94BF-5B9ED67F7674}" type="slidenum">
+              <a:rPr lang="en-US" smtClean="0"/>
+              <a:pPr/>
+              <a:t>13</a:t>
+            </a:fld>
+            <a:endParaRPr lang="en-US"/>
+          </a:p>
+        </p:txBody>
+      </p:sp>
+    </p:spTree>
+    <p:extLst>
+      <p:ext uri="{BB962C8B-B14F-4D97-AF65-F5344CB8AC3E}">
+        <p14:creationId xmlns:p14="http://schemas.microsoft.com/office/powerpoint/2010/main" val="1355792998"/>
+      </p:ext>
+    </p:extLst>
+  </p:cSld>
+  <p:clrMapOvr>
+    <a:masterClrMapping/>
+  </p:clrMapOvr>
+</p:notes>
+</file>
+
+<file path=ppt/notesSlides/notesSlide12.xml><?xml version="1.0" encoding="utf-8"?>
+<p:notes xmlns:a="http://schemas.openxmlformats.org/drawingml/2006/main" xmlns:r="http://schemas.openxmlformats.org/officeDocument/2006/relationships" xmlns:p="http://schemas.openxmlformats.org/presentationml/2006/main">
+  <p:cSld>
+    <p:spTree>
+      <p:nvGrpSpPr>
+        <p:cNvPr id="1" name=""/>
+        <p:cNvGrpSpPr/>
+        <p:nvPr/>
+      </p:nvGrpSpPr>
+      <p:grpSpPr>
+        <a:xfrm>
+          <a:off x="0" y="0"/>
+          <a:ext cx="0" cy="0"/>
+          <a:chOff x="0" y="0"/>
+          <a:chExt cx="0" cy="0"/>
+        </a:xfrm>
+      </p:grpSpPr>
+      <p:sp>
+        <p:nvSpPr>
+          <p:cNvPr id="2" name="Slide Image Placeholder 1"/>
+          <p:cNvSpPr>
+            <a:spLocks noGrp="1" noRot="1" noChangeAspect="1"/>
+          </p:cNvSpPr>
+          <p:nvPr>
+            <p:ph type="sldImg"/>
+          </p:nvPr>
+        </p:nvSpPr>
+        <p:spPr/>
+      </p:sp>
+      <p:sp>
+        <p:nvSpPr>
+          <p:cNvPr id="3" name="Notes Placeholder 2"/>
+          <p:cNvSpPr>
+            <a:spLocks noGrp="1"/>
+          </p:cNvSpPr>
+          <p:nvPr>
+            <p:ph type="body" idx="1"/>
+          </p:nvPr>
+        </p:nvSpPr>
+        <p:spPr/>
+        <p:txBody>
+          <a:bodyPr/>
+          <a:lstStyle/>
+          <a:p>
+            <a:endParaRPr lang="en-US" baseline="0" dirty="0" smtClean="0"/>
+          </a:p>
+        </p:txBody>
+      </p:sp>
+      <p:sp>
+        <p:nvSpPr>
+          <p:cNvPr id="4" name="Slide Number Placeholder 3"/>
+          <p:cNvSpPr>
+            <a:spLocks noGrp="1"/>
+          </p:cNvSpPr>
+          <p:nvPr>
+            <p:ph type="sldNum" sz="quarter" idx="10"/>
+          </p:nvPr>
+        </p:nvSpPr>
+        <p:spPr/>
+        <p:txBody>
+          <a:bodyPr/>
+          <a:lstStyle/>
+          <a:p>
+            <a:fld id="{F535F173-C1DD-4975-94BF-5B9ED67F7674}" type="slidenum">
+              <a:rPr lang="en-US" smtClean="0"/>
+              <a:pPr/>
+              <a:t>15</a:t>
+            </a:fld>
+            <a:endParaRPr lang="en-US"/>
+          </a:p>
+        </p:txBody>
+      </p:sp>
+    </p:spTree>
+    <p:extLst>
+      <p:ext uri="{BB962C8B-B14F-4D97-AF65-F5344CB8AC3E}">
+        <p14:creationId xmlns:p14="http://schemas.microsoft.com/office/powerpoint/2010/main" val="1355792998"/>
+      </p:ext>
+    </p:extLst>
+  </p:cSld>
+  <p:clrMapOvr>
+    <a:masterClrMapping/>
+  </p:clrMapOvr>
+</p:notes>
+</file>
+
+<file path=ppt/notesSlides/notesSlide13.xml><?xml version="1.0" encoding="utf-8"?>
+<p:notes xmlns:a="http://schemas.openxmlformats.org/drawingml/2006/main" xmlns:r="http://schemas.openxmlformats.org/officeDocument/2006/relationships" xmlns:p="http://schemas.openxmlformats.org/presentationml/2006/main">
+  <p:cSld>
+    <p:spTree>
+      <p:nvGrpSpPr>
+        <p:cNvPr id="1" name=""/>
+        <p:cNvGrpSpPr/>
+        <p:nvPr/>
+      </p:nvGrpSpPr>
+      <p:grpSpPr>
+        <a:xfrm>
+          <a:off x="0" y="0"/>
+          <a:ext cx="0" cy="0"/>
+          <a:chOff x="0" y="0"/>
+          <a:chExt cx="0" cy="0"/>
+        </a:xfrm>
+      </p:grpSpPr>
+      <p:sp>
+        <p:nvSpPr>
+          <p:cNvPr id="2" name="Slide Image Placeholder 1"/>
+          <p:cNvSpPr>
+            <a:spLocks noGrp="1" noRot="1" noChangeAspect="1"/>
+          </p:cNvSpPr>
+          <p:nvPr>
+            <p:ph type="sldImg"/>
+          </p:nvPr>
+        </p:nvSpPr>
+        <p:spPr/>
+      </p:sp>
+      <p:sp>
+        <p:nvSpPr>
+          <p:cNvPr id="3" name="Notes Placeholder 2"/>
+          <p:cNvSpPr>
+            <a:spLocks noGrp="1"/>
+          </p:cNvSpPr>
+          <p:nvPr>
+            <p:ph type="body" idx="1"/>
+          </p:nvPr>
+        </p:nvSpPr>
+        <p:spPr/>
+        <p:txBody>
+          <a:bodyPr/>
+          <a:lstStyle/>
+          <a:p>
+            <a:endParaRPr lang="en-US" baseline="0" dirty="0" smtClean="0"/>
+          </a:p>
+        </p:txBody>
+      </p:sp>
+      <p:sp>
+        <p:nvSpPr>
+          <p:cNvPr id="4" name="Slide Number Placeholder 3"/>
+          <p:cNvSpPr>
+            <a:spLocks noGrp="1"/>
+          </p:cNvSpPr>
+          <p:nvPr>
+            <p:ph type="sldNum" sz="quarter" idx="10"/>
+          </p:nvPr>
+        </p:nvSpPr>
+        <p:spPr/>
+        <p:txBody>
+          <a:bodyPr/>
+          <a:lstStyle/>
+          <a:p>
+            <a:fld id="{F535F173-C1DD-4975-94BF-5B9ED67F7674}" type="slidenum">
+              <a:rPr lang="en-US" smtClean="0"/>
+              <a:pPr/>
+              <a:t>16</a:t>
+            </a:fld>
+            <a:endParaRPr lang="en-US"/>
+          </a:p>
+        </p:txBody>
+      </p:sp>
+    </p:spTree>
+    <p:extLst>
+      <p:ext uri="{BB962C8B-B14F-4D97-AF65-F5344CB8AC3E}">
+        <p14:creationId xmlns:p14="http://schemas.microsoft.com/office/powerpoint/2010/main" val="1355792998"/>
+      </p:ext>
+    </p:extLst>
+  </p:cSld>
+  <p:clrMapOvr>
+    <a:masterClrMapping/>
+  </p:clrMapOvr>
+</p:notes>
+</file>
+
 <file path=ppt/notesSlides/notesSlide2.xml><?xml version="1.0" encoding="utf-8"?>
 <p:notes xmlns:a="http://schemas.openxmlformats.org/drawingml/2006/main" xmlns:r="http://schemas.openxmlformats.org/officeDocument/2006/relationships" xmlns:p="http://schemas.openxmlformats.org/presentationml/2006/main">
   <p:cSld>
@@ -890,7 +1683,7 @@
             <a:fld id="{F535F173-C1DD-4975-94BF-5B9ED67F7674}" type="slidenum">
               <a:rPr lang="en-US" smtClean="0"/>
               <a:pPr/>
-              <a:t>6</a:t>
+              <a:t>5</a:t>
             </a:fld>
             <a:endParaRPr lang="en-US"/>
           </a:p>
@@ -975,7 +1768,432 @@
             <a:fld id="{F535F173-C1DD-4975-94BF-5B9ED67F7674}" type="slidenum">
               <a:rPr lang="en-US" smtClean="0"/>
               <a:pPr/>
+              <a:t>6</a:t>
+            </a:fld>
+            <a:endParaRPr lang="en-US"/>
+          </a:p>
+        </p:txBody>
+      </p:sp>
+    </p:spTree>
+    <p:extLst>
+      <p:ext uri="{BB962C8B-B14F-4D97-AF65-F5344CB8AC3E}">
+        <p14:creationId xmlns:p14="http://schemas.microsoft.com/office/powerpoint/2010/main" val="1355792998"/>
+      </p:ext>
+    </p:extLst>
+  </p:cSld>
+  <p:clrMapOvr>
+    <a:masterClrMapping/>
+  </p:clrMapOvr>
+</p:notes>
+</file>
+
+<file path=ppt/notesSlides/notesSlide5.xml><?xml version="1.0" encoding="utf-8"?>
+<p:notes xmlns:a="http://schemas.openxmlformats.org/drawingml/2006/main" xmlns:r="http://schemas.openxmlformats.org/officeDocument/2006/relationships" xmlns:p="http://schemas.openxmlformats.org/presentationml/2006/main">
+  <p:cSld>
+    <p:spTree>
+      <p:nvGrpSpPr>
+        <p:cNvPr id="1" name=""/>
+        <p:cNvGrpSpPr/>
+        <p:nvPr/>
+      </p:nvGrpSpPr>
+      <p:grpSpPr>
+        <a:xfrm>
+          <a:off x="0" y="0"/>
+          <a:ext cx="0" cy="0"/>
+          <a:chOff x="0" y="0"/>
+          <a:chExt cx="0" cy="0"/>
+        </a:xfrm>
+      </p:grpSpPr>
+      <p:sp>
+        <p:nvSpPr>
+          <p:cNvPr id="2" name="Slide Image Placeholder 1"/>
+          <p:cNvSpPr>
+            <a:spLocks noGrp="1" noRot="1" noChangeAspect="1"/>
+          </p:cNvSpPr>
+          <p:nvPr>
+            <p:ph type="sldImg"/>
+          </p:nvPr>
+        </p:nvSpPr>
+        <p:spPr/>
+      </p:sp>
+      <p:sp>
+        <p:nvSpPr>
+          <p:cNvPr id="3" name="Notes Placeholder 2"/>
+          <p:cNvSpPr>
+            <a:spLocks noGrp="1"/>
+          </p:cNvSpPr>
+          <p:nvPr>
+            <p:ph type="body" idx="1"/>
+          </p:nvPr>
+        </p:nvSpPr>
+        <p:spPr/>
+        <p:txBody>
+          <a:bodyPr/>
+          <a:lstStyle/>
+          <a:p>
+            <a:endParaRPr lang="en-US" baseline="0" dirty="0" smtClean="0"/>
+          </a:p>
+        </p:txBody>
+      </p:sp>
+      <p:sp>
+        <p:nvSpPr>
+          <p:cNvPr id="4" name="Slide Number Placeholder 3"/>
+          <p:cNvSpPr>
+            <a:spLocks noGrp="1"/>
+          </p:cNvSpPr>
+          <p:nvPr>
+            <p:ph type="sldNum" sz="quarter" idx="10"/>
+          </p:nvPr>
+        </p:nvSpPr>
+        <p:spPr/>
+        <p:txBody>
+          <a:bodyPr/>
+          <a:lstStyle/>
+          <a:p>
+            <a:fld id="{F535F173-C1DD-4975-94BF-5B9ED67F7674}" type="slidenum">
+              <a:rPr lang="en-US" smtClean="0"/>
+              <a:pPr/>
               <a:t>7</a:t>
+            </a:fld>
+            <a:endParaRPr lang="en-US"/>
+          </a:p>
+        </p:txBody>
+      </p:sp>
+    </p:spTree>
+    <p:extLst>
+      <p:ext uri="{BB962C8B-B14F-4D97-AF65-F5344CB8AC3E}">
+        <p14:creationId xmlns:p14="http://schemas.microsoft.com/office/powerpoint/2010/main" val="1355792998"/>
+      </p:ext>
+    </p:extLst>
+  </p:cSld>
+  <p:clrMapOvr>
+    <a:masterClrMapping/>
+  </p:clrMapOvr>
+</p:notes>
+</file>
+
+<file path=ppt/notesSlides/notesSlide6.xml><?xml version="1.0" encoding="utf-8"?>
+<p:notes xmlns:a="http://schemas.openxmlformats.org/drawingml/2006/main" xmlns:r="http://schemas.openxmlformats.org/officeDocument/2006/relationships" xmlns:p="http://schemas.openxmlformats.org/presentationml/2006/main">
+  <p:cSld>
+    <p:spTree>
+      <p:nvGrpSpPr>
+        <p:cNvPr id="1" name=""/>
+        <p:cNvGrpSpPr/>
+        <p:nvPr/>
+      </p:nvGrpSpPr>
+      <p:grpSpPr>
+        <a:xfrm>
+          <a:off x="0" y="0"/>
+          <a:ext cx="0" cy="0"/>
+          <a:chOff x="0" y="0"/>
+          <a:chExt cx="0" cy="0"/>
+        </a:xfrm>
+      </p:grpSpPr>
+      <p:sp>
+        <p:nvSpPr>
+          <p:cNvPr id="2" name="Slide Image Placeholder 1"/>
+          <p:cNvSpPr>
+            <a:spLocks noGrp="1" noRot="1" noChangeAspect="1"/>
+          </p:cNvSpPr>
+          <p:nvPr>
+            <p:ph type="sldImg"/>
+          </p:nvPr>
+        </p:nvSpPr>
+        <p:spPr/>
+      </p:sp>
+      <p:sp>
+        <p:nvSpPr>
+          <p:cNvPr id="3" name="Notes Placeholder 2"/>
+          <p:cNvSpPr>
+            <a:spLocks noGrp="1"/>
+          </p:cNvSpPr>
+          <p:nvPr>
+            <p:ph type="body" idx="1"/>
+          </p:nvPr>
+        </p:nvSpPr>
+        <p:spPr/>
+        <p:txBody>
+          <a:bodyPr/>
+          <a:lstStyle/>
+          <a:p>
+            <a:endParaRPr lang="en-US" baseline="0" dirty="0" smtClean="0"/>
+          </a:p>
+        </p:txBody>
+      </p:sp>
+      <p:sp>
+        <p:nvSpPr>
+          <p:cNvPr id="4" name="Slide Number Placeholder 3"/>
+          <p:cNvSpPr>
+            <a:spLocks noGrp="1"/>
+          </p:cNvSpPr>
+          <p:nvPr>
+            <p:ph type="sldNum" sz="quarter" idx="10"/>
+          </p:nvPr>
+        </p:nvSpPr>
+        <p:spPr/>
+        <p:txBody>
+          <a:bodyPr/>
+          <a:lstStyle/>
+          <a:p>
+            <a:fld id="{F535F173-C1DD-4975-94BF-5B9ED67F7674}" type="slidenum">
+              <a:rPr lang="en-US" smtClean="0"/>
+              <a:pPr/>
+              <a:t>8</a:t>
+            </a:fld>
+            <a:endParaRPr lang="en-US"/>
+          </a:p>
+        </p:txBody>
+      </p:sp>
+    </p:spTree>
+    <p:extLst>
+      <p:ext uri="{BB962C8B-B14F-4D97-AF65-F5344CB8AC3E}">
+        <p14:creationId xmlns:p14="http://schemas.microsoft.com/office/powerpoint/2010/main" val="1355792998"/>
+      </p:ext>
+    </p:extLst>
+  </p:cSld>
+  <p:clrMapOvr>
+    <a:masterClrMapping/>
+  </p:clrMapOvr>
+</p:notes>
+</file>
+
+<file path=ppt/notesSlides/notesSlide7.xml><?xml version="1.0" encoding="utf-8"?>
+<p:notes xmlns:a="http://schemas.openxmlformats.org/drawingml/2006/main" xmlns:r="http://schemas.openxmlformats.org/officeDocument/2006/relationships" xmlns:p="http://schemas.openxmlformats.org/presentationml/2006/main">
+  <p:cSld>
+    <p:spTree>
+      <p:nvGrpSpPr>
+        <p:cNvPr id="1" name=""/>
+        <p:cNvGrpSpPr/>
+        <p:nvPr/>
+      </p:nvGrpSpPr>
+      <p:grpSpPr>
+        <a:xfrm>
+          <a:off x="0" y="0"/>
+          <a:ext cx="0" cy="0"/>
+          <a:chOff x="0" y="0"/>
+          <a:chExt cx="0" cy="0"/>
+        </a:xfrm>
+      </p:grpSpPr>
+      <p:sp>
+        <p:nvSpPr>
+          <p:cNvPr id="2" name="Slide Image Placeholder 1"/>
+          <p:cNvSpPr>
+            <a:spLocks noGrp="1" noRot="1" noChangeAspect="1"/>
+          </p:cNvSpPr>
+          <p:nvPr>
+            <p:ph type="sldImg"/>
+          </p:nvPr>
+        </p:nvSpPr>
+        <p:spPr/>
+      </p:sp>
+      <p:sp>
+        <p:nvSpPr>
+          <p:cNvPr id="3" name="Notes Placeholder 2"/>
+          <p:cNvSpPr>
+            <a:spLocks noGrp="1"/>
+          </p:cNvSpPr>
+          <p:nvPr>
+            <p:ph type="body" idx="1"/>
+          </p:nvPr>
+        </p:nvSpPr>
+        <p:spPr/>
+        <p:txBody>
+          <a:bodyPr/>
+          <a:lstStyle/>
+          <a:p>
+            <a:endParaRPr lang="en-US" baseline="0" dirty="0" smtClean="0"/>
+          </a:p>
+        </p:txBody>
+      </p:sp>
+      <p:sp>
+        <p:nvSpPr>
+          <p:cNvPr id="4" name="Slide Number Placeholder 3"/>
+          <p:cNvSpPr>
+            <a:spLocks noGrp="1"/>
+          </p:cNvSpPr>
+          <p:nvPr>
+            <p:ph type="sldNum" sz="quarter" idx="10"/>
+          </p:nvPr>
+        </p:nvSpPr>
+        <p:spPr/>
+        <p:txBody>
+          <a:bodyPr/>
+          <a:lstStyle/>
+          <a:p>
+            <a:fld id="{F535F173-C1DD-4975-94BF-5B9ED67F7674}" type="slidenum">
+              <a:rPr lang="en-US" smtClean="0"/>
+              <a:pPr/>
+              <a:t>9</a:t>
+            </a:fld>
+            <a:endParaRPr lang="en-US"/>
+          </a:p>
+        </p:txBody>
+      </p:sp>
+    </p:spTree>
+    <p:extLst>
+      <p:ext uri="{BB962C8B-B14F-4D97-AF65-F5344CB8AC3E}">
+        <p14:creationId xmlns:p14="http://schemas.microsoft.com/office/powerpoint/2010/main" val="1355792998"/>
+      </p:ext>
+    </p:extLst>
+  </p:cSld>
+  <p:clrMapOvr>
+    <a:masterClrMapping/>
+  </p:clrMapOvr>
+</p:notes>
+</file>
+
+<file path=ppt/notesSlides/notesSlide8.xml><?xml version="1.0" encoding="utf-8"?>
+<p:notes xmlns:a="http://schemas.openxmlformats.org/drawingml/2006/main" xmlns:r="http://schemas.openxmlformats.org/officeDocument/2006/relationships" xmlns:p="http://schemas.openxmlformats.org/presentationml/2006/main">
+  <p:cSld>
+    <p:spTree>
+      <p:nvGrpSpPr>
+        <p:cNvPr id="1" name=""/>
+        <p:cNvGrpSpPr/>
+        <p:nvPr/>
+      </p:nvGrpSpPr>
+      <p:grpSpPr>
+        <a:xfrm>
+          <a:off x="0" y="0"/>
+          <a:ext cx="0" cy="0"/>
+          <a:chOff x="0" y="0"/>
+          <a:chExt cx="0" cy="0"/>
+        </a:xfrm>
+      </p:grpSpPr>
+      <p:sp>
+        <p:nvSpPr>
+          <p:cNvPr id="2" name="Slide Image Placeholder 1"/>
+          <p:cNvSpPr>
+            <a:spLocks noGrp="1" noRot="1" noChangeAspect="1"/>
+          </p:cNvSpPr>
+          <p:nvPr>
+            <p:ph type="sldImg"/>
+          </p:nvPr>
+        </p:nvSpPr>
+        <p:spPr/>
+      </p:sp>
+      <p:sp>
+        <p:nvSpPr>
+          <p:cNvPr id="3" name="Notes Placeholder 2"/>
+          <p:cNvSpPr>
+            <a:spLocks noGrp="1"/>
+          </p:cNvSpPr>
+          <p:nvPr>
+            <p:ph type="body" idx="1"/>
+          </p:nvPr>
+        </p:nvSpPr>
+        <p:spPr/>
+        <p:txBody>
+          <a:bodyPr/>
+          <a:lstStyle/>
+          <a:p>
+            <a:endParaRPr lang="en-US" baseline="0" dirty="0" smtClean="0"/>
+          </a:p>
+        </p:txBody>
+      </p:sp>
+      <p:sp>
+        <p:nvSpPr>
+          <p:cNvPr id="4" name="Slide Number Placeholder 3"/>
+          <p:cNvSpPr>
+            <a:spLocks noGrp="1"/>
+          </p:cNvSpPr>
+          <p:nvPr>
+            <p:ph type="sldNum" sz="quarter" idx="10"/>
+          </p:nvPr>
+        </p:nvSpPr>
+        <p:spPr/>
+        <p:txBody>
+          <a:bodyPr/>
+          <a:lstStyle/>
+          <a:p>
+            <a:fld id="{F535F173-C1DD-4975-94BF-5B9ED67F7674}" type="slidenum">
+              <a:rPr lang="en-US" smtClean="0"/>
+              <a:pPr/>
+              <a:t>10</a:t>
+            </a:fld>
+            <a:endParaRPr lang="en-US"/>
+          </a:p>
+        </p:txBody>
+      </p:sp>
+    </p:spTree>
+    <p:extLst>
+      <p:ext uri="{BB962C8B-B14F-4D97-AF65-F5344CB8AC3E}">
+        <p14:creationId xmlns:p14="http://schemas.microsoft.com/office/powerpoint/2010/main" val="1355792998"/>
+      </p:ext>
+    </p:extLst>
+  </p:cSld>
+  <p:clrMapOvr>
+    <a:masterClrMapping/>
+  </p:clrMapOvr>
+</p:notes>
+</file>
+
+<file path=ppt/notesSlides/notesSlide9.xml><?xml version="1.0" encoding="utf-8"?>
+<p:notes xmlns:a="http://schemas.openxmlformats.org/drawingml/2006/main" xmlns:r="http://schemas.openxmlformats.org/officeDocument/2006/relationships" xmlns:p="http://schemas.openxmlformats.org/presentationml/2006/main">
+  <p:cSld>
+    <p:spTree>
+      <p:nvGrpSpPr>
+        <p:cNvPr id="1" name=""/>
+        <p:cNvGrpSpPr/>
+        <p:nvPr/>
+      </p:nvGrpSpPr>
+      <p:grpSpPr>
+        <a:xfrm>
+          <a:off x="0" y="0"/>
+          <a:ext cx="0" cy="0"/>
+          <a:chOff x="0" y="0"/>
+          <a:chExt cx="0" cy="0"/>
+        </a:xfrm>
+      </p:grpSpPr>
+      <p:sp>
+        <p:nvSpPr>
+          <p:cNvPr id="2" name="Slide Image Placeholder 1"/>
+          <p:cNvSpPr>
+            <a:spLocks noGrp="1" noRot="1" noChangeAspect="1"/>
+          </p:cNvSpPr>
+          <p:nvPr>
+            <p:ph type="sldImg"/>
+          </p:nvPr>
+        </p:nvSpPr>
+        <p:spPr/>
+      </p:sp>
+      <p:sp>
+        <p:nvSpPr>
+          <p:cNvPr id="3" name="Notes Placeholder 2"/>
+          <p:cNvSpPr>
+            <a:spLocks noGrp="1"/>
+          </p:cNvSpPr>
+          <p:nvPr>
+            <p:ph type="body" idx="1"/>
+          </p:nvPr>
+        </p:nvSpPr>
+        <p:spPr/>
+        <p:txBody>
+          <a:bodyPr/>
+          <a:lstStyle/>
+          <a:p>
+            <a:endParaRPr lang="en-US" baseline="0" dirty="0" smtClean="0"/>
+          </a:p>
+        </p:txBody>
+      </p:sp>
+      <p:sp>
+        <p:nvSpPr>
+          <p:cNvPr id="4" name="Slide Number Placeholder 3"/>
+          <p:cNvSpPr>
+            <a:spLocks noGrp="1"/>
+          </p:cNvSpPr>
+          <p:nvPr>
+            <p:ph type="sldNum" sz="quarter" idx="10"/>
+          </p:nvPr>
+        </p:nvSpPr>
+        <p:spPr/>
+        <p:txBody>
+          <a:bodyPr/>
+          <a:lstStyle/>
+          <a:p>
+            <a:fld id="{F535F173-C1DD-4975-94BF-5B9ED67F7674}" type="slidenum">
+              <a:rPr lang="en-US" smtClean="0"/>
+              <a:pPr/>
+              <a:t>11</a:t>
             </a:fld>
             <a:endParaRPr lang="en-US"/>
           </a:p>
@@ -3270,11 +4488,6 @@
               </a:rPr>
               <a:t>G01-A</a:t>
             </a:r>
-            <a:endParaRPr lang="pt-PT" sz="4600" dirty="0" smtClean="0">
-              <a:solidFill>
-                <a:schemeClr val="bg2"/>
-              </a:solidFill>
-            </a:endParaRPr>
           </a:p>
         </p:txBody>
       </p:sp>
@@ -3471,15 +4684,1755 @@
               </a:rPr>
               <a:t>76394 – Daniel Trindade</a:t>
             </a:r>
-            <a:endParaRPr lang="pt-PT" sz="2400" b="0" dirty="0">
+          </a:p>
+        </p:txBody>
+      </p:sp>
+    </p:spTree>
+  </p:cSld>
+  <p:clrMapOvr>
+    <a:masterClrMapping/>
+  </p:clrMapOvr>
+  <p:timing>
+    <p:tnLst>
+      <p:par>
+        <p:cTn id="1" dur="indefinite" restart="never" nodeType="tmRoot"/>
+      </p:par>
+    </p:tnLst>
+  </p:timing>
+</p:sld>
+</file>
+
+<file path=ppt/slides/slide10.xml><?xml version="1.0" encoding="utf-8"?>
+<p:sld xmlns:a="http://schemas.openxmlformats.org/drawingml/2006/main" xmlns:r="http://schemas.openxmlformats.org/officeDocument/2006/relationships" xmlns:p="http://schemas.openxmlformats.org/presentationml/2006/main">
+  <p:cSld>
+    <p:spTree>
+      <p:nvGrpSpPr>
+        <p:cNvPr id="1" name=""/>
+        <p:cNvGrpSpPr/>
+        <p:nvPr/>
+      </p:nvGrpSpPr>
+      <p:grpSpPr>
+        <a:xfrm>
+          <a:off x="0" y="0"/>
+          <a:ext cx="0" cy="0"/>
+          <a:chOff x="0" y="0"/>
+          <a:chExt cx="0" cy="0"/>
+        </a:xfrm>
+      </p:grpSpPr>
+      <p:sp>
+        <p:nvSpPr>
+          <p:cNvPr id="2" name="Title 1"/>
+          <p:cNvSpPr>
+            <a:spLocks noGrp="1"/>
+          </p:cNvSpPr>
+          <p:nvPr>
+            <p:ph type="title"/>
+          </p:nvPr>
+        </p:nvSpPr>
+        <p:spPr>
+          <a:xfrm>
+            <a:off x="-32" y="0"/>
+            <a:ext cx="9144032" cy="857256"/>
+          </a:xfrm>
+        </p:spPr>
+        <p:txBody>
+          <a:bodyPr/>
+          <a:lstStyle/>
+          <a:p>
+            <a:r>
+              <a:rPr lang="en-US" dirty="0" smtClean="0"/>
+              <a:t>Visual </a:t>
+            </a:r>
+            <a:r>
+              <a:rPr lang="en-US" dirty="0" smtClean="0"/>
+              <a:t>Encoding – Item 3</a:t>
+            </a:r>
+            <a:endParaRPr lang="pt-PT" dirty="0"/>
+          </a:p>
+        </p:txBody>
+      </p:sp>
+      <p:sp>
+        <p:nvSpPr>
+          <p:cNvPr id="3" name="Content Placeholder 2"/>
+          <p:cNvSpPr>
+            <a:spLocks noGrp="1"/>
+          </p:cNvSpPr>
+          <p:nvPr>
+            <p:ph idx="1"/>
+          </p:nvPr>
+        </p:nvSpPr>
+        <p:spPr/>
+        <p:txBody>
+          <a:bodyPr>
+            <a:noAutofit/>
+          </a:bodyPr>
+          <a:lstStyle/>
+          <a:p>
+            <a:pPr algn="ctr"/>
+            <a:r>
+              <a:rPr lang="en-US" sz="4000" dirty="0" smtClean="0"/>
+              <a:t>Compare result</a:t>
+            </a:r>
+            <a:endParaRPr lang="en-US" sz="4000" dirty="0" smtClean="0"/>
+          </a:p>
+        </p:txBody>
+      </p:sp>
+      <p:pic>
+        <p:nvPicPr>
+          <p:cNvPr id="4098" name="Picture 2"/>
+          <p:cNvPicPr>
+            <a:picLocks noChangeAspect="1" noChangeArrowheads="1"/>
+          </p:cNvPicPr>
+          <p:nvPr/>
+        </p:nvPicPr>
+        <p:blipFill>
+          <a:blip r:embed="rId3">
+            <a:extLst>
+              <a:ext uri="{28A0092B-C50C-407E-A947-70E740481C1C}">
+                <a14:useLocalDpi xmlns:a14="http://schemas.microsoft.com/office/drawing/2010/main" val="0"/>
+              </a:ext>
+            </a:extLst>
+          </a:blip>
+          <a:srcRect/>
+          <a:stretch>
+            <a:fillRect/>
+          </a:stretch>
+        </p:blipFill>
+        <p:spPr bwMode="auto">
+          <a:xfrm>
+            <a:off x="1030982" y="2060848"/>
+            <a:ext cx="7046913" cy="4518025"/>
+          </a:xfrm>
+          <a:prstGeom prst="rect">
+            <a:avLst/>
+          </a:prstGeom>
+          <a:noFill/>
+          <a:ln>
+            <a:noFill/>
+          </a:ln>
+          <a:effectLst/>
+          <a:extLst>
+            <a:ext uri="{909E8E84-426E-40DD-AFC4-6F175D3DCCD1}">
+              <a14:hiddenFill xmlns:a14="http://schemas.microsoft.com/office/drawing/2010/main">
+                <a:solidFill>
+                  <a:schemeClr val="accent1"/>
+                </a:solidFill>
+              </a14:hiddenFill>
+            </a:ext>
+            <a:ext uri="{91240B29-F687-4F45-9708-019B960494DF}">
+              <a14:hiddenLine xmlns:a14="http://schemas.microsoft.com/office/drawing/2010/main" w="9525">
+                <a:solidFill>
+                  <a:schemeClr val="tx1"/>
+                </a:solidFill>
+                <a:miter lim="800000"/>
+                <a:headEnd/>
+                <a:tailEnd/>
+              </a14:hiddenLine>
+            </a:ext>
+            <a:ext uri="{AF507438-7753-43E0-B8FC-AC1667EBCBE1}">
+              <a14:hiddenEffects xmlns:a14="http://schemas.microsoft.com/office/drawing/2010/main">
+                <a:effectLst>
+                  <a:outerShdw dist="35921" dir="2700000" algn="ctr" rotWithShape="0">
+                    <a:schemeClr val="bg2"/>
+                  </a:outerShdw>
+                </a:effectLst>
+              </a14:hiddenEffects>
+            </a:ext>
+          </a:extLst>
+        </p:spPr>
+      </p:pic>
+      <p:cxnSp>
+        <p:nvCxnSpPr>
+          <p:cNvPr id="5" name="Conexão recta unidireccional 4"/>
+          <p:cNvCxnSpPr/>
+          <p:nvPr/>
+        </p:nvCxnSpPr>
+        <p:spPr>
+          <a:xfrm flipH="1">
+            <a:off x="4355976" y="2636912"/>
+            <a:ext cx="4104456" cy="1296144"/>
+          </a:xfrm>
+          <a:prstGeom prst="straightConnector1">
+            <a:avLst/>
+          </a:prstGeom>
+          <a:ln>
+            <a:solidFill>
+              <a:srgbClr val="FF0000"/>
+            </a:solidFill>
+            <a:tailEnd type="arrow"/>
+          </a:ln>
+        </p:spPr>
+        <p:style>
+          <a:lnRef idx="1">
+            <a:schemeClr val="accent1"/>
+          </a:lnRef>
+          <a:fillRef idx="0">
+            <a:schemeClr val="accent1"/>
+          </a:fillRef>
+          <a:effectRef idx="0">
+            <a:schemeClr val="accent1"/>
+          </a:effectRef>
+          <a:fontRef idx="minor">
+            <a:schemeClr val="tx1"/>
+          </a:fontRef>
+        </p:style>
+      </p:cxnSp>
+      <p:cxnSp>
+        <p:nvCxnSpPr>
+          <p:cNvPr id="7" name="Conexão recta unidireccional 6"/>
+          <p:cNvCxnSpPr/>
+          <p:nvPr/>
+        </p:nvCxnSpPr>
+        <p:spPr>
+          <a:xfrm>
+            <a:off x="755576" y="4941168"/>
+            <a:ext cx="2556284" cy="0"/>
+          </a:xfrm>
+          <a:prstGeom prst="straightConnector1">
+            <a:avLst/>
+          </a:prstGeom>
+          <a:ln>
+            <a:tailEnd type="arrow"/>
+          </a:ln>
+        </p:spPr>
+        <p:style>
+          <a:lnRef idx="1">
+            <a:schemeClr val="accent1"/>
+          </a:lnRef>
+          <a:fillRef idx="0">
+            <a:schemeClr val="accent1"/>
+          </a:fillRef>
+          <a:effectRef idx="0">
+            <a:schemeClr val="accent1"/>
+          </a:effectRef>
+          <a:fontRef idx="minor">
+            <a:schemeClr val="tx1"/>
+          </a:fontRef>
+        </p:style>
+      </p:cxnSp>
+    </p:spTree>
+    <p:extLst>
+      <p:ext uri="{BB962C8B-B14F-4D97-AF65-F5344CB8AC3E}">
+        <p14:creationId xmlns:p14="http://schemas.microsoft.com/office/powerpoint/2010/main" val="3283491597"/>
+      </p:ext>
+    </p:extLst>
+  </p:cSld>
+  <p:clrMapOvr>
+    <a:masterClrMapping/>
+  </p:clrMapOvr>
+  <p:timing>
+    <p:tnLst>
+      <p:par>
+        <p:cTn id="1" dur="indefinite" restart="never" nodeType="tmRoot"/>
+      </p:par>
+    </p:tnLst>
+  </p:timing>
+</p:sld>
+</file>
+
+<file path=ppt/slides/slide11.xml><?xml version="1.0" encoding="utf-8"?>
+<p:sld xmlns:a="http://schemas.openxmlformats.org/drawingml/2006/main" xmlns:r="http://schemas.openxmlformats.org/officeDocument/2006/relationships" xmlns:p="http://schemas.openxmlformats.org/presentationml/2006/main">
+  <p:cSld>
+    <p:spTree>
+      <p:nvGrpSpPr>
+        <p:cNvPr id="1" name=""/>
+        <p:cNvGrpSpPr/>
+        <p:nvPr/>
+      </p:nvGrpSpPr>
+      <p:grpSpPr>
+        <a:xfrm>
+          <a:off x="0" y="0"/>
+          <a:ext cx="0" cy="0"/>
+          <a:chOff x="0" y="0"/>
+          <a:chExt cx="0" cy="0"/>
+        </a:xfrm>
+      </p:grpSpPr>
+      <p:sp>
+        <p:nvSpPr>
+          <p:cNvPr id="2" name="Title 1"/>
+          <p:cNvSpPr>
+            <a:spLocks noGrp="1"/>
+          </p:cNvSpPr>
+          <p:nvPr>
+            <p:ph type="title"/>
+          </p:nvPr>
+        </p:nvSpPr>
+        <p:spPr>
+          <a:xfrm>
+            <a:off x="-32" y="0"/>
+            <a:ext cx="9144032" cy="857256"/>
+          </a:xfrm>
+        </p:spPr>
+        <p:txBody>
+          <a:bodyPr/>
+          <a:lstStyle/>
+          <a:p>
+            <a:r>
+              <a:rPr lang="en-US" dirty="0" smtClean="0"/>
+              <a:t>Visual </a:t>
+            </a:r>
+            <a:r>
+              <a:rPr lang="en-US" dirty="0" smtClean="0"/>
+              <a:t>Encoding – Item 3</a:t>
+            </a:r>
+            <a:endParaRPr lang="pt-PT" dirty="0"/>
+          </a:p>
+        </p:txBody>
+      </p:sp>
+      <p:sp>
+        <p:nvSpPr>
+          <p:cNvPr id="3" name="Content Placeholder 2"/>
+          <p:cNvSpPr>
+            <a:spLocks noGrp="1"/>
+          </p:cNvSpPr>
+          <p:nvPr>
+            <p:ph idx="1"/>
+          </p:nvPr>
+        </p:nvSpPr>
+        <p:spPr/>
+        <p:txBody>
+          <a:bodyPr>
+            <a:noAutofit/>
+          </a:bodyPr>
+          <a:lstStyle/>
+          <a:p>
+            <a:pPr algn="ctr"/>
+            <a:r>
+              <a:rPr lang="en-US" sz="4000" dirty="0" smtClean="0"/>
+              <a:t>Compare result</a:t>
+            </a:r>
+          </a:p>
+          <a:p>
+            <a:r>
+              <a:rPr lang="en-US" sz="4000" dirty="0"/>
+              <a:t>Type:</a:t>
+            </a:r>
+          </a:p>
+          <a:p>
+            <a:pPr marL="971550" lvl="1" indent="-571500">
+              <a:buFont typeface="Arial" panose="020B0604020202020204" pitchFamily="34" charset="0"/>
+              <a:buChar char="•"/>
+            </a:pPr>
+            <a:r>
+              <a:rPr lang="en-US" sz="3600" dirty="0" smtClean="0"/>
+              <a:t>Colors</a:t>
+            </a:r>
+            <a:endParaRPr lang="en-US" sz="3600" dirty="0"/>
+          </a:p>
+          <a:p>
+            <a:pPr marL="971550" lvl="1" indent="-571500">
+              <a:buFont typeface="Arial" panose="020B0604020202020204" pitchFamily="34" charset="0"/>
+              <a:buChar char="•"/>
+            </a:pPr>
+            <a:r>
+              <a:rPr lang="en-US" sz="3600" dirty="0" smtClean="0"/>
+              <a:t>Pattern Textures</a:t>
+            </a:r>
+          </a:p>
+          <a:p>
+            <a:pPr marL="971550" lvl="1" indent="-571500">
+              <a:buFont typeface="Arial" panose="020B0604020202020204" pitchFamily="34" charset="0"/>
+              <a:buChar char="•"/>
+            </a:pPr>
+            <a:r>
+              <a:rPr lang="en-US" sz="3600" dirty="0" smtClean="0"/>
+              <a:t>Area/Size</a:t>
+            </a:r>
+          </a:p>
+          <a:p>
+            <a:pPr marL="971550" lvl="1" indent="-571500">
+              <a:buFont typeface="Arial" panose="020B0604020202020204" pitchFamily="34" charset="0"/>
+              <a:buChar char="•"/>
+            </a:pPr>
+            <a:r>
+              <a:rPr lang="en-US" sz="3600" dirty="0" smtClean="0"/>
+              <a:t>Text Labels</a:t>
+            </a:r>
+          </a:p>
+          <a:p>
+            <a:pPr marL="971550" lvl="1" indent="-571500">
+              <a:buFont typeface="Arial" panose="020B0604020202020204" pitchFamily="34" charset="0"/>
+              <a:buChar char="•"/>
+            </a:pPr>
+            <a:r>
+              <a:rPr lang="en-US" sz="3600" dirty="0" smtClean="0"/>
+              <a:t>Length</a:t>
+            </a:r>
+            <a:endParaRPr lang="en-US" sz="3600" dirty="0"/>
+          </a:p>
+          <a:p>
+            <a:pPr algn="ctr"/>
+            <a:endParaRPr lang="en-US" sz="4000" dirty="0" smtClean="0"/>
+          </a:p>
+        </p:txBody>
+      </p:sp>
+    </p:spTree>
+    <p:extLst>
+      <p:ext uri="{BB962C8B-B14F-4D97-AF65-F5344CB8AC3E}">
+        <p14:creationId xmlns:p14="http://schemas.microsoft.com/office/powerpoint/2010/main" val="610750790"/>
+      </p:ext>
+    </p:extLst>
+  </p:cSld>
+  <p:clrMapOvr>
+    <a:masterClrMapping/>
+  </p:clrMapOvr>
+  <p:timing>
+    <p:tnLst>
+      <p:par>
+        <p:cTn id="1" dur="indefinite" restart="never" nodeType="tmRoot"/>
+      </p:par>
+    </p:tnLst>
+  </p:timing>
+</p:sld>
+</file>
+
+<file path=ppt/slides/slide12.xml><?xml version="1.0" encoding="utf-8"?>
+<p:sld xmlns:a="http://schemas.openxmlformats.org/drawingml/2006/main" xmlns:r="http://schemas.openxmlformats.org/officeDocument/2006/relationships" xmlns:p="http://schemas.openxmlformats.org/presentationml/2006/main">
+  <p:cSld>
+    <p:spTree>
+      <p:nvGrpSpPr>
+        <p:cNvPr id="1" name=""/>
+        <p:cNvGrpSpPr/>
+        <p:nvPr/>
+      </p:nvGrpSpPr>
+      <p:grpSpPr>
+        <a:xfrm>
+          <a:off x="0" y="0"/>
+          <a:ext cx="0" cy="0"/>
+          <a:chOff x="0" y="0"/>
+          <a:chExt cx="0" cy="0"/>
+        </a:xfrm>
+      </p:grpSpPr>
+      <p:sp>
+        <p:nvSpPr>
+          <p:cNvPr id="2" name="Title 1"/>
+          <p:cNvSpPr>
+            <a:spLocks noGrp="1"/>
+          </p:cNvSpPr>
+          <p:nvPr>
+            <p:ph type="title"/>
+          </p:nvPr>
+        </p:nvSpPr>
+        <p:spPr>
+          <a:xfrm>
+            <a:off x="-32" y="0"/>
+            <a:ext cx="9144032" cy="857256"/>
+          </a:xfrm>
+        </p:spPr>
+        <p:txBody>
+          <a:bodyPr/>
+          <a:lstStyle/>
+          <a:p>
+            <a:r>
+              <a:rPr lang="en-US" dirty="0" smtClean="0"/>
+              <a:t>Visual </a:t>
+            </a:r>
+            <a:r>
+              <a:rPr lang="en-US" dirty="0" smtClean="0"/>
+              <a:t>Encoding – Item 3</a:t>
+            </a:r>
+            <a:endParaRPr lang="pt-PT" dirty="0"/>
+          </a:p>
+        </p:txBody>
+      </p:sp>
+      <p:sp>
+        <p:nvSpPr>
+          <p:cNvPr id="3" name="Content Placeholder 2"/>
+          <p:cNvSpPr>
+            <a:spLocks noGrp="1"/>
+          </p:cNvSpPr>
+          <p:nvPr>
+            <p:ph idx="1"/>
+          </p:nvPr>
+        </p:nvSpPr>
+        <p:spPr>
+          <a:xfrm>
+            <a:off x="457200" y="1285860"/>
+            <a:ext cx="8229600" cy="4879444"/>
+          </a:xfrm>
+        </p:spPr>
+        <p:txBody>
+          <a:bodyPr>
+            <a:noAutofit/>
+          </a:bodyPr>
+          <a:lstStyle/>
+          <a:p>
+            <a:pPr algn="ctr"/>
+            <a:r>
+              <a:rPr lang="en-US" sz="4000" dirty="0" smtClean="0"/>
+              <a:t>Compare result</a:t>
+            </a:r>
+          </a:p>
+          <a:p>
+            <a:r>
+              <a:rPr lang="en-US" sz="4000" dirty="0" smtClean="0"/>
+              <a:t>Visual </a:t>
+            </a:r>
+            <a:r>
+              <a:rPr lang="en-US" sz="4000" dirty="0"/>
+              <a:t>Encoding:</a:t>
+            </a:r>
+          </a:p>
+          <a:p>
+            <a:pPr algn="ctr"/>
+            <a:endParaRPr lang="en-US" sz="4000" dirty="0" smtClean="0"/>
+          </a:p>
+        </p:txBody>
+      </p:sp>
+      <p:pic>
+        <p:nvPicPr>
+          <p:cNvPr id="4" name="Picture 2"/>
+          <p:cNvPicPr>
+            <a:picLocks noChangeAspect="1" noChangeArrowheads="1"/>
+          </p:cNvPicPr>
+          <p:nvPr/>
+        </p:nvPicPr>
+        <p:blipFill>
+          <a:blip r:embed="rId3">
+            <a:extLst>
+              <a:ext uri="{28A0092B-C50C-407E-A947-70E740481C1C}">
+                <a14:useLocalDpi xmlns:a14="http://schemas.microsoft.com/office/drawing/2010/main" val="0"/>
+              </a:ext>
+            </a:extLst>
+          </a:blip>
+          <a:srcRect/>
+          <a:stretch>
+            <a:fillRect/>
+          </a:stretch>
+        </p:blipFill>
+        <p:spPr bwMode="auto">
+          <a:xfrm>
+            <a:off x="611560" y="2780928"/>
+            <a:ext cx="2952328" cy="3159491"/>
+          </a:xfrm>
+          <a:prstGeom prst="rect">
+            <a:avLst/>
+          </a:prstGeom>
+          <a:noFill/>
+          <a:ln>
+            <a:noFill/>
+          </a:ln>
+          <a:extLst>
+            <a:ext uri="{909E8E84-426E-40DD-AFC4-6F175D3DCCD1}">
+              <a14:hiddenFill xmlns:a14="http://schemas.microsoft.com/office/drawing/2010/main">
+                <a:solidFill>
+                  <a:schemeClr val="accent1"/>
+                </a:solidFill>
+              </a14:hiddenFill>
+            </a:ext>
+            <a:ext uri="{91240B29-F687-4F45-9708-019B960494DF}">
+              <a14:hiddenLine xmlns:a14="http://schemas.microsoft.com/office/drawing/2010/main" w="9525">
+                <a:solidFill>
+                  <a:schemeClr val="tx1"/>
+                </a:solidFill>
+                <a:miter lim="800000"/>
+                <a:headEnd/>
+                <a:tailEnd/>
+              </a14:hiddenLine>
+            </a:ext>
+          </a:extLst>
+        </p:spPr>
+      </p:pic>
+      <p:pic>
+        <p:nvPicPr>
+          <p:cNvPr id="5122" name="Picture 2" descr="http://www.freeworldmaps.net/printable/europe/europe_outline.gif"/>
+          <p:cNvPicPr>
+            <a:picLocks noChangeAspect="1" noChangeArrowheads="1"/>
+          </p:cNvPicPr>
+          <p:nvPr/>
+        </p:nvPicPr>
+        <p:blipFill>
+          <a:blip r:embed="rId4" cstate="print">
+            <a:extLst>
+              <a:ext uri="{28A0092B-C50C-407E-A947-70E740481C1C}">
+                <a14:useLocalDpi xmlns:a14="http://schemas.microsoft.com/office/drawing/2010/main" val="0"/>
+              </a:ext>
+            </a:extLst>
+          </a:blip>
+          <a:srcRect/>
+          <a:stretch>
+            <a:fillRect/>
+          </a:stretch>
+        </p:blipFill>
+        <p:spPr bwMode="auto">
+          <a:xfrm>
+            <a:off x="5703270" y="2903524"/>
+            <a:ext cx="3440730" cy="2914298"/>
+          </a:xfrm>
+          <a:prstGeom prst="rect">
+            <a:avLst/>
+          </a:prstGeom>
+          <a:noFill/>
+          <a:extLst>
+            <a:ext uri="{909E8E84-426E-40DD-AFC4-6F175D3DCCD1}">
+              <a14:hiddenFill xmlns:a14="http://schemas.microsoft.com/office/drawing/2010/main">
+                <a:solidFill>
+                  <a:srgbClr val="FFFFFF"/>
+                </a:solidFill>
+              </a14:hiddenFill>
+            </a:ext>
+          </a:extLst>
+        </p:spPr>
+      </p:pic>
+      <p:sp>
+        <p:nvSpPr>
+          <p:cNvPr id="5" name="CaixaDeTexto 4"/>
+          <p:cNvSpPr txBox="1"/>
+          <p:nvPr/>
+        </p:nvSpPr>
+        <p:spPr>
+          <a:xfrm>
+            <a:off x="4355976" y="3717032"/>
+            <a:ext cx="792088" cy="769441"/>
+          </a:xfrm>
+          <a:prstGeom prst="rect">
+            <a:avLst/>
+          </a:prstGeom>
+          <a:noFill/>
+        </p:spPr>
+        <p:txBody>
+          <a:bodyPr wrap="square" rtlCol="0">
+            <a:spAutoFit/>
+          </a:bodyPr>
+          <a:lstStyle/>
+          <a:p>
+            <a:r>
+              <a:rPr lang="pt-PT" sz="4400" dirty="0" smtClean="0">
+                <a:ln>
+                  <a:solidFill>
+                    <a:schemeClr val="tx1"/>
+                  </a:solidFill>
+                </a:ln>
+                <a:solidFill>
+                  <a:srgbClr val="FF0000"/>
+                </a:solidFill>
+                <a:latin typeface="Impact" panose="020B0806030902050204" pitchFamily="34" charset="0"/>
+              </a:rPr>
+              <a:t>VS</a:t>
+            </a:r>
+            <a:endParaRPr lang="pt-PT" sz="4400" dirty="0">
+              <a:ln>
+                <a:solidFill>
+                  <a:schemeClr val="tx1"/>
+                </a:solidFill>
+              </a:ln>
               <a:solidFill>
-                <a:schemeClr val="bg2"/>
+                <a:srgbClr val="FF0000"/>
               </a:solidFill>
+              <a:latin typeface="Impact" panose="020B0806030902050204" pitchFamily="34" charset="0"/>
             </a:endParaRPr>
           </a:p>
         </p:txBody>
       </p:sp>
+      <p:sp>
+        <p:nvSpPr>
+          <p:cNvPr id="8" name="Fluxograma: conexão 7"/>
+          <p:cNvSpPr/>
+          <p:nvPr/>
+        </p:nvSpPr>
+        <p:spPr>
+          <a:xfrm>
+            <a:off x="2339752" y="3717032"/>
+            <a:ext cx="360040" cy="360040"/>
+          </a:xfrm>
+          <a:prstGeom prst="flowChartConnector">
+            <a:avLst/>
+          </a:prstGeom>
+          <a:pattFill prst="lgCheck">
+            <a:fgClr>
+              <a:schemeClr val="accent1"/>
+            </a:fgClr>
+            <a:bgClr>
+              <a:schemeClr val="bg1"/>
+            </a:bgClr>
+          </a:pattFill>
+          <a:ln>
+            <a:solidFill>
+              <a:schemeClr val="tx1"/>
+            </a:solidFill>
+          </a:ln>
+        </p:spPr>
+        <p:style>
+          <a:lnRef idx="2">
+            <a:schemeClr val="accent1">
+              <a:shade val="50000"/>
+            </a:schemeClr>
+          </a:lnRef>
+          <a:fillRef idx="1">
+            <a:schemeClr val="accent1"/>
+          </a:fillRef>
+          <a:effectRef idx="0">
+            <a:schemeClr val="accent1"/>
+          </a:effectRef>
+          <a:fontRef idx="minor">
+            <a:schemeClr val="lt1"/>
+          </a:fontRef>
+        </p:style>
+        <p:txBody>
+          <a:bodyPr rtlCol="0" anchor="ctr"/>
+          <a:lstStyle/>
+          <a:p>
+            <a:pPr algn="ctr"/>
+            <a:endParaRPr lang="pt-PT"/>
+          </a:p>
+        </p:txBody>
+      </p:sp>
+      <p:sp>
+        <p:nvSpPr>
+          <p:cNvPr id="9" name="Fluxograma: conexão 8"/>
+          <p:cNvSpPr/>
+          <p:nvPr/>
+        </p:nvSpPr>
+        <p:spPr>
+          <a:xfrm>
+            <a:off x="5940152" y="5153548"/>
+            <a:ext cx="180020" cy="180020"/>
+          </a:xfrm>
+          <a:prstGeom prst="flowChartConnector">
+            <a:avLst/>
+          </a:prstGeom>
+          <a:blipFill>
+            <a:blip r:embed="rId5"/>
+            <a:tile tx="0" ty="0" sx="100000" sy="100000" flip="none" algn="tl"/>
+          </a:blipFill>
+          <a:ln>
+            <a:noFill/>
+          </a:ln>
+        </p:spPr>
+        <p:style>
+          <a:lnRef idx="2">
+            <a:schemeClr val="accent1">
+              <a:shade val="50000"/>
+            </a:schemeClr>
+          </a:lnRef>
+          <a:fillRef idx="1">
+            <a:schemeClr val="accent1"/>
+          </a:fillRef>
+          <a:effectRef idx="0">
+            <a:schemeClr val="accent1"/>
+          </a:effectRef>
+          <a:fontRef idx="minor">
+            <a:schemeClr val="lt1"/>
+          </a:fontRef>
+        </p:style>
+        <p:txBody>
+          <a:bodyPr rtlCol="0" anchor="ctr"/>
+          <a:lstStyle/>
+          <a:p>
+            <a:pPr algn="ctr"/>
+            <a:endParaRPr lang="pt-PT"/>
+          </a:p>
+        </p:txBody>
+      </p:sp>
+      <p:sp>
+        <p:nvSpPr>
+          <p:cNvPr id="13" name="Fluxograma: conexão 12"/>
+          <p:cNvSpPr/>
+          <p:nvPr/>
+        </p:nvSpPr>
+        <p:spPr>
+          <a:xfrm>
+            <a:off x="5940152" y="6327322"/>
+            <a:ext cx="180020" cy="180020"/>
+          </a:xfrm>
+          <a:prstGeom prst="flowChartConnector">
+            <a:avLst/>
+          </a:prstGeom>
+          <a:blipFill>
+            <a:blip r:embed="rId5"/>
+            <a:tile tx="0" ty="0" sx="100000" sy="100000" flip="none" algn="tl"/>
+          </a:blipFill>
+          <a:ln>
+            <a:noFill/>
+          </a:ln>
+        </p:spPr>
+        <p:style>
+          <a:lnRef idx="2">
+            <a:schemeClr val="accent1">
+              <a:shade val="50000"/>
+            </a:schemeClr>
+          </a:lnRef>
+          <a:fillRef idx="1">
+            <a:schemeClr val="accent1"/>
+          </a:fillRef>
+          <a:effectRef idx="0">
+            <a:schemeClr val="accent1"/>
+          </a:effectRef>
+          <a:fontRef idx="minor">
+            <a:schemeClr val="lt1"/>
+          </a:fontRef>
+        </p:style>
+        <p:txBody>
+          <a:bodyPr rtlCol="0" anchor="ctr"/>
+          <a:lstStyle/>
+          <a:p>
+            <a:pPr algn="ctr"/>
+            <a:endParaRPr lang="pt-PT"/>
+          </a:p>
+        </p:txBody>
+      </p:sp>
+      <p:sp>
+        <p:nvSpPr>
+          <p:cNvPr id="14" name="Fluxograma: conexão 13"/>
+          <p:cNvSpPr/>
+          <p:nvPr/>
+        </p:nvSpPr>
+        <p:spPr>
+          <a:xfrm>
+            <a:off x="1187624" y="6158154"/>
+            <a:ext cx="360040" cy="360040"/>
+          </a:xfrm>
+          <a:prstGeom prst="flowChartConnector">
+            <a:avLst/>
+          </a:prstGeom>
+          <a:pattFill prst="lgCheck">
+            <a:fgClr>
+              <a:schemeClr val="accent1"/>
+            </a:fgClr>
+            <a:bgClr>
+              <a:schemeClr val="bg1"/>
+            </a:bgClr>
+          </a:pattFill>
+          <a:ln>
+            <a:solidFill>
+              <a:schemeClr val="tx1"/>
+            </a:solidFill>
+          </a:ln>
+        </p:spPr>
+        <p:style>
+          <a:lnRef idx="2">
+            <a:schemeClr val="accent1">
+              <a:shade val="50000"/>
+            </a:schemeClr>
+          </a:lnRef>
+          <a:fillRef idx="1">
+            <a:schemeClr val="accent1"/>
+          </a:fillRef>
+          <a:effectRef idx="0">
+            <a:schemeClr val="accent1"/>
+          </a:effectRef>
+          <a:fontRef idx="minor">
+            <a:schemeClr val="lt1"/>
+          </a:fontRef>
+        </p:style>
+        <p:txBody>
+          <a:bodyPr rtlCol="0" anchor="ctr"/>
+          <a:lstStyle/>
+          <a:p>
+            <a:pPr algn="ctr"/>
+            <a:endParaRPr lang="pt-PT"/>
+          </a:p>
+        </p:txBody>
+      </p:sp>
+      <p:sp>
+        <p:nvSpPr>
+          <p:cNvPr id="7" name="CaixaDeTexto 6"/>
+          <p:cNvSpPr txBox="1"/>
+          <p:nvPr/>
+        </p:nvSpPr>
+        <p:spPr>
+          <a:xfrm>
+            <a:off x="1728242" y="6163630"/>
+            <a:ext cx="692882" cy="369332"/>
+          </a:xfrm>
+          <a:prstGeom prst="rect">
+            <a:avLst/>
+          </a:prstGeom>
+          <a:noFill/>
+        </p:spPr>
+        <p:txBody>
+          <a:bodyPr wrap="none" rtlCol="0">
+            <a:spAutoFit/>
+          </a:bodyPr>
+          <a:lstStyle/>
+          <a:p>
+            <a:r>
+              <a:rPr lang="pt-PT" dirty="0" err="1" smtClean="0"/>
+              <a:t>Brazil</a:t>
+            </a:r>
+            <a:endParaRPr lang="pt-PT" dirty="0"/>
+          </a:p>
+        </p:txBody>
+      </p:sp>
+      <p:sp>
+        <p:nvSpPr>
+          <p:cNvPr id="16" name="CaixaDeTexto 15"/>
+          <p:cNvSpPr txBox="1"/>
+          <p:nvPr/>
+        </p:nvSpPr>
+        <p:spPr>
+          <a:xfrm>
+            <a:off x="6155824" y="6225784"/>
+            <a:ext cx="967637" cy="369332"/>
+          </a:xfrm>
+          <a:prstGeom prst="rect">
+            <a:avLst/>
+          </a:prstGeom>
+          <a:noFill/>
+        </p:spPr>
+        <p:txBody>
+          <a:bodyPr wrap="none" rtlCol="0">
+            <a:spAutoFit/>
+          </a:bodyPr>
+          <a:lstStyle/>
+          <a:p>
+            <a:r>
+              <a:rPr lang="pt-PT" dirty="0" smtClean="0"/>
+              <a:t>Portugal</a:t>
+            </a:r>
+            <a:endParaRPr lang="pt-PT" dirty="0"/>
+          </a:p>
+        </p:txBody>
+      </p:sp>
     </p:spTree>
+    <p:extLst>
+      <p:ext uri="{BB962C8B-B14F-4D97-AF65-F5344CB8AC3E}">
+        <p14:creationId xmlns:p14="http://schemas.microsoft.com/office/powerpoint/2010/main" val="137352632"/>
+      </p:ext>
+    </p:extLst>
+  </p:cSld>
+  <p:clrMapOvr>
+    <a:masterClrMapping/>
+  </p:clrMapOvr>
+  <p:timing>
+    <p:tnLst>
+      <p:par>
+        <p:cTn id="1" dur="indefinite" restart="never" nodeType="tmRoot"/>
+      </p:par>
+    </p:tnLst>
+  </p:timing>
+</p:sld>
+</file>
+
+<file path=ppt/slides/slide13.xml><?xml version="1.0" encoding="utf-8"?>
+<p:sld xmlns:a="http://schemas.openxmlformats.org/drawingml/2006/main" xmlns:r="http://schemas.openxmlformats.org/officeDocument/2006/relationships" xmlns:p="http://schemas.openxmlformats.org/presentationml/2006/main">
+  <p:cSld>
+    <p:spTree>
+      <p:nvGrpSpPr>
+        <p:cNvPr id="1" name=""/>
+        <p:cNvGrpSpPr/>
+        <p:nvPr/>
+      </p:nvGrpSpPr>
+      <p:grpSpPr>
+        <a:xfrm>
+          <a:off x="0" y="0"/>
+          <a:ext cx="0" cy="0"/>
+          <a:chOff x="0" y="0"/>
+          <a:chExt cx="0" cy="0"/>
+        </a:xfrm>
+      </p:grpSpPr>
+      <p:sp>
+        <p:nvSpPr>
+          <p:cNvPr id="2" name="Title 1"/>
+          <p:cNvSpPr>
+            <a:spLocks noGrp="1"/>
+          </p:cNvSpPr>
+          <p:nvPr>
+            <p:ph type="title"/>
+          </p:nvPr>
+        </p:nvSpPr>
+        <p:spPr>
+          <a:xfrm>
+            <a:off x="-32" y="0"/>
+            <a:ext cx="9144032" cy="857256"/>
+          </a:xfrm>
+        </p:spPr>
+        <p:txBody>
+          <a:bodyPr/>
+          <a:lstStyle/>
+          <a:p>
+            <a:r>
+              <a:rPr lang="en-US" dirty="0" smtClean="0"/>
+              <a:t>Visual </a:t>
+            </a:r>
+            <a:r>
+              <a:rPr lang="en-US" dirty="0" smtClean="0"/>
+              <a:t>Encoding – Item 3</a:t>
+            </a:r>
+            <a:endParaRPr lang="pt-PT" dirty="0"/>
+          </a:p>
+        </p:txBody>
+      </p:sp>
+      <p:sp>
+        <p:nvSpPr>
+          <p:cNvPr id="3" name="Content Placeholder 2"/>
+          <p:cNvSpPr>
+            <a:spLocks noGrp="1"/>
+          </p:cNvSpPr>
+          <p:nvPr>
+            <p:ph idx="1"/>
+          </p:nvPr>
+        </p:nvSpPr>
+        <p:spPr>
+          <a:xfrm>
+            <a:off x="457200" y="1285860"/>
+            <a:ext cx="8229600" cy="4879444"/>
+          </a:xfrm>
+        </p:spPr>
+        <p:txBody>
+          <a:bodyPr>
+            <a:noAutofit/>
+          </a:bodyPr>
+          <a:lstStyle/>
+          <a:p>
+            <a:pPr algn="ctr"/>
+            <a:r>
+              <a:rPr lang="en-US" sz="4000" dirty="0" smtClean="0"/>
+              <a:t>Compare result</a:t>
+            </a:r>
+          </a:p>
+          <a:p>
+            <a:r>
+              <a:rPr lang="en-US" sz="4000" dirty="0" smtClean="0"/>
+              <a:t>Visual </a:t>
+            </a:r>
+            <a:r>
+              <a:rPr lang="en-US" sz="4000" dirty="0"/>
+              <a:t>Encoding:</a:t>
+            </a:r>
+          </a:p>
+          <a:p>
+            <a:pPr algn="ctr"/>
+            <a:endParaRPr lang="en-US" sz="4000" dirty="0" smtClean="0"/>
+          </a:p>
+        </p:txBody>
+      </p:sp>
+      <p:sp>
+        <p:nvSpPr>
+          <p:cNvPr id="6" name="CaixaDeTexto 5"/>
+          <p:cNvSpPr txBox="1"/>
+          <p:nvPr/>
+        </p:nvSpPr>
+        <p:spPr>
+          <a:xfrm>
+            <a:off x="1015139" y="2778948"/>
+            <a:ext cx="1766830" cy="584775"/>
+          </a:xfrm>
+          <a:prstGeom prst="rect">
+            <a:avLst/>
+          </a:prstGeom>
+          <a:noFill/>
+        </p:spPr>
+        <p:txBody>
+          <a:bodyPr wrap="none" rtlCol="0">
+            <a:spAutoFit/>
+          </a:bodyPr>
+          <a:lstStyle/>
+          <a:p>
+            <a:r>
+              <a:rPr lang="pt-PT" sz="3200" dirty="0" err="1" smtClean="0"/>
+              <a:t>All</a:t>
+            </a:r>
+            <a:r>
+              <a:rPr lang="pt-PT" sz="3200" dirty="0" smtClean="0"/>
+              <a:t> Sports</a:t>
+            </a:r>
+            <a:endParaRPr lang="pt-PT" sz="3200" dirty="0"/>
+          </a:p>
+        </p:txBody>
+      </p:sp>
+      <p:sp>
+        <p:nvSpPr>
+          <p:cNvPr id="10" name="Rectângulo 9"/>
+          <p:cNvSpPr/>
+          <p:nvPr/>
+        </p:nvSpPr>
+        <p:spPr>
+          <a:xfrm>
+            <a:off x="1403648" y="3429000"/>
+            <a:ext cx="2376264" cy="288032"/>
+          </a:xfrm>
+          <a:prstGeom prst="rect">
+            <a:avLst/>
+          </a:prstGeom>
+          <a:pattFill prst="lgCheck">
+            <a:fgClr>
+              <a:schemeClr val="accent1"/>
+            </a:fgClr>
+            <a:bgClr>
+              <a:schemeClr val="bg1"/>
+            </a:bgClr>
+          </a:pattFill>
+          <a:ln>
+            <a:solidFill>
+              <a:schemeClr val="tx1"/>
+            </a:solidFill>
+          </a:ln>
+        </p:spPr>
+        <p:style>
+          <a:lnRef idx="2">
+            <a:schemeClr val="accent1">
+              <a:shade val="50000"/>
+            </a:schemeClr>
+          </a:lnRef>
+          <a:fillRef idx="1">
+            <a:schemeClr val="accent1"/>
+          </a:fillRef>
+          <a:effectRef idx="0">
+            <a:schemeClr val="accent1"/>
+          </a:effectRef>
+          <a:fontRef idx="minor">
+            <a:schemeClr val="lt1"/>
+          </a:fontRef>
+        </p:style>
+        <p:txBody>
+          <a:bodyPr rtlCol="0" anchor="ctr"/>
+          <a:lstStyle/>
+          <a:p>
+            <a:pPr algn="ctr"/>
+            <a:endParaRPr lang="pt-PT"/>
+          </a:p>
+        </p:txBody>
+      </p:sp>
+      <p:sp>
+        <p:nvSpPr>
+          <p:cNvPr id="15" name="Rectângulo 14"/>
+          <p:cNvSpPr/>
+          <p:nvPr/>
+        </p:nvSpPr>
+        <p:spPr>
+          <a:xfrm>
+            <a:off x="1403647" y="3869432"/>
+            <a:ext cx="882671" cy="288032"/>
+          </a:xfrm>
+          <a:prstGeom prst="rect">
+            <a:avLst/>
+          </a:prstGeom>
+          <a:blipFill>
+            <a:blip r:embed="rId3"/>
+            <a:tile tx="0" ty="0" sx="100000" sy="100000" flip="none" algn="tl"/>
+          </a:blipFill>
+          <a:ln>
+            <a:solidFill>
+              <a:schemeClr val="tx1"/>
+            </a:solidFill>
+          </a:ln>
+        </p:spPr>
+        <p:style>
+          <a:lnRef idx="2">
+            <a:schemeClr val="accent1">
+              <a:shade val="50000"/>
+            </a:schemeClr>
+          </a:lnRef>
+          <a:fillRef idx="1">
+            <a:schemeClr val="accent1"/>
+          </a:fillRef>
+          <a:effectRef idx="0">
+            <a:schemeClr val="accent1"/>
+          </a:effectRef>
+          <a:fontRef idx="minor">
+            <a:schemeClr val="lt1"/>
+          </a:fontRef>
+        </p:style>
+        <p:txBody>
+          <a:bodyPr rtlCol="0" anchor="ctr"/>
+          <a:lstStyle/>
+          <a:p>
+            <a:pPr algn="ctr"/>
+            <a:endParaRPr lang="pt-PT"/>
+          </a:p>
+        </p:txBody>
+      </p:sp>
+      <p:sp>
+        <p:nvSpPr>
+          <p:cNvPr id="17" name="CaixaDeTexto 16"/>
+          <p:cNvSpPr txBox="1"/>
+          <p:nvPr/>
+        </p:nvSpPr>
+        <p:spPr>
+          <a:xfrm>
+            <a:off x="3923928" y="3353751"/>
+            <a:ext cx="495649" cy="461665"/>
+          </a:xfrm>
+          <a:prstGeom prst="rect">
+            <a:avLst/>
+          </a:prstGeom>
+          <a:noFill/>
+        </p:spPr>
+        <p:txBody>
+          <a:bodyPr wrap="none" rtlCol="0">
+            <a:spAutoFit/>
+          </a:bodyPr>
+          <a:lstStyle/>
+          <a:p>
+            <a:r>
+              <a:rPr lang="pt-PT" sz="2400" dirty="0" smtClean="0"/>
+              <a:t>94</a:t>
+            </a:r>
+            <a:endParaRPr lang="pt-PT" sz="2400" dirty="0"/>
+          </a:p>
+        </p:txBody>
+      </p:sp>
+      <p:sp>
+        <p:nvSpPr>
+          <p:cNvPr id="18" name="CaixaDeTexto 17"/>
+          <p:cNvSpPr txBox="1"/>
+          <p:nvPr/>
+        </p:nvSpPr>
+        <p:spPr>
+          <a:xfrm>
+            <a:off x="1067097" y="4365104"/>
+            <a:ext cx="965329" cy="584775"/>
+          </a:xfrm>
+          <a:prstGeom prst="rect">
+            <a:avLst/>
+          </a:prstGeom>
+          <a:noFill/>
+        </p:spPr>
+        <p:txBody>
+          <a:bodyPr wrap="none" rtlCol="0">
+            <a:spAutoFit/>
+          </a:bodyPr>
+          <a:lstStyle/>
+          <a:p>
+            <a:r>
+              <a:rPr lang="pt-PT" sz="3200" dirty="0" smtClean="0"/>
+              <a:t>Judo</a:t>
+            </a:r>
+            <a:endParaRPr lang="pt-PT" sz="3200" dirty="0"/>
+          </a:p>
+        </p:txBody>
+      </p:sp>
+      <p:sp>
+        <p:nvSpPr>
+          <p:cNvPr id="19" name="CaixaDeTexto 18"/>
+          <p:cNvSpPr txBox="1"/>
+          <p:nvPr/>
+        </p:nvSpPr>
+        <p:spPr>
+          <a:xfrm>
+            <a:off x="1386741" y="5803120"/>
+            <a:ext cx="468398" cy="584775"/>
+          </a:xfrm>
+          <a:prstGeom prst="rect">
+            <a:avLst/>
+          </a:prstGeom>
+          <a:noFill/>
+        </p:spPr>
+        <p:txBody>
+          <a:bodyPr wrap="none" rtlCol="0">
+            <a:spAutoFit/>
+          </a:bodyPr>
+          <a:lstStyle/>
+          <a:p>
+            <a:r>
+              <a:rPr lang="pt-PT" sz="3200" dirty="0" smtClean="0"/>
+              <a:t>…</a:t>
+            </a:r>
+            <a:endParaRPr lang="pt-PT" sz="3200" dirty="0"/>
+          </a:p>
+        </p:txBody>
+      </p:sp>
+      <p:sp>
+        <p:nvSpPr>
+          <p:cNvPr id="20" name="Rectângulo 19"/>
+          <p:cNvSpPr/>
+          <p:nvPr/>
+        </p:nvSpPr>
+        <p:spPr>
+          <a:xfrm>
+            <a:off x="1385392" y="4949879"/>
+            <a:ext cx="1674440" cy="288032"/>
+          </a:xfrm>
+          <a:prstGeom prst="rect">
+            <a:avLst/>
+          </a:prstGeom>
+          <a:pattFill prst="lgCheck">
+            <a:fgClr>
+              <a:schemeClr val="accent1"/>
+            </a:fgClr>
+            <a:bgClr>
+              <a:schemeClr val="bg1"/>
+            </a:bgClr>
+          </a:pattFill>
+          <a:ln>
+            <a:solidFill>
+              <a:schemeClr val="tx1"/>
+            </a:solidFill>
+          </a:ln>
+        </p:spPr>
+        <p:style>
+          <a:lnRef idx="2">
+            <a:schemeClr val="accent1">
+              <a:shade val="50000"/>
+            </a:schemeClr>
+          </a:lnRef>
+          <a:fillRef idx="1">
+            <a:schemeClr val="accent1"/>
+          </a:fillRef>
+          <a:effectRef idx="0">
+            <a:schemeClr val="accent1"/>
+          </a:effectRef>
+          <a:fontRef idx="minor">
+            <a:schemeClr val="lt1"/>
+          </a:fontRef>
+        </p:style>
+        <p:txBody>
+          <a:bodyPr rtlCol="0" anchor="ctr"/>
+          <a:lstStyle/>
+          <a:p>
+            <a:pPr algn="ctr"/>
+            <a:endParaRPr lang="pt-PT"/>
+          </a:p>
+        </p:txBody>
+      </p:sp>
+      <p:sp>
+        <p:nvSpPr>
+          <p:cNvPr id="21" name="Rectângulo 20"/>
+          <p:cNvSpPr/>
+          <p:nvPr/>
+        </p:nvSpPr>
+        <p:spPr>
+          <a:xfrm>
+            <a:off x="1385392" y="5407142"/>
+            <a:ext cx="297033" cy="288032"/>
+          </a:xfrm>
+          <a:prstGeom prst="rect">
+            <a:avLst/>
+          </a:prstGeom>
+          <a:blipFill>
+            <a:blip r:embed="rId3"/>
+            <a:tile tx="0" ty="0" sx="100000" sy="100000" flip="none" algn="tl"/>
+          </a:blipFill>
+          <a:ln>
+            <a:solidFill>
+              <a:schemeClr val="tx1"/>
+            </a:solidFill>
+          </a:ln>
+        </p:spPr>
+        <p:style>
+          <a:lnRef idx="2">
+            <a:schemeClr val="accent1">
+              <a:shade val="50000"/>
+            </a:schemeClr>
+          </a:lnRef>
+          <a:fillRef idx="1">
+            <a:schemeClr val="accent1"/>
+          </a:fillRef>
+          <a:effectRef idx="0">
+            <a:schemeClr val="accent1"/>
+          </a:effectRef>
+          <a:fontRef idx="minor">
+            <a:schemeClr val="lt1"/>
+          </a:fontRef>
+        </p:style>
+        <p:txBody>
+          <a:bodyPr rtlCol="0" anchor="ctr"/>
+          <a:lstStyle/>
+          <a:p>
+            <a:pPr algn="ctr"/>
+            <a:endParaRPr lang="pt-PT"/>
+          </a:p>
+        </p:txBody>
+      </p:sp>
+      <p:sp>
+        <p:nvSpPr>
+          <p:cNvPr id="22" name="CaixaDeTexto 21"/>
+          <p:cNvSpPr txBox="1"/>
+          <p:nvPr/>
+        </p:nvSpPr>
+        <p:spPr>
+          <a:xfrm>
+            <a:off x="2286319" y="3782615"/>
+            <a:ext cx="495649" cy="461665"/>
+          </a:xfrm>
+          <a:prstGeom prst="rect">
+            <a:avLst/>
+          </a:prstGeom>
+          <a:noFill/>
+        </p:spPr>
+        <p:txBody>
+          <a:bodyPr wrap="none" rtlCol="0">
+            <a:spAutoFit/>
+          </a:bodyPr>
+          <a:lstStyle/>
+          <a:p>
+            <a:r>
+              <a:rPr lang="pt-PT" sz="2400" dirty="0" smtClean="0"/>
+              <a:t>32</a:t>
+            </a:r>
+            <a:endParaRPr lang="pt-PT" sz="2400" dirty="0"/>
+          </a:p>
+        </p:txBody>
+      </p:sp>
+      <p:sp>
+        <p:nvSpPr>
+          <p:cNvPr id="23" name="CaixaDeTexto 22"/>
+          <p:cNvSpPr txBox="1"/>
+          <p:nvPr/>
+        </p:nvSpPr>
+        <p:spPr>
+          <a:xfrm>
+            <a:off x="3269000" y="4863062"/>
+            <a:ext cx="495649" cy="461665"/>
+          </a:xfrm>
+          <a:prstGeom prst="rect">
+            <a:avLst/>
+          </a:prstGeom>
+          <a:noFill/>
+        </p:spPr>
+        <p:txBody>
+          <a:bodyPr wrap="none" rtlCol="0">
+            <a:spAutoFit/>
+          </a:bodyPr>
+          <a:lstStyle/>
+          <a:p>
+            <a:r>
+              <a:rPr lang="pt-PT" sz="2400" dirty="0" smtClean="0"/>
+              <a:t>17</a:t>
+            </a:r>
+            <a:endParaRPr lang="pt-PT" sz="2400" dirty="0"/>
+          </a:p>
+        </p:txBody>
+      </p:sp>
+      <p:sp>
+        <p:nvSpPr>
+          <p:cNvPr id="24" name="CaixaDeTexto 23"/>
+          <p:cNvSpPr txBox="1"/>
+          <p:nvPr/>
+        </p:nvSpPr>
+        <p:spPr>
+          <a:xfrm>
+            <a:off x="1855139" y="5324727"/>
+            <a:ext cx="340158" cy="461665"/>
+          </a:xfrm>
+          <a:prstGeom prst="rect">
+            <a:avLst/>
+          </a:prstGeom>
+          <a:noFill/>
+        </p:spPr>
+        <p:txBody>
+          <a:bodyPr wrap="none" rtlCol="0">
+            <a:spAutoFit/>
+          </a:bodyPr>
+          <a:lstStyle/>
+          <a:p>
+            <a:r>
+              <a:rPr lang="pt-PT" sz="2400" dirty="0" smtClean="0"/>
+              <a:t>2</a:t>
+            </a:r>
+            <a:endParaRPr lang="pt-PT" sz="2400" dirty="0"/>
+          </a:p>
+        </p:txBody>
+      </p:sp>
+    </p:spTree>
+    <p:extLst>
+      <p:ext uri="{BB962C8B-B14F-4D97-AF65-F5344CB8AC3E}">
+        <p14:creationId xmlns:p14="http://schemas.microsoft.com/office/powerpoint/2010/main" val="3433199029"/>
+      </p:ext>
+    </p:extLst>
+  </p:cSld>
+  <p:clrMapOvr>
+    <a:masterClrMapping/>
+  </p:clrMapOvr>
+  <p:timing>
+    <p:tnLst>
+      <p:par>
+        <p:cTn id="1" dur="indefinite" restart="never" nodeType="tmRoot"/>
+      </p:par>
+    </p:tnLst>
+  </p:timing>
+</p:sld>
+</file>
+
+<file path=ppt/slides/slide14.xml><?xml version="1.0" encoding="utf-8"?>
+<p:sld xmlns:a="http://schemas.openxmlformats.org/drawingml/2006/main" xmlns:r="http://schemas.openxmlformats.org/officeDocument/2006/relationships" xmlns:p="http://schemas.openxmlformats.org/presentationml/2006/main">
+  <p:cSld>
+    <p:spTree>
+      <p:nvGrpSpPr>
+        <p:cNvPr id="1" name=""/>
+        <p:cNvGrpSpPr/>
+        <p:nvPr/>
+      </p:nvGrpSpPr>
+      <p:grpSpPr>
+        <a:xfrm>
+          <a:off x="0" y="0"/>
+          <a:ext cx="0" cy="0"/>
+          <a:chOff x="0" y="0"/>
+          <a:chExt cx="0" cy="0"/>
+        </a:xfrm>
+      </p:grpSpPr>
+      <p:sp>
+        <p:nvSpPr>
+          <p:cNvPr id="6" name="Text Placeholder 5"/>
+          <p:cNvSpPr>
+            <a:spLocks noGrp="1"/>
+          </p:cNvSpPr>
+          <p:nvPr>
+            <p:ph type="body" sz="quarter" idx="11"/>
+          </p:nvPr>
+        </p:nvSpPr>
+        <p:spPr/>
+        <p:txBody>
+          <a:bodyPr/>
+          <a:lstStyle/>
+          <a:p>
+            <a:endParaRPr lang="en-US" dirty="0"/>
+          </a:p>
+        </p:txBody>
+      </p:sp>
+      <p:sp>
+        <p:nvSpPr>
+          <p:cNvPr id="29" name="Text Placeholder 28"/>
+          <p:cNvSpPr>
+            <a:spLocks noGrp="1"/>
+          </p:cNvSpPr>
+          <p:nvPr>
+            <p:ph type="body" sz="quarter" idx="10"/>
+          </p:nvPr>
+        </p:nvSpPr>
+        <p:spPr/>
+        <p:txBody>
+          <a:bodyPr/>
+          <a:lstStyle/>
+          <a:p>
+            <a:r>
+              <a:rPr lang="pt-PT" sz="16600" dirty="0" smtClean="0"/>
+              <a:t>02</a:t>
+            </a:r>
+            <a:endParaRPr lang="pt-PT" sz="16600" dirty="0"/>
+          </a:p>
+        </p:txBody>
+      </p:sp>
+      <p:sp>
+        <p:nvSpPr>
+          <p:cNvPr id="4" name="Title 3"/>
+          <p:cNvSpPr>
+            <a:spLocks noGrp="1"/>
+          </p:cNvSpPr>
+          <p:nvPr>
+            <p:ph type="title"/>
+          </p:nvPr>
+        </p:nvSpPr>
+        <p:spPr>
+          <a:xfrm>
+            <a:off x="1907704" y="3214686"/>
+            <a:ext cx="7160096" cy="3033714"/>
+          </a:xfrm>
+          <a:solidFill>
+            <a:srgbClr val="FFFFFF">
+              <a:alpha val="80000"/>
+            </a:srgbClr>
+          </a:solidFill>
+        </p:spPr>
+        <p:txBody>
+          <a:bodyPr rIns="288000">
+            <a:noAutofit/>
+          </a:bodyPr>
+          <a:lstStyle/>
+          <a:p>
+            <a:pPr marL="0" algn="r"/>
+            <a:r>
+              <a:rPr lang="pt-PT" sz="6000" dirty="0" smtClean="0"/>
+              <a:t>IDIOM – </a:t>
+            </a:r>
+            <a:r>
+              <a:rPr lang="pt-PT" sz="6000" dirty="0" err="1" smtClean="0"/>
+              <a:t>tasks</a:t>
+            </a:r>
+            <a:r>
+              <a:rPr lang="pt-PT" sz="6000" dirty="0" smtClean="0"/>
+              <a:t>/</a:t>
+            </a:r>
+            <a:r>
+              <a:rPr lang="pt-PT" sz="6000" dirty="0" err="1" smtClean="0"/>
+              <a:t>questions</a:t>
+            </a:r>
+            <a:r>
+              <a:rPr lang="pt-PT" sz="6000" dirty="0" smtClean="0"/>
+              <a:t> </a:t>
+            </a:r>
+            <a:r>
+              <a:rPr lang="pt-PT" sz="6000" dirty="0" err="1" smtClean="0"/>
+              <a:t>mapping</a:t>
+            </a:r>
+            <a:endParaRPr lang="pt-PT" sz="6000" dirty="0"/>
+          </a:p>
+        </p:txBody>
+      </p:sp>
+    </p:spTree>
+    <p:extLst>
+      <p:ext uri="{BB962C8B-B14F-4D97-AF65-F5344CB8AC3E}">
+        <p14:creationId xmlns:p14="http://schemas.microsoft.com/office/powerpoint/2010/main" val="627357321"/>
+      </p:ext>
+    </p:extLst>
+  </p:cSld>
+  <p:clrMapOvr>
+    <a:masterClrMapping/>
+  </p:clrMapOvr>
+  <p:timing>
+    <p:tnLst>
+      <p:par>
+        <p:cTn id="1" dur="indefinite" restart="never" nodeType="tmRoot"/>
+      </p:par>
+    </p:tnLst>
+  </p:timing>
+</p:sld>
+</file>
+
+<file path=ppt/slides/slide15.xml><?xml version="1.0" encoding="utf-8"?>
+<p:sld xmlns:a="http://schemas.openxmlformats.org/drawingml/2006/main" xmlns:r="http://schemas.openxmlformats.org/officeDocument/2006/relationships" xmlns:p="http://schemas.openxmlformats.org/presentationml/2006/main">
+  <p:cSld>
+    <p:spTree>
+      <p:nvGrpSpPr>
+        <p:cNvPr id="1" name=""/>
+        <p:cNvGrpSpPr/>
+        <p:nvPr/>
+      </p:nvGrpSpPr>
+      <p:grpSpPr>
+        <a:xfrm>
+          <a:off x="0" y="0"/>
+          <a:ext cx="0" cy="0"/>
+          <a:chOff x="0" y="0"/>
+          <a:chExt cx="0" cy="0"/>
+        </a:xfrm>
+      </p:grpSpPr>
+      <p:sp>
+        <p:nvSpPr>
+          <p:cNvPr id="2" name="Title 1"/>
+          <p:cNvSpPr>
+            <a:spLocks noGrp="1"/>
+          </p:cNvSpPr>
+          <p:nvPr>
+            <p:ph type="title"/>
+          </p:nvPr>
+        </p:nvSpPr>
+        <p:spPr/>
+        <p:txBody>
+          <a:bodyPr/>
+          <a:lstStyle/>
+          <a:p>
+            <a:r>
+              <a:rPr lang="en-US" dirty="0" smtClean="0"/>
+              <a:t>Task 1</a:t>
+            </a:r>
+            <a:endParaRPr lang="pt-PT" dirty="0"/>
+          </a:p>
+        </p:txBody>
+      </p:sp>
+      <p:sp>
+        <p:nvSpPr>
+          <p:cNvPr id="3" name="Content Placeholder 2"/>
+          <p:cNvSpPr>
+            <a:spLocks noGrp="1"/>
+          </p:cNvSpPr>
+          <p:nvPr>
+            <p:ph idx="1"/>
+          </p:nvPr>
+        </p:nvSpPr>
+        <p:spPr/>
+        <p:txBody>
+          <a:bodyPr>
+            <a:noAutofit/>
+          </a:bodyPr>
+          <a:lstStyle/>
+          <a:p>
+            <a:r>
+              <a:rPr lang="en-US" dirty="0" smtClean="0"/>
+              <a:t>Selected Idiom and why it allows answering each question</a:t>
+            </a:r>
+          </a:p>
+          <a:p>
+            <a:pPr lvl="1"/>
+            <a:endParaRPr lang="en-US" sz="2000" dirty="0" smtClean="0"/>
+          </a:p>
+        </p:txBody>
+      </p:sp>
+    </p:spTree>
+    <p:extLst>
+      <p:ext uri="{BB962C8B-B14F-4D97-AF65-F5344CB8AC3E}">
+        <p14:creationId xmlns:p14="http://schemas.microsoft.com/office/powerpoint/2010/main" val="2962997025"/>
+      </p:ext>
+    </p:extLst>
+  </p:cSld>
+  <p:clrMapOvr>
+    <a:masterClrMapping/>
+  </p:clrMapOvr>
+  <p:timing>
+    <p:tnLst>
+      <p:par>
+        <p:cTn id="1" dur="indefinite" restart="never" nodeType="tmRoot"/>
+      </p:par>
+    </p:tnLst>
+  </p:timing>
+</p:sld>
+</file>
+
+<file path=ppt/slides/slide16.xml><?xml version="1.0" encoding="utf-8"?>
+<p:sld xmlns:a="http://schemas.openxmlformats.org/drawingml/2006/main" xmlns:r="http://schemas.openxmlformats.org/officeDocument/2006/relationships" xmlns:p="http://schemas.openxmlformats.org/presentationml/2006/main">
+  <p:cSld>
+    <p:spTree>
+      <p:nvGrpSpPr>
+        <p:cNvPr id="1" name=""/>
+        <p:cNvGrpSpPr/>
+        <p:nvPr/>
+      </p:nvGrpSpPr>
+      <p:grpSpPr>
+        <a:xfrm>
+          <a:off x="0" y="0"/>
+          <a:ext cx="0" cy="0"/>
+          <a:chOff x="0" y="0"/>
+          <a:chExt cx="0" cy="0"/>
+        </a:xfrm>
+      </p:grpSpPr>
+      <p:sp>
+        <p:nvSpPr>
+          <p:cNvPr id="2" name="Title 1"/>
+          <p:cNvSpPr>
+            <a:spLocks noGrp="1"/>
+          </p:cNvSpPr>
+          <p:nvPr>
+            <p:ph type="title"/>
+          </p:nvPr>
+        </p:nvSpPr>
+        <p:spPr/>
+        <p:txBody>
+          <a:bodyPr/>
+          <a:lstStyle/>
+          <a:p>
+            <a:r>
+              <a:rPr lang="en-US" dirty="0" smtClean="0"/>
+              <a:t>Task 2</a:t>
+            </a:r>
+            <a:endParaRPr lang="pt-PT" dirty="0"/>
+          </a:p>
+        </p:txBody>
+      </p:sp>
+      <p:sp>
+        <p:nvSpPr>
+          <p:cNvPr id="3" name="Content Placeholder 2"/>
+          <p:cNvSpPr>
+            <a:spLocks noGrp="1"/>
+          </p:cNvSpPr>
+          <p:nvPr>
+            <p:ph idx="1"/>
+          </p:nvPr>
+        </p:nvSpPr>
+        <p:spPr/>
+        <p:txBody>
+          <a:bodyPr>
+            <a:noAutofit/>
+          </a:bodyPr>
+          <a:lstStyle/>
+          <a:p>
+            <a:r>
+              <a:rPr lang="en-US" dirty="0"/>
+              <a:t>Selected Idiom and why it allows answering each </a:t>
+            </a:r>
+            <a:r>
+              <a:rPr lang="en-US" dirty="0" smtClean="0"/>
+              <a:t>question</a:t>
+            </a:r>
+            <a:endParaRPr lang="en-US" dirty="0"/>
+          </a:p>
+        </p:txBody>
+      </p:sp>
+    </p:spTree>
+    <p:extLst>
+      <p:ext uri="{BB962C8B-B14F-4D97-AF65-F5344CB8AC3E}">
+        <p14:creationId xmlns:p14="http://schemas.microsoft.com/office/powerpoint/2010/main" val="346640620"/>
+      </p:ext>
+    </p:extLst>
   </p:cSld>
   <p:clrMapOvr>
     <a:masterClrMapping/>
@@ -3642,7 +6595,11 @@
           <a:p>
             <a:r>
               <a:rPr lang="en-US" dirty="0" smtClean="0"/>
-              <a:t>Visual Encoding</a:t>
+              <a:t>Visual </a:t>
+            </a:r>
+            <a:r>
+              <a:rPr lang="en-US" dirty="0" smtClean="0"/>
+              <a:t>Encoding – Item 1</a:t>
             </a:r>
             <a:endParaRPr lang="pt-PT" dirty="0"/>
           </a:p>
@@ -3665,23 +6622,75 @@
           </a:bodyPr>
           <a:lstStyle/>
           <a:p>
+            <a:pPr algn="ctr"/>
             <a:r>
               <a:rPr lang="en-US" sz="4000" dirty="0" smtClean="0"/>
-              <a:t>Item1 | Type:</a:t>
-            </a:r>
-          </a:p>
-          <a:p>
-            <a:r>
-              <a:rPr lang="en-US" sz="4000" dirty="0" smtClean="0"/>
-              <a:t>Visual Encoding:</a:t>
-            </a:r>
-          </a:p>
-        </p:txBody>
-      </p:sp>
+              <a:t>Ranks</a:t>
+            </a:r>
+          </a:p>
+          <a:p>
+            <a:endParaRPr lang="en-US" sz="4000" dirty="0" smtClean="0"/>
+          </a:p>
+        </p:txBody>
+      </p:sp>
+      <p:pic>
+        <p:nvPicPr>
+          <p:cNvPr id="1026" name="Picture 2"/>
+          <p:cNvPicPr>
+            <a:picLocks noChangeAspect="1" noChangeArrowheads="1"/>
+          </p:cNvPicPr>
+          <p:nvPr/>
+        </p:nvPicPr>
+        <p:blipFill>
+          <a:blip r:embed="rId3">
+            <a:extLst>
+              <a:ext uri="{28A0092B-C50C-407E-A947-70E740481C1C}">
+                <a14:useLocalDpi xmlns:a14="http://schemas.microsoft.com/office/drawing/2010/main" val="0"/>
+              </a:ext>
+            </a:extLst>
+          </a:blip>
+          <a:srcRect/>
+          <a:stretch>
+            <a:fillRect/>
+          </a:stretch>
+        </p:blipFill>
+        <p:spPr bwMode="auto">
+          <a:xfrm>
+            <a:off x="528062" y="2132856"/>
+            <a:ext cx="8115300" cy="4572000"/>
+          </a:xfrm>
+          <a:prstGeom prst="rect">
+            <a:avLst/>
+          </a:prstGeom>
+          <a:noFill/>
+          <a:ln>
+            <a:noFill/>
+          </a:ln>
+          <a:extLst>
+            <a:ext uri="{909E8E84-426E-40DD-AFC4-6F175D3DCCD1}">
+              <a14:hiddenFill xmlns:a14="http://schemas.microsoft.com/office/drawing/2010/main">
+                <a:solidFill>
+                  <a:schemeClr val="accent1"/>
+                </a:solidFill>
+              </a14:hiddenFill>
+            </a:ext>
+            <a:ext uri="{91240B29-F687-4F45-9708-019B960494DF}">
+              <a14:hiddenLine xmlns:a14="http://schemas.microsoft.com/office/drawing/2010/main" w="9525">
+                <a:solidFill>
+                  <a:schemeClr val="tx1"/>
+                </a:solidFill>
+                <a:miter lim="800000"/>
+                <a:headEnd/>
+                <a:tailEnd/>
+              </a14:hiddenLine>
+            </a:ext>
+          </a:extLst>
+        </p:spPr>
+      </p:pic>
     </p:spTree>
     <p:extLst>
       <p:ext uri="{BB962C8B-B14F-4D97-AF65-F5344CB8AC3E}">
-        <p14:creationId xmlns:p14="http://schemas.microsoft.com/office/powerpoint/2010/main" val="4240120593"/>
+        <p14:creationId xmlns:p14="http://schemas.microsoft.com/office/powerpoint/2010/main" val="3144090718"/>
       </p:ext>
     </p:extLst>
   </p:cSld>
@@ -3732,7 +6741,11 @@
           <a:p>
             <a:r>
               <a:rPr lang="en-US" dirty="0" smtClean="0"/>
-              <a:t>Visual Encoding</a:t>
+              <a:t>Visual </a:t>
+            </a:r>
+            <a:r>
+              <a:rPr lang="en-US" dirty="0" smtClean="0"/>
+              <a:t>Encoding – Item 1</a:t>
             </a:r>
             <a:endParaRPr lang="pt-PT" dirty="0"/>
           </a:p>
@@ -3755,23 +6768,60 @@
           </a:bodyPr>
           <a:lstStyle/>
           <a:p>
+            <a:pPr algn="ctr"/>
             <a:r>
               <a:rPr lang="en-US" sz="4000" dirty="0" smtClean="0"/>
-              <a:t>Item2 | Type:</a:t>
+              <a:t>Ranks</a:t>
             </a:r>
           </a:p>
           <a:p>
             <a:r>
               <a:rPr lang="en-US" sz="4000" dirty="0" smtClean="0"/>
-              <a:t>Visual Encoding:</a:t>
-            </a:r>
+              <a:t>Type: </a:t>
+            </a:r>
+            <a:endParaRPr lang="en-US" sz="4000" dirty="0"/>
+          </a:p>
+          <a:p>
+            <a:pPr marL="971550" lvl="1" indent="-571500">
+              <a:buFont typeface="Arial" panose="020B0604020202020204" pitchFamily="34" charset="0"/>
+              <a:buChar char="•"/>
+            </a:pPr>
+            <a:r>
+              <a:rPr lang="en-US" sz="3600" dirty="0"/>
+              <a:t>Length</a:t>
+            </a:r>
+          </a:p>
+          <a:p>
+            <a:pPr marL="971550" lvl="1" indent="-571500">
+              <a:buFont typeface="Arial" panose="020B0604020202020204" pitchFamily="34" charset="0"/>
+              <a:buChar char="•"/>
+            </a:pPr>
+            <a:r>
+              <a:rPr lang="en-GB" sz="3600" dirty="0"/>
+              <a:t>colour </a:t>
+            </a:r>
+            <a:endParaRPr lang="en-GB" sz="3600" dirty="0" smtClean="0"/>
+          </a:p>
+          <a:p>
+            <a:pPr marL="971550" lvl="1" indent="-571500">
+              <a:buFont typeface="Arial" panose="020B0604020202020204" pitchFamily="34" charset="0"/>
+              <a:buChar char="•"/>
+            </a:pPr>
+            <a:r>
+              <a:rPr lang="en-GB" sz="3600" dirty="0" smtClean="0"/>
+              <a:t>Text Labels</a:t>
+            </a:r>
+            <a:endParaRPr lang="en-GB" sz="3600" dirty="0"/>
+          </a:p>
+          <a:p>
+            <a:endParaRPr lang="en-US" sz="4000" dirty="0" smtClean="0"/>
           </a:p>
         </p:txBody>
       </p:sp>
     </p:spTree>
     <p:extLst>
       <p:ext uri="{BB962C8B-B14F-4D97-AF65-F5344CB8AC3E}">
-        <p14:creationId xmlns:p14="http://schemas.microsoft.com/office/powerpoint/2010/main" val="4281510844"/>
+        <p14:creationId xmlns:p14="http://schemas.microsoft.com/office/powerpoint/2010/main" val="4240120593"/>
       </p:ext>
     </p:extLst>
   </p:cSld>
@@ -3807,12 +6857,12 @@
       </p:grpSpPr>
       <p:sp>
         <p:nvSpPr>
-          <p:cNvPr id="6" name="Text Placeholder 5"/>
-          <p:cNvSpPr>
-            <a:spLocks noGrp="1"/>
-          </p:cNvSpPr>
-          <p:nvPr>
-            <p:ph type="body" sz="quarter" idx="11"/>
+          <p:cNvPr id="2" name="Title 1"/>
+          <p:cNvSpPr>
+            <a:spLocks noGrp="1"/>
+          </p:cNvSpPr>
+          <p:nvPr>
+            <p:ph type="title"/>
           </p:nvPr>
         </p:nvSpPr>
         <p:spPr/>
@@ -3820,93 +6870,234 @@
           <a:bodyPr/>
           <a:lstStyle/>
           <a:p>
-            <a:endParaRPr lang="en-US" dirty="0"/>
-          </a:p>
-        </p:txBody>
-      </p:sp>
-      <p:sp>
-        <p:nvSpPr>
-          <p:cNvPr id="29" name="Text Placeholder 28"/>
-          <p:cNvSpPr>
-            <a:spLocks noGrp="1"/>
-          </p:cNvSpPr>
-          <p:nvPr>
-            <p:ph type="body" sz="quarter" idx="10"/>
+            <a:r>
+              <a:rPr lang="en-US" dirty="0" smtClean="0"/>
+              <a:t>Visual </a:t>
+            </a:r>
+            <a:r>
+              <a:rPr lang="en-US" dirty="0"/>
+              <a:t>Encoding – Item 1</a:t>
+            </a:r>
+            <a:endParaRPr lang="pt-PT" dirty="0"/>
+          </a:p>
+        </p:txBody>
+      </p:sp>
+      <p:sp>
+        <p:nvSpPr>
+          <p:cNvPr id="3" name="Content Placeholder 2"/>
+          <p:cNvSpPr>
+            <a:spLocks noGrp="1"/>
+          </p:cNvSpPr>
+          <p:nvPr>
+            <p:ph idx="1"/>
           </p:nvPr>
         </p:nvSpPr>
         <p:spPr/>
         <p:txBody>
-          <a:bodyPr/>
-          <a:lstStyle/>
-          <a:p>
-            <a:r>
-              <a:rPr lang="pt-PT" sz="16600" dirty="0" smtClean="0"/>
-              <a:t>02</a:t>
-            </a:r>
-            <a:endParaRPr lang="pt-PT" sz="16600" dirty="0"/>
-          </a:p>
-        </p:txBody>
-      </p:sp>
-      <p:sp>
-        <p:nvSpPr>
-          <p:cNvPr id="4" name="Title 3"/>
-          <p:cNvSpPr>
-            <a:spLocks noGrp="1"/>
-          </p:cNvSpPr>
-          <p:nvPr>
-            <p:ph type="title"/>
-          </p:nvPr>
+          <a:bodyPr>
+            <a:noAutofit/>
+          </a:bodyPr>
+          <a:lstStyle/>
+          <a:p>
+            <a:pPr algn="ctr"/>
+            <a:r>
+              <a:rPr lang="en-US" sz="4000" dirty="0" smtClean="0"/>
+              <a:t>Ranks</a:t>
+            </a:r>
+          </a:p>
+          <a:p>
+            <a:r>
+              <a:rPr lang="en-US" sz="4000" dirty="0"/>
+              <a:t>Visual Encoding:</a:t>
+            </a:r>
+          </a:p>
+          <a:p>
+            <a:pPr marL="400050" lvl="1" indent="0"/>
+            <a:r>
+              <a:rPr lang="en-US" sz="3600" dirty="0" smtClean="0"/>
+              <a:t>	</a:t>
+            </a:r>
+            <a:endParaRPr lang="en-US" sz="3600" dirty="0" smtClean="0"/>
+          </a:p>
+        </p:txBody>
+      </p:sp>
+      <p:graphicFrame>
+        <p:nvGraphicFramePr>
+          <p:cNvPr id="4" name="Gráfico 3"/>
+          <p:cNvGraphicFramePr/>
+          <p:nvPr>
+            <p:extLst>
+              <p:ext uri="{D42A27DB-BD31-4B8C-83A1-F6EECF244321}">
+                <p14:modId xmlns:p14="http://schemas.microsoft.com/office/powerpoint/2010/main" val="3025582201"/>
+              </p:ext>
+            </p:extLst>
+          </p:nvPr>
+        </p:nvGraphicFramePr>
+        <p:xfrm>
+          <a:off x="1547664" y="2564904"/>
+          <a:ext cx="6096000" cy="4064000"/>
+        </p:xfrm>
+        <a:graphic>
+          <a:graphicData uri="http://schemas.openxmlformats.org/drawingml/2006/chart">
+            <c:chart xmlns:c="http://schemas.openxmlformats.org/drawingml/2006/chart" xmlns:r="http://schemas.openxmlformats.org/officeDocument/2006/relationships" r:id="rId3"/>
+          </a:graphicData>
+        </a:graphic>
+      </p:graphicFrame>
+      <p:sp>
+        <p:nvSpPr>
+          <p:cNvPr id="5" name="CaixaDeTexto 4"/>
+          <p:cNvSpPr txBox="1"/>
+          <p:nvPr/>
         </p:nvSpPr>
         <p:spPr>
           <a:xfrm>
-            <a:off x="1907704" y="3214686"/>
-            <a:ext cx="7160096" cy="3033714"/>
+            <a:off x="469112" y="2901712"/>
+            <a:ext cx="1368152" cy="369332"/>
           </a:xfrm>
-          <a:solidFill>
-            <a:srgbClr val="FFFFFF">
-              <a:alpha val="80000"/>
-            </a:srgbClr>
-          </a:solidFill>
+          <a:prstGeom prst="rect">
+            <a:avLst/>
+          </a:prstGeom>
+          <a:noFill/>
         </p:spPr>
         <p:txBody>
-          <a:bodyPr rIns="288000">
-            <a:noAutofit/>
+          <a:bodyPr wrap="square" rtlCol="0">
+            <a:spAutoFit/>
           </a:bodyPr>
           <a:lstStyle/>
           <a:p>
-            <a:pPr marL="0" algn="r"/>
-            <a:r>
-              <a:rPr lang="pt-PT" sz="6000" dirty="0" smtClean="0"/>
-              <a:t>IDIOM – </a:t>
-            </a:r>
-            <a:r>
-              <a:rPr lang="pt-PT" sz="6000" dirty="0" err="1" smtClean="0"/>
-              <a:t>tasks</a:t>
-            </a:r>
-            <a:r>
-              <a:rPr lang="pt-PT" sz="6000" dirty="0" smtClean="0"/>
-              <a:t>/</a:t>
-            </a:r>
-            <a:r>
-              <a:rPr lang="pt-PT" sz="6000" dirty="0" err="1" smtClean="0"/>
-              <a:t>questions</a:t>
-            </a:r>
-            <a:r>
-              <a:rPr lang="pt-PT" sz="6000" dirty="0" smtClean="0"/>
-              <a:t> </a:t>
-            </a:r>
-            <a:r>
-              <a:rPr lang="pt-PT" sz="6000" dirty="0" err="1" smtClean="0"/>
-              <a:t>mapping</a:t>
-            </a:r>
-            <a:endParaRPr lang="pt-PT" sz="6000" dirty="0"/>
+            <a:pPr algn="ctr"/>
+            <a:r>
+              <a:rPr lang="pt-PT" dirty="0" smtClean="0"/>
+              <a:t>USA</a:t>
+            </a:r>
+            <a:endParaRPr lang="pt-PT" dirty="0"/>
+          </a:p>
+        </p:txBody>
+      </p:sp>
+      <p:sp>
+        <p:nvSpPr>
+          <p:cNvPr id="6" name="CaixaDeTexto 5"/>
+          <p:cNvSpPr txBox="1"/>
+          <p:nvPr/>
+        </p:nvSpPr>
+        <p:spPr>
+          <a:xfrm>
+            <a:off x="755576" y="3645024"/>
+            <a:ext cx="715260" cy="369332"/>
+          </a:xfrm>
+          <a:prstGeom prst="rect">
+            <a:avLst/>
+          </a:prstGeom>
+          <a:noFill/>
+        </p:spPr>
+        <p:txBody>
+          <a:bodyPr wrap="none" rtlCol="0">
+            <a:spAutoFit/>
+          </a:bodyPr>
+          <a:lstStyle/>
+          <a:p>
+            <a:r>
+              <a:rPr lang="pt-PT" dirty="0" smtClean="0"/>
+              <a:t>China</a:t>
+            </a:r>
+            <a:endParaRPr lang="pt-PT" dirty="0"/>
+          </a:p>
+        </p:txBody>
+      </p:sp>
+      <p:sp>
+        <p:nvSpPr>
+          <p:cNvPr id="7" name="CaixaDeTexto 6"/>
+          <p:cNvSpPr txBox="1"/>
+          <p:nvPr/>
+        </p:nvSpPr>
+        <p:spPr>
+          <a:xfrm>
+            <a:off x="821106" y="5166484"/>
+            <a:ext cx="584199" cy="369332"/>
+          </a:xfrm>
+          <a:prstGeom prst="rect">
+            <a:avLst/>
+          </a:prstGeom>
+          <a:noFill/>
+        </p:spPr>
+        <p:txBody>
+          <a:bodyPr wrap="none" rtlCol="0">
+            <a:spAutoFit/>
+          </a:bodyPr>
+          <a:lstStyle/>
+          <a:p>
+            <a:r>
+              <a:rPr lang="pt-PT" dirty="0" err="1" smtClean="0"/>
+              <a:t>Italy</a:t>
+            </a:r>
+            <a:endParaRPr lang="pt-PT" dirty="0"/>
+          </a:p>
+        </p:txBody>
+      </p:sp>
+      <p:sp>
+        <p:nvSpPr>
+          <p:cNvPr id="8" name="CaixaDeTexto 7"/>
+          <p:cNvSpPr txBox="1"/>
+          <p:nvPr/>
+        </p:nvSpPr>
+        <p:spPr>
+          <a:xfrm>
+            <a:off x="7380312" y="2901712"/>
+            <a:ext cx="418704" cy="369332"/>
+          </a:xfrm>
+          <a:prstGeom prst="rect">
+            <a:avLst/>
+          </a:prstGeom>
+          <a:noFill/>
+        </p:spPr>
+        <p:txBody>
+          <a:bodyPr wrap="none" rtlCol="0">
+            <a:spAutoFit/>
+          </a:bodyPr>
+          <a:lstStyle/>
+          <a:p>
+            <a:r>
+              <a:rPr lang="pt-PT" dirty="0" smtClean="0"/>
+              <a:t>92</a:t>
+            </a:r>
+            <a:endParaRPr lang="pt-PT" dirty="0"/>
+          </a:p>
+        </p:txBody>
+      </p:sp>
+      <p:sp>
+        <p:nvSpPr>
+          <p:cNvPr id="9" name="CaixaDeTexto 8"/>
+          <p:cNvSpPr txBox="1"/>
+          <p:nvPr/>
+        </p:nvSpPr>
+        <p:spPr>
+          <a:xfrm>
+            <a:off x="6300192" y="3713882"/>
+            <a:ext cx="418704" cy="369332"/>
+          </a:xfrm>
+          <a:prstGeom prst="rect">
+            <a:avLst/>
+          </a:prstGeom>
+          <a:noFill/>
+        </p:spPr>
+        <p:txBody>
+          <a:bodyPr wrap="none" rtlCol="0">
+            <a:spAutoFit/>
+          </a:bodyPr>
+          <a:lstStyle/>
+          <a:p>
+            <a:r>
+              <a:rPr lang="pt-PT" dirty="0" smtClean="0"/>
+              <a:t>75</a:t>
+            </a:r>
+            <a:endParaRPr lang="pt-PT" dirty="0"/>
           </a:p>
         </p:txBody>
       </p:sp>
     </p:spTree>
     <p:extLst>
       <p:ext uri="{BB962C8B-B14F-4D97-AF65-F5344CB8AC3E}">
-        <p14:creationId xmlns:p14="http://schemas.microsoft.com/office/powerpoint/2010/main" val="627357321"/>
+        <p14:creationId xmlns:p14="http://schemas.microsoft.com/office/powerpoint/2010/main" val="3424002475"/>
       </p:ext>
     </p:extLst>
   </p:cSld>
@@ -3950,14 +7141,23 @@
             <p:ph type="title"/>
           </p:nvPr>
         </p:nvSpPr>
-        <p:spPr/>
+        <p:spPr>
+          <a:xfrm>
+            <a:off x="-32" y="0"/>
+            <a:ext cx="9144032" cy="857256"/>
+          </a:xfrm>
+        </p:spPr>
         <p:txBody>
           <a:bodyPr/>
           <a:lstStyle/>
           <a:p>
             <a:r>
               <a:rPr lang="en-US" dirty="0" smtClean="0"/>
-              <a:t>Task 1</a:t>
+              <a:t>Visual </a:t>
+            </a:r>
+            <a:r>
+              <a:rPr lang="en-US" dirty="0" smtClean="0"/>
+              <a:t>Encoding – Item 2</a:t>
             </a:r>
             <a:endParaRPr lang="pt-PT" dirty="0"/>
           </a:p>
@@ -3980,21 +7180,73 @@
           </a:bodyPr>
           <a:lstStyle/>
           <a:p>
-            <a:r>
-              <a:rPr lang="en-US" dirty="0" smtClean="0"/>
-              <a:t>Selected Idiom and why it allows answering each question</a:t>
-            </a:r>
-          </a:p>
-          <a:p>
-            <a:pPr lvl="1"/>
-            <a:endParaRPr lang="en-US" sz="2000" dirty="0" smtClean="0"/>
-          </a:p>
-        </p:txBody>
-      </p:sp>
+            <a:pPr algn="ctr"/>
+            <a:r>
+              <a:rPr lang="en-US" sz="4000" dirty="0" smtClean="0"/>
+              <a:t>A map</a:t>
+            </a:r>
+            <a:endParaRPr lang="en-US" sz="4000" dirty="0" smtClean="0"/>
+          </a:p>
+        </p:txBody>
+      </p:sp>
+      <p:pic>
+        <p:nvPicPr>
+          <p:cNvPr id="2051" name="Picture 3"/>
+          <p:cNvPicPr>
+            <a:picLocks noChangeAspect="1" noChangeArrowheads="1"/>
+          </p:cNvPicPr>
+          <p:nvPr/>
+        </p:nvPicPr>
+        <p:blipFill>
+          <a:blip r:embed="rId3">
+            <a:extLst>
+              <a:ext uri="{28A0092B-C50C-407E-A947-70E740481C1C}">
+                <a14:useLocalDpi xmlns:a14="http://schemas.microsoft.com/office/drawing/2010/main" val="0"/>
+              </a:ext>
+            </a:extLst>
+          </a:blip>
+          <a:srcRect/>
+          <a:stretch>
+            <a:fillRect/>
+          </a:stretch>
+        </p:blipFill>
+        <p:spPr bwMode="auto">
+          <a:xfrm>
+            <a:off x="971600" y="1951497"/>
+            <a:ext cx="7042944" cy="4515978"/>
+          </a:xfrm>
+          <a:prstGeom prst="rect">
+            <a:avLst/>
+          </a:prstGeom>
+          <a:noFill/>
+          <a:ln>
+            <a:noFill/>
+          </a:ln>
+          <a:extLst>
+            <a:ext uri="{909E8E84-426E-40DD-AFC4-6F175D3DCCD1}">
+              <a14:hiddenFill xmlns:a14="http://schemas.microsoft.com/office/drawing/2010/main">
+                <a:solidFill>
+                  <a:schemeClr val="accent1"/>
+                </a:solidFill>
+              </a14:hiddenFill>
+            </a:ext>
+            <a:ext uri="{91240B29-F687-4F45-9708-019B960494DF}">
+              <a14:hiddenLine xmlns:a14="http://schemas.microsoft.com/office/drawing/2010/main" w="9525">
+                <a:solidFill>
+                  <a:schemeClr val="tx1"/>
+                </a:solidFill>
+                <a:miter lim="800000"/>
+                <a:headEnd/>
+                <a:tailEnd/>
+              </a14:hiddenLine>
+            </a:ext>
+          </a:extLst>
+        </p:spPr>
+      </p:pic>
     </p:spTree>
     <p:extLst>
       <p:ext uri="{BB962C8B-B14F-4D97-AF65-F5344CB8AC3E}">
-        <p14:creationId xmlns:p14="http://schemas.microsoft.com/office/powerpoint/2010/main" val="2962997025"/>
+        <p14:creationId xmlns:p14="http://schemas.microsoft.com/office/powerpoint/2010/main" val="4281510844"/>
       </p:ext>
     </p:extLst>
   </p:cSld>
@@ -4038,14 +7290,23 @@
             <p:ph type="title"/>
           </p:nvPr>
         </p:nvSpPr>
-        <p:spPr/>
+        <p:spPr>
+          <a:xfrm>
+            <a:off x="-32" y="0"/>
+            <a:ext cx="9144032" cy="857256"/>
+          </a:xfrm>
+        </p:spPr>
         <p:txBody>
           <a:bodyPr/>
           <a:lstStyle/>
           <a:p>
             <a:r>
               <a:rPr lang="en-US" dirty="0" smtClean="0"/>
-              <a:t>Task 2</a:t>
+              <a:t>Visual </a:t>
+            </a:r>
+            <a:r>
+              <a:rPr lang="en-US" dirty="0" smtClean="0"/>
+              <a:t>Encoding – Item 2</a:t>
             </a:r>
             <a:endParaRPr lang="pt-PT" dirty="0"/>
           </a:p>
@@ -4068,22 +7329,507 @@
           </a:bodyPr>
           <a:lstStyle/>
           <a:p>
-            <a:r>
-              <a:rPr lang="en-US" dirty="0"/>
-              <a:t>Selected Idiom and why it allows answering each </a:t>
-            </a:r>
-            <a:r>
-              <a:rPr lang="en-US" dirty="0" smtClean="0"/>
-              <a:t>question</a:t>
-            </a:r>
-            <a:endParaRPr lang="en-US" dirty="0"/>
+            <a:pPr algn="ctr"/>
+            <a:r>
+              <a:rPr lang="en-US" sz="4000" dirty="0" smtClean="0"/>
+              <a:t>A map</a:t>
+            </a:r>
+            <a:endParaRPr lang="en-US" sz="4000" dirty="0" smtClean="0"/>
+          </a:p>
+          <a:p>
+            <a:r>
+              <a:rPr lang="en-US" sz="4000" dirty="0" smtClean="0"/>
+              <a:t>Type:</a:t>
+            </a:r>
+          </a:p>
+          <a:p>
+            <a:pPr marL="971550" lvl="1" indent="-571500">
+              <a:buFont typeface="Arial" panose="020B0604020202020204" pitchFamily="34" charset="0"/>
+              <a:buChar char="•"/>
+            </a:pPr>
+            <a:r>
+              <a:rPr lang="en-US" sz="3600" dirty="0" smtClean="0"/>
+              <a:t>Size/Area</a:t>
+            </a:r>
+            <a:r>
+              <a:rPr lang="en-US" sz="3600" dirty="0"/>
+              <a:t>	</a:t>
+            </a:r>
+            <a:endParaRPr lang="en-US" sz="3600" dirty="0" smtClean="0"/>
+          </a:p>
+          <a:p>
+            <a:pPr marL="971550" lvl="1" indent="-571500">
+              <a:buFont typeface="Arial" panose="020B0604020202020204" pitchFamily="34" charset="0"/>
+              <a:buChar char="•"/>
+            </a:pPr>
+            <a:r>
+              <a:rPr lang="en-US" sz="3600" dirty="0" smtClean="0"/>
+              <a:t>Text Labels</a:t>
+            </a:r>
+            <a:endParaRPr lang="en-US" sz="3600" dirty="0" smtClean="0"/>
           </a:p>
         </p:txBody>
       </p:sp>
     </p:spTree>
     <p:extLst>
       <p:ext uri="{BB962C8B-B14F-4D97-AF65-F5344CB8AC3E}">
-        <p14:creationId xmlns:p14="http://schemas.microsoft.com/office/powerpoint/2010/main" val="346640620"/>
+        <p14:creationId xmlns:p14="http://schemas.microsoft.com/office/powerpoint/2010/main" val="4250700648"/>
+      </p:ext>
+    </p:extLst>
+  </p:cSld>
+  <p:clrMapOvr>
+    <a:masterClrMapping/>
+  </p:clrMapOvr>
+  <p:timing>
+    <p:tnLst>
+      <p:par>
+        <p:cTn id="1" dur="indefinite" restart="never" nodeType="tmRoot"/>
+      </p:par>
+    </p:tnLst>
+  </p:timing>
+</p:sld>
+</file>
+
+<file path=ppt/slides/slide8.xml><?xml version="1.0" encoding="utf-8"?>
+<p:sld xmlns:a="http://schemas.openxmlformats.org/drawingml/2006/main" xmlns:r="http://schemas.openxmlformats.org/officeDocument/2006/relationships" xmlns:p="http://schemas.openxmlformats.org/presentationml/2006/main">
+  <p:cSld>
+    <p:spTree>
+      <p:nvGrpSpPr>
+        <p:cNvPr id="1" name=""/>
+        <p:cNvGrpSpPr/>
+        <p:nvPr/>
+      </p:nvGrpSpPr>
+      <p:grpSpPr>
+        <a:xfrm>
+          <a:off x="0" y="0"/>
+          <a:ext cx="0" cy="0"/>
+          <a:chOff x="0" y="0"/>
+          <a:chExt cx="0" cy="0"/>
+        </a:xfrm>
+      </p:grpSpPr>
+      <p:pic>
+        <p:nvPicPr>
+          <p:cNvPr id="3074" name="Picture 2"/>
+          <p:cNvPicPr>
+            <a:picLocks noChangeAspect="1" noChangeArrowheads="1"/>
+          </p:cNvPicPr>
+          <p:nvPr/>
+        </p:nvPicPr>
+        <p:blipFill>
+          <a:blip r:embed="rId3">
+            <a:extLst>
+              <a:ext uri="{28A0092B-C50C-407E-A947-70E740481C1C}">
+                <a14:useLocalDpi xmlns:a14="http://schemas.microsoft.com/office/drawing/2010/main" val="0"/>
+              </a:ext>
+            </a:extLst>
+          </a:blip>
+          <a:srcRect/>
+          <a:stretch>
+            <a:fillRect/>
+          </a:stretch>
+        </p:blipFill>
+        <p:spPr bwMode="auto">
+          <a:xfrm>
+            <a:off x="2483768" y="2782398"/>
+            <a:ext cx="3672408" cy="3930098"/>
+          </a:xfrm>
+          <a:prstGeom prst="rect">
+            <a:avLst/>
+          </a:prstGeom>
+          <a:noFill/>
+          <a:ln>
+            <a:noFill/>
+          </a:ln>
+          <a:extLst>
+            <a:ext uri="{909E8E84-426E-40DD-AFC4-6F175D3DCCD1}">
+              <a14:hiddenFill xmlns:a14="http://schemas.microsoft.com/office/drawing/2010/main">
+                <a:solidFill>
+                  <a:schemeClr val="accent1"/>
+                </a:solidFill>
+              </a14:hiddenFill>
+            </a:ext>
+            <a:ext uri="{91240B29-F687-4F45-9708-019B960494DF}">
+              <a14:hiddenLine xmlns:a14="http://schemas.microsoft.com/office/drawing/2010/main" w="9525">
+                <a:solidFill>
+                  <a:schemeClr val="tx1"/>
+                </a:solidFill>
+                <a:miter lim="800000"/>
+                <a:headEnd/>
+                <a:tailEnd/>
+              </a14:hiddenLine>
+            </a:ext>
+          </a:extLst>
+        </p:spPr>
+      </p:pic>
+      <p:sp>
+        <p:nvSpPr>
+          <p:cNvPr id="2" name="Title 1"/>
+          <p:cNvSpPr>
+            <a:spLocks noGrp="1"/>
+          </p:cNvSpPr>
+          <p:nvPr>
+            <p:ph type="title"/>
+          </p:nvPr>
+        </p:nvSpPr>
+        <p:spPr>
+          <a:xfrm>
+            <a:off x="-32" y="0"/>
+            <a:ext cx="9144032" cy="857256"/>
+          </a:xfrm>
+        </p:spPr>
+        <p:txBody>
+          <a:bodyPr/>
+          <a:lstStyle/>
+          <a:p>
+            <a:r>
+              <a:rPr lang="en-US" dirty="0" smtClean="0"/>
+              <a:t>Visual </a:t>
+            </a:r>
+            <a:r>
+              <a:rPr lang="en-US" dirty="0" smtClean="0"/>
+              <a:t>Encoding – Item 2</a:t>
+            </a:r>
+            <a:endParaRPr lang="pt-PT" dirty="0"/>
+          </a:p>
+        </p:txBody>
+      </p:sp>
+      <p:sp>
+        <p:nvSpPr>
+          <p:cNvPr id="3" name="Content Placeholder 2"/>
+          <p:cNvSpPr>
+            <a:spLocks noGrp="1"/>
+          </p:cNvSpPr>
+          <p:nvPr>
+            <p:ph idx="1"/>
+          </p:nvPr>
+        </p:nvSpPr>
+        <p:spPr/>
+        <p:txBody>
+          <a:bodyPr>
+            <a:noAutofit/>
+          </a:bodyPr>
+          <a:lstStyle/>
+          <a:p>
+            <a:pPr algn="ctr"/>
+            <a:r>
+              <a:rPr lang="en-US" sz="4000" dirty="0" smtClean="0"/>
+              <a:t>A map</a:t>
+            </a:r>
+            <a:endParaRPr lang="en-US" sz="4000" dirty="0" smtClean="0"/>
+          </a:p>
+          <a:p>
+            <a:r>
+              <a:rPr lang="en-US" sz="4000" dirty="0" smtClean="0"/>
+              <a:t>Visual </a:t>
+            </a:r>
+            <a:r>
+              <a:rPr lang="en-US" sz="4000" dirty="0" smtClean="0"/>
+              <a:t>Encoding:</a:t>
+            </a:r>
+          </a:p>
+        </p:txBody>
+      </p:sp>
+      <p:sp>
+        <p:nvSpPr>
+          <p:cNvPr id="5" name="Fluxograma: conexão 4"/>
+          <p:cNvSpPr/>
+          <p:nvPr/>
+        </p:nvSpPr>
+        <p:spPr>
+          <a:xfrm>
+            <a:off x="4499992" y="3861048"/>
+            <a:ext cx="792088" cy="792088"/>
+          </a:xfrm>
+          <a:prstGeom prst="flowChartConnector">
+            <a:avLst/>
+          </a:prstGeom>
+          <a:ln>
+            <a:noFill/>
+          </a:ln>
+        </p:spPr>
+        <p:style>
+          <a:lnRef idx="3">
+            <a:schemeClr val="lt1"/>
+          </a:lnRef>
+          <a:fillRef idx="1">
+            <a:schemeClr val="accent2"/>
+          </a:fillRef>
+          <a:effectRef idx="1">
+            <a:schemeClr val="accent2"/>
+          </a:effectRef>
+          <a:fontRef idx="minor">
+            <a:schemeClr val="lt1"/>
+          </a:fontRef>
+        </p:style>
+        <p:txBody>
+          <a:bodyPr rtlCol="0" anchor="ctr"/>
+          <a:lstStyle/>
+          <a:p>
+            <a:pPr algn="ctr"/>
+            <a:r>
+              <a:rPr lang="pt-PT" dirty="0"/>
+              <a:t>3</a:t>
+            </a:r>
+            <a:r>
+              <a:rPr lang="pt-PT" dirty="0" smtClean="0"/>
+              <a:t>2</a:t>
+            </a:r>
+            <a:endParaRPr lang="pt-PT" dirty="0"/>
+          </a:p>
+        </p:txBody>
+      </p:sp>
+      <p:sp>
+        <p:nvSpPr>
+          <p:cNvPr id="7" name="Fluxograma: conexão 6"/>
+          <p:cNvSpPr/>
+          <p:nvPr/>
+        </p:nvSpPr>
+        <p:spPr>
+          <a:xfrm>
+            <a:off x="3591792" y="2924945"/>
+            <a:ext cx="548159" cy="351194"/>
+          </a:xfrm>
+          <a:prstGeom prst="flowChartConnector">
+            <a:avLst/>
+          </a:prstGeom>
+          <a:ln>
+            <a:noFill/>
+          </a:ln>
+        </p:spPr>
+        <p:style>
+          <a:lnRef idx="3">
+            <a:schemeClr val="lt1"/>
+          </a:lnRef>
+          <a:fillRef idx="1">
+            <a:schemeClr val="accent2"/>
+          </a:fillRef>
+          <a:effectRef idx="1">
+            <a:schemeClr val="accent2"/>
+          </a:effectRef>
+          <a:fontRef idx="minor">
+            <a:schemeClr val="lt1"/>
+          </a:fontRef>
+        </p:style>
+        <p:txBody>
+          <a:bodyPr rtlCol="0" anchor="ctr"/>
+          <a:lstStyle/>
+          <a:p>
+            <a:pPr algn="ctr"/>
+            <a:r>
+              <a:rPr lang="pt-PT" dirty="0" smtClean="0"/>
+              <a:t>2</a:t>
+            </a:r>
+            <a:endParaRPr lang="pt-PT" dirty="0"/>
+          </a:p>
+        </p:txBody>
+      </p:sp>
+      <p:sp>
+        <p:nvSpPr>
+          <p:cNvPr id="8" name="Fluxograma: conexão 7"/>
+          <p:cNvSpPr/>
+          <p:nvPr/>
+        </p:nvSpPr>
+        <p:spPr>
+          <a:xfrm>
+            <a:off x="3527884" y="4951432"/>
+            <a:ext cx="612068" cy="648072"/>
+          </a:xfrm>
+          <a:prstGeom prst="flowChartConnector">
+            <a:avLst/>
+          </a:prstGeom>
+          <a:ln>
+            <a:noFill/>
+          </a:ln>
+        </p:spPr>
+        <p:style>
+          <a:lnRef idx="3">
+            <a:schemeClr val="lt1"/>
+          </a:lnRef>
+          <a:fillRef idx="1">
+            <a:schemeClr val="accent2"/>
+          </a:fillRef>
+          <a:effectRef idx="1">
+            <a:schemeClr val="accent2"/>
+          </a:effectRef>
+          <a:fontRef idx="minor">
+            <a:schemeClr val="lt1"/>
+          </a:fontRef>
+        </p:style>
+        <p:txBody>
+          <a:bodyPr rtlCol="0" anchor="ctr"/>
+          <a:lstStyle/>
+          <a:p>
+            <a:pPr algn="ctr"/>
+            <a:r>
+              <a:rPr lang="pt-PT" dirty="0" smtClean="0"/>
+              <a:t>14</a:t>
+            </a:r>
+          </a:p>
+        </p:txBody>
+      </p:sp>
+    </p:spTree>
+    <p:extLst>
+      <p:ext uri="{BB962C8B-B14F-4D97-AF65-F5344CB8AC3E}">
+        <p14:creationId xmlns:p14="http://schemas.microsoft.com/office/powerpoint/2010/main" val="3410144530"/>
+      </p:ext>
+    </p:extLst>
+  </p:cSld>
+  <p:clrMapOvr>
+    <a:masterClrMapping/>
+  </p:clrMapOvr>
+  <p:timing>
+    <p:tnLst>
+      <p:par>
+        <p:cTn id="1" dur="indefinite" restart="never" nodeType="tmRoot"/>
+      </p:par>
+    </p:tnLst>
+  </p:timing>
+</p:sld>
+</file>
+
+<file path=ppt/slides/slide9.xml><?xml version="1.0" encoding="utf-8"?>
+<p:sld xmlns:a="http://schemas.openxmlformats.org/drawingml/2006/main" xmlns:r="http://schemas.openxmlformats.org/officeDocument/2006/relationships" xmlns:p="http://schemas.openxmlformats.org/presentationml/2006/main">
+  <p:cSld>
+    <p:spTree>
+      <p:nvGrpSpPr>
+        <p:cNvPr id="1" name=""/>
+        <p:cNvGrpSpPr/>
+        <p:nvPr/>
+      </p:nvGrpSpPr>
+      <p:grpSpPr>
+        <a:xfrm>
+          <a:off x="0" y="0"/>
+          <a:ext cx="0" cy="0"/>
+          <a:chOff x="0" y="0"/>
+          <a:chExt cx="0" cy="0"/>
+        </a:xfrm>
+      </p:grpSpPr>
+      <p:sp>
+        <p:nvSpPr>
+          <p:cNvPr id="2" name="Title 1"/>
+          <p:cNvSpPr>
+            <a:spLocks noGrp="1"/>
+          </p:cNvSpPr>
+          <p:nvPr>
+            <p:ph type="title"/>
+          </p:nvPr>
+        </p:nvSpPr>
+        <p:spPr>
+          <a:xfrm>
+            <a:off x="-32" y="0"/>
+            <a:ext cx="9144032" cy="857256"/>
+          </a:xfrm>
+        </p:spPr>
+        <p:txBody>
+          <a:bodyPr/>
+          <a:lstStyle/>
+          <a:p>
+            <a:r>
+              <a:rPr lang="en-US" dirty="0" smtClean="0"/>
+              <a:t>Visual </a:t>
+            </a:r>
+            <a:r>
+              <a:rPr lang="en-US" dirty="0" smtClean="0"/>
+              <a:t>Encoding – Item 3</a:t>
+            </a:r>
+            <a:endParaRPr lang="pt-PT" dirty="0"/>
+          </a:p>
+        </p:txBody>
+      </p:sp>
+      <p:sp>
+        <p:nvSpPr>
+          <p:cNvPr id="3" name="Content Placeholder 2"/>
+          <p:cNvSpPr>
+            <a:spLocks noGrp="1"/>
+          </p:cNvSpPr>
+          <p:nvPr>
+            <p:ph idx="1"/>
+          </p:nvPr>
+        </p:nvSpPr>
+        <p:spPr/>
+        <p:txBody>
+          <a:bodyPr>
+            <a:noAutofit/>
+          </a:bodyPr>
+          <a:lstStyle/>
+          <a:p>
+            <a:pPr algn="ctr"/>
+            <a:r>
+              <a:rPr lang="en-US" sz="4000" dirty="0" smtClean="0"/>
+              <a:t>Compare result</a:t>
+            </a:r>
+            <a:endParaRPr lang="en-US" sz="4000" dirty="0" smtClean="0"/>
+          </a:p>
+        </p:txBody>
+      </p:sp>
+      <p:pic>
+        <p:nvPicPr>
+          <p:cNvPr id="4098" name="Picture 2"/>
+          <p:cNvPicPr>
+            <a:picLocks noChangeAspect="1" noChangeArrowheads="1"/>
+          </p:cNvPicPr>
+          <p:nvPr/>
+        </p:nvPicPr>
+        <p:blipFill>
+          <a:blip r:embed="rId3">
+            <a:extLst>
+              <a:ext uri="{28A0092B-C50C-407E-A947-70E740481C1C}">
+                <a14:useLocalDpi xmlns:a14="http://schemas.microsoft.com/office/drawing/2010/main" val="0"/>
+              </a:ext>
+            </a:extLst>
+          </a:blip>
+          <a:srcRect/>
+          <a:stretch>
+            <a:fillRect/>
+          </a:stretch>
+        </p:blipFill>
+        <p:spPr bwMode="auto">
+          <a:xfrm>
+            <a:off x="1030982" y="2060848"/>
+            <a:ext cx="7046913" cy="4518025"/>
+          </a:xfrm>
+          <a:prstGeom prst="rect">
+            <a:avLst/>
+          </a:prstGeom>
+          <a:noFill/>
+          <a:ln>
+            <a:noFill/>
+          </a:ln>
+          <a:effectLst/>
+          <a:extLst>
+            <a:ext uri="{909E8E84-426E-40DD-AFC4-6F175D3DCCD1}">
+              <a14:hiddenFill xmlns:a14="http://schemas.microsoft.com/office/drawing/2010/main">
+                <a:solidFill>
+                  <a:schemeClr val="accent1"/>
+                </a:solidFill>
+              </a14:hiddenFill>
+            </a:ext>
+            <a:ext uri="{91240B29-F687-4F45-9708-019B960494DF}">
+              <a14:hiddenLine xmlns:a14="http://schemas.microsoft.com/office/drawing/2010/main" w="9525">
+                <a:solidFill>
+                  <a:schemeClr val="tx1"/>
+                </a:solidFill>
+                <a:miter lim="800000"/>
+                <a:headEnd/>
+                <a:tailEnd/>
+              </a14:hiddenLine>
+            </a:ext>
+            <a:ext uri="{AF507438-7753-43E0-B8FC-AC1667EBCBE1}">
+              <a14:hiddenEffects xmlns:a14="http://schemas.microsoft.com/office/drawing/2010/main">
+                <a:effectLst>
+                  <a:outerShdw dist="35921" dir="2700000" algn="ctr" rotWithShape="0">
+                    <a:schemeClr val="bg2"/>
+                  </a:outerShdw>
+                </a:effectLst>
+              </a14:hiddenEffects>
+            </a:ext>
+          </a:extLst>
+        </p:spPr>
+      </p:pic>
+    </p:spTree>
+    <p:extLst>
+      <p:ext uri="{BB962C8B-B14F-4D97-AF65-F5344CB8AC3E}">
+        <p14:creationId xmlns:p14="http://schemas.microsoft.com/office/powerpoint/2010/main" val="2424258270"/>
       </p:ext>
     </p:extLst>
   </p:cSld>

</xml_diff>

<commit_message>
doc corrigido mais ppt parte 1
</commit_message>
<xml_diff>
--- a/checkpoint3/G01A - Presentation 3.pptx
+++ b/checkpoint3/G01A - Presentation 3.pptx
@@ -127,7 +127,7 @@
   </p:defaultTextStyle>
   <p:extLst>
     <p:ext uri="{EFAFB233-063F-42B5-8137-9DF3F51BA10A}">
-      <p15:sldGuideLst xmlns="" xmlns:p15="http://schemas.microsoft.com/office/powerpoint/2012/main">
+      <p15:sldGuideLst xmlns:p15="http://schemas.microsoft.com/office/powerpoint/2012/main">
         <p15:guide id="1" orient="horz" pos="2160">
           <p15:clr>
             <a:srgbClr val="A4A3A4"/>
@@ -147,7 +147,7 @@
 <file path=ppt/charts/chart1.xml><?xml version="1.0" encoding="utf-8"?>
 <c:chartSpace xmlns:c="http://schemas.openxmlformats.org/drawingml/2006/chart" xmlns:a="http://schemas.openxmlformats.org/drawingml/2006/main" xmlns:r="http://schemas.openxmlformats.org/officeDocument/2006/relationships">
   <c:date1904 val="0"/>
-  <c:lang val="pt-PT"/>
+  <c:lang val="en-US"/>
   <c:roundedCorners val="0"/>
   <mc:AlternateContent xmlns:mc="http://schemas.openxmlformats.org/markup-compatibility/2006">
     <mc:Choice xmlns:c14="http://schemas.microsoft.com/office/drawing/2007/8/2/chart" Requires="c14">
@@ -345,20 +345,21 @@
           <c:showBubbleSize val="0"/>
         </c:dLbls>
         <c:gapWidth val="150"/>
-        <c:axId val="535747584"/>
-        <c:axId val="510031488"/>
+        <c:axId val="-1114699648"/>
+        <c:axId val="-1114693664"/>
       </c:barChart>
       <c:catAx>
-        <c:axId val="535747584"/>
+        <c:axId val="-1114699648"/>
         <c:scaling>
           <c:orientation val="minMax"/>
         </c:scaling>
         <c:delete val="1"/>
         <c:axPos val="l"/>
+        <c:numFmt formatCode="General" sourceLinked="0"/>
         <c:majorTickMark val="out"/>
         <c:minorTickMark val="none"/>
         <c:tickLblPos val="nextTo"/>
-        <c:crossAx val="510031488"/>
+        <c:crossAx val="-1114693664"/>
         <c:crosses val="autoZero"/>
         <c:auto val="1"/>
         <c:lblAlgn val="ctr"/>
@@ -366,7 +367,7 @@
         <c:noMultiLvlLbl val="0"/>
       </c:catAx>
       <c:valAx>
-        <c:axId val="510031488"/>
+        <c:axId val="-1114693664"/>
         <c:scaling>
           <c:orientation val="minMax"/>
         </c:scaling>
@@ -383,7 +384,7 @@
         <c:majorTickMark val="out"/>
         <c:minorTickMark val="none"/>
         <c:tickLblPos val="nextTo"/>
-        <c:crossAx val="535747584"/>
+        <c:crossAx val="-1114699648"/>
         <c:crosses val="autoZero"/>
         <c:crossBetween val="between"/>
       </c:valAx>
@@ -670,7 +671,7 @@
           <a:p>
             <a:fld id="{745C36E7-9E00-462E-80A3-32F2BE615C7A}" type="datetimeFigureOut">
               <a:rPr lang="en-US" smtClean="0"/>
-              <a:t>10/31/2015</a:t>
+              <a:t>11/1/2015</a:t>
             </a:fld>
             <a:endParaRPr lang="en-US"/>
           </a:p>
@@ -736,7 +737,7 @@
           <a:p>
             <a:fld id="{C7B702CB-D988-47C5-8204-95032A6A7C26}" type="slidenum">
               <a:rPr lang="en-US" smtClean="0"/>
-              <a:t>‹nº›</a:t>
+              <a:t>‹#›</a:t>
             </a:fld>
             <a:endParaRPr lang="en-US"/>
           </a:p>
@@ -836,7 +837,7 @@
             <a:fld id="{01F3E309-ED8D-4193-99AF-E5EA90965E98}" type="datetimeFigureOut">
               <a:rPr lang="en-US" smtClean="0"/>
               <a:pPr/>
-              <a:t>10/31/2015</a:t>
+              <a:t>11/1/2015</a:t>
             </a:fld>
             <a:endParaRPr lang="en-US"/>
           </a:p>
@@ -998,7 +999,7 @@
             <a:fld id="{F535F173-C1DD-4975-94BF-5B9ED67F7674}" type="slidenum">
               <a:rPr lang="en-US" smtClean="0"/>
               <a:pPr/>
-              <a:t>‹nº›</a:t>
+              <a:t>‹#›</a:t>
             </a:fld>
             <a:endParaRPr lang="en-US"/>
           </a:p>
@@ -2704,7 +2705,7 @@
             <a:fld id="{F3CC9924-33BC-4796-B0F9-D37DB5D899BF}" type="datetimeFigureOut">
               <a:rPr lang="pt-PT" smtClean="0"/>
               <a:pPr/>
-              <a:t>31/10/2015</a:t>
+              <a:t>01/11/2015</a:t>
             </a:fld>
             <a:endParaRPr lang="pt-PT"/>
           </a:p>
@@ -2763,7 +2764,7 @@
             <a:fld id="{B5EBF8D4-C87A-47B7-9996-84452461937B}" type="slidenum">
               <a:rPr lang="pt-PT" smtClean="0"/>
               <a:pPr/>
-              <a:t>‹nº›</a:t>
+              <a:t>‹#›</a:t>
             </a:fld>
             <a:endParaRPr lang="pt-PT"/>
           </a:p>
@@ -4741,11 +4742,11 @@
           <a:p>
             <a:r>
               <a:rPr lang="en-US" dirty="0" smtClean="0"/>
-              <a:t>Visual </a:t>
+              <a:t>Visual Encoding </a:t>
             </a:r>
             <a:r>
               <a:rPr lang="en-US" dirty="0" smtClean="0"/>
-              <a:t>Encoding – Item 3</a:t>
+              <a:t>–3</a:t>
             </a:r>
             <a:endParaRPr lang="pt-PT" dirty="0"/>
           </a:p>
@@ -4771,7 +4772,11 @@
             <a:pPr algn="ctr"/>
             <a:r>
               <a:rPr lang="en-US" sz="4000" dirty="0" smtClean="0"/>
-              <a:t>Compare result</a:t>
+              <a:t>Compare </a:t>
+            </a:r>
+            <a:r>
+              <a:rPr lang="en-US" sz="4000" dirty="0" smtClean="0"/>
+              <a:t>results</a:t>
             </a:r>
             <a:endParaRPr lang="en-US" sz="4000" dirty="0" smtClean="0"/>
           </a:p>
@@ -4849,13 +4854,13 @@
         </p:nvCxnSpPr>
         <p:spPr>
           <a:xfrm flipH="1">
-            <a:off x="4355976" y="2636912"/>
-            <a:ext cx="4104456" cy="1296144"/>
+            <a:off x="4355976" y="3429000"/>
+            <a:ext cx="576064" cy="504056"/>
           </a:xfrm>
           <a:prstGeom prst="straightConnector1">
             <a:avLst/>
           </a:prstGeom>
-          <a:ln>
+          <a:ln w="63500">
             <a:solidFill>
               <a:srgbClr val="FF0000"/>
             </a:solidFill>
@@ -4884,14 +4889,14 @@
           <p:nvPr/>
         </p:nvCxnSpPr>
         <p:spPr>
-          <a:xfrm>
-            <a:off x="755576" y="4941168"/>
-            <a:ext cx="2556284" cy="0"/>
+          <a:xfrm flipV="1">
+            <a:off x="2267744" y="4941168"/>
+            <a:ext cx="1044116" cy="504056"/>
           </a:xfrm>
           <a:prstGeom prst="straightConnector1">
             <a:avLst/>
           </a:prstGeom>
-          <a:ln>
+          <a:ln w="63500">
             <a:tailEnd type="arrow"/>
           </a:ln>
         </p:spPr>
@@ -4969,11 +4974,11 @@
           <a:p>
             <a:r>
               <a:rPr lang="en-US" dirty="0" smtClean="0"/>
-              <a:t>Visual </a:t>
+              <a:t>Visual Encoding – </a:t>
             </a:r>
             <a:r>
               <a:rPr lang="en-US" dirty="0" smtClean="0"/>
-              <a:t>Encoding – Item 3</a:t>
+              <a:t>3</a:t>
             </a:r>
             <a:endParaRPr lang="pt-PT" dirty="0"/>
           </a:p>
@@ -4989,24 +4994,39 @@
             <p:ph idx="1"/>
           </p:nvPr>
         </p:nvSpPr>
-        <p:spPr/>
+        <p:spPr>
+          <a:xfrm>
+            <a:off x="457200" y="1285860"/>
+            <a:ext cx="8229600" cy="4807436"/>
+          </a:xfrm>
+        </p:spPr>
         <p:txBody>
           <a:bodyPr>
-            <a:noAutofit/>
+            <a:normAutofit/>
           </a:bodyPr>
           <a:lstStyle/>
           <a:p>
             <a:pPr algn="ctr"/>
             <a:r>
               <a:rPr lang="en-US" sz="4000" dirty="0" smtClean="0"/>
-              <a:t>Compare result</a:t>
-            </a:r>
+              <a:t>Compare </a:t>
+            </a:r>
+            <a:r>
+              <a:rPr lang="en-US" sz="4000" dirty="0" smtClean="0"/>
+              <a:t>results - additions</a:t>
+            </a:r>
+            <a:endParaRPr lang="en-US" sz="4000" dirty="0" smtClean="0"/>
           </a:p>
           <a:p>
             <a:r>
               <a:rPr lang="en-US" sz="4000" dirty="0"/>
-              <a:t>Type:</a:t>
-            </a:r>
+              <a:t>T</a:t>
+            </a:r>
+            <a:r>
+              <a:rPr lang="en-US" sz="4000" dirty="0" smtClean="0"/>
+              <a:t>ype:</a:t>
+            </a:r>
+            <a:endParaRPr lang="en-US" sz="4000" dirty="0"/>
           </a:p>
           <a:p>
             <a:pPr marL="971550" lvl="1" indent="-571500">
@@ -5015,50 +5035,13 @@
             </a:pPr>
             <a:r>
               <a:rPr lang="en-US" sz="3600" dirty="0" smtClean="0"/>
-              <a:t>Colors</a:t>
+              <a:t>Colors – to distinguish the two countries</a:t>
             </a:r>
             <a:endParaRPr lang="en-US" sz="3600" dirty="0"/>
           </a:p>
           <a:p>
-            <a:pPr marL="971550" lvl="1" indent="-571500">
-              <a:buFont typeface="Arial" panose="020B0604020202020204" pitchFamily="34" charset="0"/>
-              <a:buChar char="•"/>
-            </a:pPr>
-            <a:r>
-              <a:rPr lang="en-US" sz="3600" dirty="0" smtClean="0"/>
-              <a:t>Pattern Textures</a:t>
-            </a:r>
-          </a:p>
-          <a:p>
-            <a:pPr marL="971550" lvl="1" indent="-571500">
-              <a:buFont typeface="Arial" panose="020B0604020202020204" pitchFamily="34" charset="0"/>
-              <a:buChar char="•"/>
-            </a:pPr>
-            <a:r>
-              <a:rPr lang="en-US" sz="3600" dirty="0" smtClean="0"/>
-              <a:t>Area/Size</a:t>
-            </a:r>
-          </a:p>
-          <a:p>
-            <a:pPr marL="971550" lvl="1" indent="-571500">
-              <a:buFont typeface="Arial" panose="020B0604020202020204" pitchFamily="34" charset="0"/>
-              <a:buChar char="•"/>
-            </a:pPr>
-            <a:r>
-              <a:rPr lang="en-US" sz="3600" dirty="0" smtClean="0"/>
-              <a:t>Text Labels</a:t>
-            </a:r>
-          </a:p>
-          <a:p>
-            <a:pPr marL="971550" lvl="1" indent="-571500">
-              <a:buFont typeface="Arial" panose="020B0604020202020204" pitchFamily="34" charset="0"/>
-              <a:buChar char="•"/>
-            </a:pPr>
-            <a:r>
-              <a:rPr lang="en-US" sz="3600" dirty="0" smtClean="0"/>
-              <a:t>Length</a:t>
-            </a:r>
-            <a:endParaRPr lang="en-US" sz="3600" dirty="0"/>
+            <a:pPr marL="0" indent="0"/>
+            <a:endParaRPr lang="en-US" sz="4000" dirty="0"/>
           </a:p>
           <a:p>
             <a:pPr algn="ctr"/>
@@ -5125,11 +5108,7 @@
           <a:p>
             <a:r>
               <a:rPr lang="en-US" dirty="0" smtClean="0"/>
-              <a:t>Visual </a:t>
-            </a:r>
-            <a:r>
-              <a:rPr lang="en-US" dirty="0" smtClean="0"/>
-              <a:t>Encoding – Item 3</a:t>
+              <a:t>Visual Encoding – Item 3</a:t>
             </a:r>
             <a:endParaRPr lang="pt-PT" dirty="0"/>
           </a:p>
@@ -5304,7 +5283,10 @@
                   </a:solidFill>
                 </a:ln>
                 <a:solidFill>
-                  <a:srgbClr val="FF0000"/>
+                  <a:schemeClr val="tx2">
+                    <a:lumMod val="60000"/>
+                    <a:lumOff val="40000"/>
+                  </a:schemeClr>
                 </a:solidFill>
                 <a:latin typeface="Impact" panose="020B0806030902050204" pitchFamily="34" charset="0"/>
               </a:rPr>
@@ -5317,7 +5299,10 @@
                 </a:solidFill>
               </a:ln>
               <a:solidFill>
-                <a:srgbClr val="FF0000"/>
+                <a:schemeClr val="tx2">
+                  <a:lumMod val="60000"/>
+                  <a:lumOff val="40000"/>
+                </a:schemeClr>
               </a:solidFill>
               <a:latin typeface="Impact" panose="020B0806030902050204" pitchFamily="34" charset="0"/>
             </a:endParaRPr>
@@ -5338,14 +5323,9 @@
           <a:prstGeom prst="flowChartConnector">
             <a:avLst/>
           </a:prstGeom>
-          <a:pattFill prst="lgCheck">
-            <a:fgClr>
-              <a:schemeClr val="accent1"/>
-            </a:fgClr>
-            <a:bgClr>
-              <a:schemeClr val="bg1"/>
-            </a:bgClr>
-          </a:pattFill>
+          <a:solidFill>
+            <a:srgbClr val="C00000"/>
+          </a:solidFill>
           <a:ln>
             <a:solidFill>
               <a:schemeClr val="tx1"/>
@@ -5391,12 +5371,16 @@
           <a:prstGeom prst="flowChartConnector">
             <a:avLst/>
           </a:prstGeom>
-          <a:blipFill>
-            <a:blip r:embed="rId5"/>
-            <a:tile tx="0" ty="0" sx="100000" sy="100000" flip="none" algn="tl"/>
-          </a:blipFill>
+          <a:solidFill>
+            <a:schemeClr val="accent1">
+              <a:lumMod val="60000"/>
+              <a:lumOff val="40000"/>
+            </a:schemeClr>
+          </a:solidFill>
           <a:ln>
-            <a:noFill/>
+            <a:solidFill>
+              <a:schemeClr val="tx1"/>
+            </a:solidFill>
           </a:ln>
         </p:spPr>
         <p:style>
@@ -5438,12 +5422,16 @@
           <a:prstGeom prst="flowChartConnector">
             <a:avLst/>
           </a:prstGeom>
-          <a:blipFill>
-            <a:blip r:embed="rId5"/>
-            <a:tile tx="0" ty="0" sx="100000" sy="100000" flip="none" algn="tl"/>
-          </a:blipFill>
+          <a:solidFill>
+            <a:schemeClr val="accent1">
+              <a:lumMod val="60000"/>
+              <a:lumOff val="40000"/>
+            </a:schemeClr>
+          </a:solidFill>
           <a:ln>
-            <a:noFill/>
+            <a:solidFill>
+              <a:schemeClr val="tx1"/>
+            </a:solidFill>
           </a:ln>
         </p:spPr>
         <p:style>
@@ -5485,14 +5473,9 @@
           <a:prstGeom prst="flowChartConnector">
             <a:avLst/>
           </a:prstGeom>
-          <a:pattFill prst="lgCheck">
-            <a:fgClr>
-              <a:schemeClr val="accent1"/>
-            </a:fgClr>
-            <a:bgClr>
-              <a:schemeClr val="bg1"/>
-            </a:bgClr>
-          </a:pattFill>
+          <a:solidFill>
+            <a:srgbClr val="C00000"/>
+          </a:solidFill>
           <a:ln>
             <a:solidFill>
               <a:schemeClr val="tx1"/>
@@ -5643,11 +5626,7 @@
           <a:p>
             <a:r>
               <a:rPr lang="en-US" dirty="0" smtClean="0"/>
-              <a:t>Visual </a:t>
-            </a:r>
-            <a:r>
-              <a:rPr lang="en-US" dirty="0" smtClean="0"/>
-              <a:t>Encoding – Item 3</a:t>
+              <a:t>Visual Encoding – Item 3</a:t>
             </a:r>
             <a:endParaRPr lang="pt-PT" dirty="0"/>
           </a:p>
@@ -5745,14 +5724,9 @@
           <a:prstGeom prst="rect">
             <a:avLst/>
           </a:prstGeom>
-          <a:pattFill prst="lgCheck">
-            <a:fgClr>
-              <a:schemeClr val="accent1"/>
-            </a:fgClr>
-            <a:bgClr>
-              <a:schemeClr val="bg1"/>
-            </a:bgClr>
-          </a:pattFill>
+          <a:solidFill>
+            <a:srgbClr val="C00000"/>
+          </a:solidFill>
           <a:ln>
             <a:solidFill>
               <a:schemeClr val="tx1"/>
@@ -5798,10 +5772,12 @@
           <a:prstGeom prst="rect">
             <a:avLst/>
           </a:prstGeom>
-          <a:blipFill>
-            <a:blip r:embed="rId3"/>
-            <a:tile tx="0" ty="0" sx="100000" sy="100000" flip="none" algn="tl"/>
-          </a:blipFill>
+          <a:solidFill>
+            <a:schemeClr val="accent1">
+              <a:lumMod val="60000"/>
+              <a:lumOff val="40000"/>
+            </a:schemeClr>
+          </a:solidFill>
           <a:ln>
             <a:solidFill>
               <a:schemeClr val="tx1"/>
@@ -5937,14 +5913,9 @@
           <a:prstGeom prst="rect">
             <a:avLst/>
           </a:prstGeom>
-          <a:pattFill prst="lgCheck">
-            <a:fgClr>
-              <a:schemeClr val="accent1"/>
-            </a:fgClr>
-            <a:bgClr>
-              <a:schemeClr val="bg1"/>
-            </a:bgClr>
-          </a:pattFill>
+          <a:solidFill>
+            <a:srgbClr val="C00000"/>
+          </a:solidFill>
           <a:ln>
             <a:solidFill>
               <a:schemeClr val="tx1"/>
@@ -5990,10 +5961,12 @@
           <a:prstGeom prst="rect">
             <a:avLst/>
           </a:prstGeom>
-          <a:blipFill>
-            <a:blip r:embed="rId3"/>
-            <a:tile tx="0" ty="0" sx="100000" sy="100000" flip="none" algn="tl"/>
-          </a:blipFill>
+          <a:solidFill>
+            <a:schemeClr val="accent1">
+              <a:lumMod val="60000"/>
+              <a:lumOff val="40000"/>
+            </a:schemeClr>
+          </a:solidFill>
           <a:ln>
             <a:solidFill>
               <a:schemeClr val="tx1"/>
@@ -6595,11 +6568,11 @@
           <a:p>
             <a:r>
               <a:rPr lang="en-US" dirty="0" smtClean="0"/>
-              <a:t>Visual </a:t>
+              <a:t>Visual Encoding </a:t>
             </a:r>
             <a:r>
               <a:rPr lang="en-US" dirty="0" smtClean="0"/>
-              <a:t>Encoding – Item 1</a:t>
+              <a:t>– 1</a:t>
             </a:r>
             <a:endParaRPr lang="pt-PT" dirty="0"/>
           </a:p>
@@ -6741,11 +6714,11 @@
           <a:p>
             <a:r>
               <a:rPr lang="en-US" dirty="0" smtClean="0"/>
-              <a:t>Visual </a:t>
+              <a:t>Visual Encoding </a:t>
             </a:r>
             <a:r>
               <a:rPr lang="en-US" dirty="0" smtClean="0"/>
-              <a:t>Encoding – Item 1</a:t>
+              <a:t>– 1</a:t>
             </a:r>
             <a:endParaRPr lang="pt-PT" dirty="0"/>
           </a:p>
@@ -6771,8 +6744,9 @@
             <a:pPr algn="ctr"/>
             <a:r>
               <a:rPr lang="en-US" sz="4000" dirty="0" smtClean="0"/>
-              <a:t>Ranks</a:t>
-            </a:r>
+              <a:t>Ranks – bar chart</a:t>
+            </a:r>
+            <a:endParaRPr lang="en-US" sz="4000" dirty="0" smtClean="0"/>
           </a:p>
           <a:p>
             <a:r>
@@ -6787,9 +6761,10 @@
               <a:buChar char="•"/>
             </a:pPr>
             <a:r>
-              <a:rPr lang="en-US" sz="3600" dirty="0"/>
-              <a:t>Length</a:t>
-            </a:r>
+              <a:rPr lang="en-US" sz="3600" dirty="0" smtClean="0"/>
+              <a:t>Length – amount of medals or the medals/population coefficient</a:t>
+            </a:r>
+            <a:endParaRPr lang="en-US" sz="3600" dirty="0"/>
           </a:p>
           <a:p>
             <a:pPr marL="971550" lvl="1" indent="-571500">
@@ -6797,19 +6772,8 @@
               <a:buChar char="•"/>
             </a:pPr>
             <a:r>
-              <a:rPr lang="en-GB" sz="3600" dirty="0"/>
-              <a:t>colour </a:t>
-            </a:r>
-            <a:endParaRPr lang="en-GB" sz="3600" dirty="0" smtClean="0"/>
-          </a:p>
-          <a:p>
-            <a:pPr marL="971550" lvl="1" indent="-571500">
-              <a:buFont typeface="Arial" panose="020B0604020202020204" pitchFamily="34" charset="0"/>
-              <a:buChar char="•"/>
-            </a:pPr>
-            <a:r>
               <a:rPr lang="en-GB" sz="3600" dirty="0" smtClean="0"/>
-              <a:t>Text Labels</a:t>
+              <a:t>Position – one for each country</a:t>
             </a:r>
             <a:endParaRPr lang="en-GB" sz="3600" dirty="0"/>
           </a:p>
@@ -6876,7 +6840,11 @@
             </a:r>
             <a:r>
               <a:rPr lang="en-US" dirty="0"/>
-              <a:t>Encoding – Item 1</a:t>
+              <a:t>Encoding </a:t>
+            </a:r>
+            <a:r>
+              <a:rPr lang="en-US" dirty="0" smtClean="0"/>
+              <a:t>– 1</a:t>
             </a:r>
             <a:endParaRPr lang="pt-PT" dirty="0"/>
           </a:p>
@@ -6917,7 +6885,6 @@
               <a:rPr lang="en-US" sz="3600" dirty="0" smtClean="0"/>
               <a:t>	</a:t>
             </a:r>
-            <a:endParaRPr lang="en-US" sz="3600" dirty="0" smtClean="0"/>
           </a:p>
         </p:txBody>
       </p:sp>
@@ -7153,11 +7120,11 @@
           <a:p>
             <a:r>
               <a:rPr lang="en-US" dirty="0" smtClean="0"/>
-              <a:t>Visual </a:t>
+              <a:t>Visual Encoding </a:t>
             </a:r>
             <a:r>
               <a:rPr lang="en-US" dirty="0" smtClean="0"/>
-              <a:t>Encoding – Item 2</a:t>
+              <a:t>– 2</a:t>
             </a:r>
             <a:endParaRPr lang="pt-PT" dirty="0"/>
           </a:p>
@@ -7183,7 +7150,11 @@
             <a:pPr algn="ctr"/>
             <a:r>
               <a:rPr lang="en-US" sz="4000" dirty="0" smtClean="0"/>
-              <a:t>A map</a:t>
+              <a:t>A </a:t>
+            </a:r>
+            <a:r>
+              <a:rPr lang="en-US" sz="4000" dirty="0" smtClean="0"/>
+              <a:t>scatter plot over a map</a:t>
             </a:r>
             <a:endParaRPr lang="en-US" sz="4000" dirty="0" smtClean="0"/>
           </a:p>
@@ -7302,11 +7273,11 @@
           <a:p>
             <a:r>
               <a:rPr lang="en-US" dirty="0" smtClean="0"/>
-              <a:t>Visual </a:t>
+              <a:t>Visual Encoding </a:t>
             </a:r>
             <a:r>
               <a:rPr lang="en-US" dirty="0" smtClean="0"/>
-              <a:t>Encoding – Item 2</a:t>
+              <a:t>– 2</a:t>
             </a:r>
             <a:endParaRPr lang="pt-PT" dirty="0"/>
           </a:p>
@@ -7334,7 +7305,6 @@
               <a:rPr lang="en-US" sz="4000" dirty="0" smtClean="0"/>
               <a:t>A map</a:t>
             </a:r>
-            <a:endParaRPr lang="en-US" sz="4000" dirty="0" smtClean="0"/>
           </a:p>
           <a:p>
             <a:r>
@@ -7353,7 +7323,19 @@
             </a:r>
             <a:r>
               <a:rPr lang="en-US" sz="3600" dirty="0"/>
-              <a:t>	</a:t>
+              <a:t> </a:t>
+            </a:r>
+            <a:r>
+              <a:rPr lang="en-US" sz="3600" dirty="0" smtClean="0"/>
+              <a:t>– </a:t>
+            </a:r>
+            <a:r>
+              <a:rPr lang="en-US" sz="3600" dirty="0"/>
+              <a:t>amount of medals or the medals/population </a:t>
+            </a:r>
+            <a:r>
+              <a:rPr lang="en-US" sz="3600" dirty="0" smtClean="0"/>
+              <a:t>coefficient</a:t>
             </a:r>
             <a:endParaRPr lang="en-US" sz="3600" dirty="0" smtClean="0"/>
           </a:p>
@@ -7364,7 +7346,7 @@
             </a:pPr>
             <a:r>
               <a:rPr lang="en-US" sz="3600" dirty="0" smtClean="0"/>
-              <a:t>Text Labels</a:t>
+              <a:t>Position – corresponds to the location of the country on the map</a:t>
             </a:r>
             <a:endParaRPr lang="en-US" sz="3600" dirty="0" smtClean="0"/>
           </a:p>
@@ -7483,11 +7465,11 @@
           <a:p>
             <a:r>
               <a:rPr lang="en-US" dirty="0" smtClean="0"/>
-              <a:t>Visual </a:t>
+              <a:t>Visual Encoding </a:t>
             </a:r>
             <a:r>
               <a:rPr lang="en-US" dirty="0" smtClean="0"/>
-              <a:t>Encoding – Item 2</a:t>
+              <a:t>– 2</a:t>
             </a:r>
             <a:endParaRPr lang="pt-PT" dirty="0"/>
           </a:p>
@@ -7515,16 +7497,11 @@
               <a:rPr lang="en-US" sz="4000" dirty="0" smtClean="0"/>
               <a:t>A map</a:t>
             </a:r>
-            <a:endParaRPr lang="en-US" sz="4000" dirty="0" smtClean="0"/>
           </a:p>
           <a:p>
             <a:r>
               <a:rPr lang="en-US" sz="4000" dirty="0" smtClean="0"/>
-              <a:t>Visual </a:t>
-            </a:r>
-            <a:r>
-              <a:rPr lang="en-US" sz="4000" dirty="0" smtClean="0"/>
-              <a:t>Encoding:</a:t>
+              <a:t>Visual Encoding:</a:t>
             </a:r>
           </a:p>
         </p:txBody>
@@ -7586,8 +7563,8 @@
         </p:nvSpPr>
         <p:spPr>
           <a:xfrm>
-            <a:off x="3591792" y="2924945"/>
-            <a:ext cx="548159" cy="351194"/>
+            <a:off x="3591793" y="2924945"/>
+            <a:ext cx="332136" cy="351194"/>
           </a:xfrm>
           <a:prstGeom prst="flowChartConnector">
             <a:avLst/>
@@ -7631,8 +7608,8 @@
         </p:nvSpPr>
         <p:spPr>
           <a:xfrm>
-            <a:off x="3527884" y="4951432"/>
-            <a:ext cx="612068" cy="648072"/>
+            <a:off x="3527884" y="5013176"/>
+            <a:ext cx="612068" cy="586328"/>
           </a:xfrm>
           <a:prstGeom prst="flowChartConnector">
             <a:avLst/>
@@ -7726,11 +7703,15 @@
           <a:p>
             <a:r>
               <a:rPr lang="en-US" dirty="0" smtClean="0"/>
-              <a:t>Visual </a:t>
+              <a:t>Visual Encoding </a:t>
             </a:r>
             <a:r>
               <a:rPr lang="en-US" dirty="0" smtClean="0"/>
-              <a:t>Encoding – Item 3</a:t>
+              <a:t>– </a:t>
+            </a:r>
+            <a:r>
+              <a:rPr lang="en-US" dirty="0" smtClean="0"/>
+              <a:t>3</a:t>
             </a:r>
             <a:endParaRPr lang="pt-PT" dirty="0"/>
           </a:p>
@@ -7756,7 +7737,11 @@
             <a:pPr algn="ctr"/>
             <a:r>
               <a:rPr lang="en-US" sz="4000" dirty="0" smtClean="0"/>
-              <a:t>Compare result</a:t>
+              <a:t>Compare </a:t>
+            </a:r>
+            <a:r>
+              <a:rPr lang="en-US" sz="4000" dirty="0" smtClean="0"/>
+              <a:t>results</a:t>
             </a:r>
             <a:endParaRPr lang="en-US" sz="4000" dirty="0" smtClean="0"/>
           </a:p>

</xml_diff>